<commit_message>
updated Presentation with postman
</commit_message>
<xml_diff>
--- a/share/presentations/Java 2/RentATool_17.07.2020.pptx
+++ b/share/presentations/Java 2/RentATool_17.07.2020.pptx
@@ -5,17 +5,19 @@
     <p:sldMasterId id="2147483978" r:id="rId4"/>
   </p:sldMasterIdLst>
   <p:notesMasterIdLst>
-    <p:notesMasterId r:id="rId10"/>
+    <p:notesMasterId r:id="rId12"/>
   </p:notesMasterIdLst>
   <p:handoutMasterIdLst>
-    <p:handoutMasterId r:id="rId11"/>
+    <p:handoutMasterId r:id="rId13"/>
   </p:handoutMasterIdLst>
   <p:sldIdLst>
     <p:sldId id="256" r:id="rId5"/>
     <p:sldId id="265" r:id="rId6"/>
     <p:sldId id="266" r:id="rId7"/>
     <p:sldId id="264" r:id="rId8"/>
-    <p:sldId id="261" r:id="rId9"/>
+    <p:sldId id="267" r:id="rId9"/>
+    <p:sldId id="268" r:id="rId10"/>
+    <p:sldId id="261" r:id="rId11"/>
   </p:sldIdLst>
   <p:sldSz cx="12192000" cy="6858000"/>
   <p:notesSz cx="6858000" cy="9144000"/>
@@ -123,6 +125,8 @@
             <p14:sldId id="265"/>
             <p14:sldId id="266"/>
             <p14:sldId id="264"/>
+            <p14:sldId id="267"/>
+            <p14:sldId id="268"/>
             <p14:sldId id="261"/>
           </p14:sldIdLst>
         </p14:section>
@@ -150,18 +154,34 @@
 </file>
 
 <file path=ppt/diagrams/colors1.xml><?xml version="1.0" encoding="utf-8"?>
-<dgm:colorsDef xmlns:dgm="http://schemas.openxmlformats.org/drawingml/2006/diagram" xmlns:a="http://schemas.openxmlformats.org/drawingml/2006/main" uniqueId="urn:microsoft.com/office/officeart/2005/8/colors/accent0_3">
+<dgm:colorsDef xmlns:dgm="http://schemas.openxmlformats.org/drawingml/2006/diagram" xmlns:a="http://schemas.openxmlformats.org/drawingml/2006/main" uniqueId="urn:microsoft.com/office/officeart/2005/8/colors/colorful1">
   <dgm:title val=""/>
   <dgm:desc val=""/>
   <dgm:catLst>
-    <dgm:cat type="mainScheme" pri="10300"/>
+    <dgm:cat type="colorful" pri="10100"/>
   </dgm:catLst>
   <dgm:styleLbl name="node0">
     <dgm:fillClrLst meth="repeat">
-      <a:schemeClr val="dk2"/>
+      <a:schemeClr val="accent1"/>
     </dgm:fillClrLst>
     <dgm:linClrLst meth="repeat">
-      <a:schemeClr val="lt2"/>
+      <a:schemeClr val="lt1"/>
+    </dgm:linClrLst>
+    <dgm:effectClrLst/>
+    <dgm:txLinClrLst/>
+    <dgm:txFillClrLst/>
+    <dgm:txEffectClrLst/>
+  </dgm:styleLbl>
+  <dgm:styleLbl name="node1">
+    <dgm:fillClrLst meth="repeat">
+      <a:schemeClr val="accent2"/>
+      <a:schemeClr val="accent3"/>
+      <a:schemeClr val="accent4"/>
+      <a:schemeClr val="accent5"/>
+      <a:schemeClr val="accent6"/>
+    </dgm:fillClrLst>
+    <dgm:linClrLst meth="repeat">
+      <a:schemeClr val="lt1"/>
     </dgm:linClrLst>
     <dgm:effectClrLst/>
     <dgm:txLinClrLst/>
@@ -170,22 +190,18 @@
   </dgm:styleLbl>
   <dgm:styleLbl name="alignNode1">
     <dgm:fillClrLst meth="repeat">
-      <a:schemeClr val="dk2"/>
+      <a:schemeClr val="accent2"/>
+      <a:schemeClr val="accent3"/>
+      <a:schemeClr val="accent4"/>
+      <a:schemeClr val="accent5"/>
+      <a:schemeClr val="accent6"/>
     </dgm:fillClrLst>
     <dgm:linClrLst meth="repeat">
-      <a:schemeClr val="dk2"/>
-    </dgm:linClrLst>
-    <dgm:effectClrLst/>
-    <dgm:txLinClrLst/>
-    <dgm:txFillClrLst/>
-    <dgm:txEffectClrLst/>
-  </dgm:styleLbl>
-  <dgm:styleLbl name="node1">
-    <dgm:fillClrLst meth="repeat">
-      <a:schemeClr val="dk2"/>
-    </dgm:fillClrLst>
-    <dgm:linClrLst meth="repeat">
-      <a:schemeClr val="lt2"/>
+      <a:schemeClr val="accent2"/>
+      <a:schemeClr val="accent3"/>
+      <a:schemeClr val="accent4"/>
+      <a:schemeClr val="accent5"/>
+      <a:schemeClr val="accent6"/>
     </dgm:linClrLst>
     <dgm:effectClrLst/>
     <dgm:txLinClrLst/>
@@ -194,10 +210,14 @@
   </dgm:styleLbl>
   <dgm:styleLbl name="lnNode1">
     <dgm:fillClrLst meth="repeat">
-      <a:schemeClr val="dk2"/>
+      <a:schemeClr val="accent2"/>
+      <a:schemeClr val="accent3"/>
+      <a:schemeClr val="accent4"/>
+      <a:schemeClr val="accent5"/>
+      <a:schemeClr val="accent6"/>
     </dgm:fillClrLst>
     <dgm:linClrLst meth="repeat">
-      <a:schemeClr val="lt2"/>
+      <a:schemeClr val="lt1"/>
     </dgm:linClrLst>
     <dgm:effectClrLst/>
     <dgm:txLinClrLst/>
@@ -206,12 +226,24 @@
   </dgm:styleLbl>
   <dgm:styleLbl name="vennNode1">
     <dgm:fillClrLst meth="repeat">
-      <a:schemeClr val="dk2">
+      <a:schemeClr val="accent2">
+        <a:alpha val="50000"/>
+      </a:schemeClr>
+      <a:schemeClr val="accent3">
+        <a:alpha val="50000"/>
+      </a:schemeClr>
+      <a:schemeClr val="accent4">
+        <a:alpha val="50000"/>
+      </a:schemeClr>
+      <a:schemeClr val="accent5">
+        <a:alpha val="50000"/>
+      </a:schemeClr>
+      <a:schemeClr val="accent6">
         <a:alpha val="50000"/>
       </a:schemeClr>
     </dgm:fillClrLst>
     <dgm:linClrLst meth="repeat">
-      <a:schemeClr val="lt2"/>
+      <a:schemeClr val="lt1"/>
     </dgm:linClrLst>
     <dgm:effectClrLst/>
     <dgm:txLinClrLst/>
@@ -219,11 +251,11 @@
     <dgm:txEffectClrLst/>
   </dgm:styleLbl>
   <dgm:styleLbl name="node2">
-    <dgm:fillClrLst meth="repeat">
-      <a:schemeClr val="dk2"/>
+    <dgm:fillClrLst>
+      <a:schemeClr val="accent2"/>
     </dgm:fillClrLst>
     <dgm:linClrLst meth="repeat">
-      <a:schemeClr val="lt2"/>
+      <a:schemeClr val="lt1"/>
     </dgm:linClrLst>
     <dgm:effectClrLst/>
     <dgm:txLinClrLst/>
@@ -231,11 +263,11 @@
     <dgm:txEffectClrLst/>
   </dgm:styleLbl>
   <dgm:styleLbl name="node3">
-    <dgm:fillClrLst meth="repeat">
-      <a:schemeClr val="dk2"/>
+    <dgm:fillClrLst>
+      <a:schemeClr val="accent3"/>
     </dgm:fillClrLst>
     <dgm:linClrLst meth="repeat">
-      <a:schemeClr val="lt2"/>
+      <a:schemeClr val="lt1"/>
     </dgm:linClrLst>
     <dgm:effectClrLst/>
     <dgm:txLinClrLst/>
@@ -243,11 +275,11 @@
     <dgm:txEffectClrLst/>
   </dgm:styleLbl>
   <dgm:styleLbl name="node4">
-    <dgm:fillClrLst meth="repeat">
-      <a:schemeClr val="dk2"/>
+    <dgm:fillClrLst>
+      <a:schemeClr val="accent4"/>
     </dgm:fillClrLst>
     <dgm:linClrLst meth="repeat">
-      <a:schemeClr val="lt2"/>
+      <a:schemeClr val="lt1"/>
     </dgm:linClrLst>
     <dgm:effectClrLst/>
     <dgm:txLinClrLst/>
@@ -256,66 +288,80 @@
   </dgm:styleLbl>
   <dgm:styleLbl name="fgImgPlace1">
     <dgm:fillClrLst meth="repeat">
-      <a:schemeClr val="dk2">
+      <a:schemeClr val="accent2">
+        <a:tint val="50000"/>
+      </a:schemeClr>
+      <a:schemeClr val="accent3">
+        <a:tint val="50000"/>
+      </a:schemeClr>
+      <a:schemeClr val="accent4">
+        <a:tint val="50000"/>
+      </a:schemeClr>
+      <a:schemeClr val="accent5">
+        <a:tint val="50000"/>
+      </a:schemeClr>
+      <a:schemeClr val="accent6">
         <a:tint val="50000"/>
       </a:schemeClr>
     </dgm:fillClrLst>
     <dgm:linClrLst meth="repeat">
-      <a:schemeClr val="lt2"/>
+      <a:schemeClr val="lt1"/>
     </dgm:linClrLst>
     <dgm:effectClrLst/>
     <dgm:txLinClrLst/>
     <dgm:txFillClrLst meth="repeat">
-      <a:schemeClr val="lt2"/>
+      <a:schemeClr val="lt1"/>
     </dgm:txFillClrLst>
     <dgm:txEffectClrLst/>
   </dgm:styleLbl>
   <dgm:styleLbl name="alignImgPlace1">
-    <dgm:fillClrLst meth="repeat">
-      <a:schemeClr val="dk2">
+    <dgm:fillClrLst>
+      <a:schemeClr val="accent1">
         <a:tint val="50000"/>
+      </a:schemeClr>
+      <a:schemeClr val="accent2">
+        <a:tint val="20000"/>
       </a:schemeClr>
     </dgm:fillClrLst>
     <dgm:linClrLst meth="repeat">
-      <a:schemeClr val="dk2">
-        <a:shade val="80000"/>
-      </a:schemeClr>
+      <a:schemeClr val="lt1"/>
     </dgm:linClrLst>
     <dgm:effectClrLst/>
     <dgm:txLinClrLst/>
     <dgm:txFillClrLst meth="repeat">
-      <a:schemeClr val="lt2"/>
+      <a:schemeClr val="lt1"/>
     </dgm:txFillClrLst>
     <dgm:txEffectClrLst/>
   </dgm:styleLbl>
   <dgm:styleLbl name="bgImgPlace1">
-    <dgm:fillClrLst meth="repeat">
-      <a:schemeClr val="dk2">
+    <dgm:fillClrLst>
+      <a:schemeClr val="accent1">
         <a:tint val="50000"/>
+      </a:schemeClr>
+      <a:schemeClr val="accent2">
+        <a:tint val="20000"/>
       </a:schemeClr>
     </dgm:fillClrLst>
     <dgm:linClrLst meth="repeat">
-      <a:schemeClr val="dk2">
-        <a:shade val="80000"/>
-      </a:schemeClr>
+      <a:schemeClr val="lt1"/>
     </dgm:linClrLst>
     <dgm:effectClrLst/>
     <dgm:txLinClrLst/>
     <dgm:txFillClrLst meth="repeat">
-      <a:schemeClr val="lt2"/>
+      <a:schemeClr val="lt1"/>
     </dgm:txFillClrLst>
     <dgm:txEffectClrLst/>
   </dgm:styleLbl>
   <dgm:styleLbl name="sibTrans2D1">
     <dgm:fillClrLst meth="repeat">
-      <a:schemeClr val="dk2">
-        <a:tint val="60000"/>
-      </a:schemeClr>
+      <a:schemeClr val="accent2"/>
+      <a:schemeClr val="accent3"/>
+      <a:schemeClr val="accent4"/>
+      <a:schemeClr val="accent5"/>
+      <a:schemeClr val="accent6"/>
     </dgm:fillClrLst>
-    <dgm:linClrLst meth="repeat">
-      <a:schemeClr val="dk2">
-        <a:tint val="60000"/>
-      </a:schemeClr>
+    <dgm:linClrLst meth="cycle">
+      <a:schemeClr val="lt1"/>
     </dgm:linClrLst>
     <dgm:effectClrLst/>
     <dgm:txLinClrLst/>
@@ -324,72 +370,84 @@
   </dgm:styleLbl>
   <dgm:styleLbl name="fgSibTrans2D1">
     <dgm:fillClrLst meth="repeat">
-      <a:schemeClr val="dk2">
-        <a:tint val="60000"/>
-      </a:schemeClr>
+      <a:schemeClr val="accent2"/>
+      <a:schemeClr val="accent3"/>
+      <a:schemeClr val="accent4"/>
+      <a:schemeClr val="accent5"/>
+      <a:schemeClr val="accent6"/>
     </dgm:fillClrLst>
-    <dgm:linClrLst meth="repeat">
-      <a:schemeClr val="dk2">
-        <a:tint val="60000"/>
-      </a:schemeClr>
+    <dgm:linClrLst meth="cycle">
+      <a:schemeClr val="lt1"/>
     </dgm:linClrLst>
     <dgm:effectClrLst/>
     <dgm:txLinClrLst/>
-    <dgm:txFillClrLst/>
+    <dgm:txFillClrLst meth="repeat">
+      <a:schemeClr val="lt1"/>
+    </dgm:txFillClrLst>
     <dgm:txEffectClrLst/>
   </dgm:styleLbl>
   <dgm:styleLbl name="bgSibTrans2D1">
     <dgm:fillClrLst meth="repeat">
-      <a:schemeClr val="dk2">
-        <a:tint val="60000"/>
-      </a:schemeClr>
+      <a:schemeClr val="accent2"/>
+      <a:schemeClr val="accent3"/>
+      <a:schemeClr val="accent4"/>
+      <a:schemeClr val="accent5"/>
+      <a:schemeClr val="accent6"/>
     </dgm:fillClrLst>
-    <dgm:linClrLst meth="repeat">
-      <a:schemeClr val="dk2">
-        <a:tint val="60000"/>
-      </a:schemeClr>
+    <dgm:linClrLst meth="cycle">
+      <a:schemeClr val="lt1"/>
     </dgm:linClrLst>
     <dgm:effectClrLst/>
     <dgm:txLinClrLst/>
-    <dgm:txFillClrLst/>
+    <dgm:txFillClrLst meth="repeat">
+      <a:schemeClr val="lt1"/>
+    </dgm:txFillClrLst>
     <dgm:txEffectClrLst/>
   </dgm:styleLbl>
   <dgm:styleLbl name="sibTrans1D1">
     <dgm:fillClrLst meth="repeat">
-      <a:schemeClr val="dk2"/>
+      <a:schemeClr val="accent2"/>
+      <a:schemeClr val="accent3"/>
+      <a:schemeClr val="accent4"/>
+      <a:schemeClr val="accent5"/>
+      <a:schemeClr val="accent6"/>
     </dgm:fillClrLst>
     <dgm:linClrLst meth="repeat">
-      <a:schemeClr val="dk2"/>
+      <a:schemeClr val="accent2"/>
+      <a:schemeClr val="accent3"/>
+      <a:schemeClr val="accent4"/>
+      <a:schemeClr val="accent5"/>
+      <a:schemeClr val="accent6"/>
     </dgm:linClrLst>
     <dgm:effectClrLst/>
     <dgm:txLinClrLst/>
     <dgm:txFillClrLst meth="repeat">
-      <a:schemeClr val="lt2"/>
+      <a:schemeClr val="tx1"/>
     </dgm:txFillClrLst>
     <dgm:txEffectClrLst/>
   </dgm:styleLbl>
   <dgm:styleLbl name="callout">
     <dgm:fillClrLst meth="repeat">
-      <a:schemeClr val="dk2"/>
+      <a:schemeClr val="accent2"/>
     </dgm:fillClrLst>
     <dgm:linClrLst meth="repeat">
-      <a:schemeClr val="dk2">
+      <a:schemeClr val="accent2">
         <a:tint val="50000"/>
       </a:schemeClr>
     </dgm:linClrLst>
     <dgm:effectClrLst/>
     <dgm:txLinClrLst/>
     <dgm:txFillClrLst meth="repeat">
-      <a:schemeClr val="lt2"/>
+      <a:schemeClr val="tx1"/>
     </dgm:txFillClrLst>
     <dgm:txEffectClrLst/>
   </dgm:styleLbl>
   <dgm:styleLbl name="asst0">
     <dgm:fillClrLst meth="repeat">
-      <a:schemeClr val="dk2"/>
+      <a:schemeClr val="accent1"/>
     </dgm:fillClrLst>
     <dgm:linClrLst meth="repeat">
-      <a:schemeClr val="lt2"/>
+      <a:schemeClr val="lt1"/>
     </dgm:linClrLst>
     <dgm:effectClrLst/>
     <dgm:txLinClrLst/>
@@ -398,10 +456,10 @@
   </dgm:styleLbl>
   <dgm:styleLbl name="asst1">
     <dgm:fillClrLst meth="repeat">
-      <a:schemeClr val="dk2"/>
+      <a:schemeClr val="accent2"/>
     </dgm:fillClrLst>
     <dgm:linClrLst meth="repeat">
-      <a:schemeClr val="lt2"/>
+      <a:schemeClr val="lt1"/>
     </dgm:linClrLst>
     <dgm:effectClrLst/>
     <dgm:txLinClrLst/>
@@ -409,11 +467,11 @@
     <dgm:txEffectClrLst/>
   </dgm:styleLbl>
   <dgm:styleLbl name="asst2">
-    <dgm:fillClrLst meth="repeat">
-      <a:schemeClr val="dk2"/>
+    <dgm:fillClrLst>
+      <a:schemeClr val="accent3"/>
     </dgm:fillClrLst>
     <dgm:linClrLst meth="repeat">
-      <a:schemeClr val="lt2"/>
+      <a:schemeClr val="lt1"/>
     </dgm:linClrLst>
     <dgm:effectClrLst/>
     <dgm:txLinClrLst/>
@@ -421,11 +479,11 @@
     <dgm:txEffectClrLst/>
   </dgm:styleLbl>
   <dgm:styleLbl name="asst3">
-    <dgm:fillClrLst meth="repeat">
-      <a:schemeClr val="dk2"/>
+    <dgm:fillClrLst>
+      <a:schemeClr val="accent4"/>
     </dgm:fillClrLst>
     <dgm:linClrLst meth="repeat">
-      <a:schemeClr val="lt2"/>
+      <a:schemeClr val="lt1"/>
     </dgm:linClrLst>
     <dgm:effectClrLst/>
     <dgm:txLinClrLst/>
@@ -433,11 +491,11 @@
     <dgm:txEffectClrLst/>
   </dgm:styleLbl>
   <dgm:styleLbl name="asst4">
-    <dgm:fillClrLst meth="repeat">
-      <a:schemeClr val="dk2"/>
+    <dgm:fillClrLst>
+      <a:schemeClr val="accent5"/>
     </dgm:fillClrLst>
     <dgm:linClrLst meth="repeat">
-      <a:schemeClr val="lt2"/>
+      <a:schemeClr val="lt1"/>
     </dgm:linClrLst>
     <dgm:effectClrLst/>
     <dgm:txLinClrLst/>
@@ -446,72 +504,62 @@
   </dgm:styleLbl>
   <dgm:styleLbl name="parChTrans2D1">
     <dgm:fillClrLst meth="repeat">
-      <a:schemeClr val="dk2">
-        <a:tint val="60000"/>
-      </a:schemeClr>
+      <a:schemeClr val="accent2"/>
     </dgm:fillClrLst>
     <dgm:linClrLst meth="repeat">
-      <a:schemeClr val="dk2">
-        <a:tint val="60000"/>
-      </a:schemeClr>
+      <a:schemeClr val="lt1"/>
     </dgm:linClrLst>
     <dgm:effectClrLst/>
     <dgm:txLinClrLst/>
     <dgm:txFillClrLst meth="repeat">
-      <a:schemeClr val="lt2"/>
+      <a:schemeClr val="lt1"/>
     </dgm:txFillClrLst>
     <dgm:txEffectClrLst/>
   </dgm:styleLbl>
   <dgm:styleLbl name="parChTrans2D2">
     <dgm:fillClrLst meth="repeat">
-      <a:schemeClr val="dk2"/>
+      <a:schemeClr val="accent3"/>
     </dgm:fillClrLst>
     <dgm:linClrLst meth="repeat">
-      <a:schemeClr val="dk2"/>
+      <a:schemeClr val="lt1"/>
+    </dgm:linClrLst>
+    <dgm:effectClrLst/>
+    <dgm:txLinClrLst/>
+    <dgm:txFillClrLst/>
+    <dgm:txEffectClrLst/>
+  </dgm:styleLbl>
+  <dgm:styleLbl name="parChTrans2D3">
+    <dgm:fillClrLst meth="repeat">
+      <a:schemeClr val="accent4"/>
+    </dgm:fillClrLst>
+    <dgm:linClrLst meth="repeat">
+      <a:schemeClr val="lt1"/>
+    </dgm:linClrLst>
+    <dgm:effectClrLst/>
+    <dgm:txLinClrLst/>
+    <dgm:txFillClrLst/>
+    <dgm:txEffectClrLst/>
+  </dgm:styleLbl>
+  <dgm:styleLbl name="parChTrans2D4">
+    <dgm:fillClrLst meth="repeat">
+      <a:schemeClr val="accent5"/>
+    </dgm:fillClrLst>
+    <dgm:linClrLst meth="repeat">
+      <a:schemeClr val="lt1"/>
     </dgm:linClrLst>
     <dgm:effectClrLst/>
     <dgm:txLinClrLst/>
     <dgm:txFillClrLst meth="repeat">
-      <a:schemeClr val="lt2"/>
-    </dgm:txFillClrLst>
-    <dgm:txEffectClrLst/>
-  </dgm:styleLbl>
-  <dgm:styleLbl name="parChTrans2D3">
-    <dgm:fillClrLst meth="repeat">
-      <a:schemeClr val="dk2"/>
-    </dgm:fillClrLst>
-    <dgm:linClrLst meth="repeat">
-      <a:schemeClr val="dk2"/>
-    </dgm:linClrLst>
-    <dgm:effectClrLst/>
-    <dgm:txLinClrLst/>
-    <dgm:txFillClrLst meth="repeat">
-      <a:schemeClr val="lt2"/>
-    </dgm:txFillClrLst>
-    <dgm:txEffectClrLst/>
-  </dgm:styleLbl>
-  <dgm:styleLbl name="parChTrans2D4">
-    <dgm:fillClrLst meth="repeat">
-      <a:schemeClr val="dk2"/>
-    </dgm:fillClrLst>
-    <dgm:linClrLst meth="repeat">
-      <a:schemeClr val="dk2"/>
-    </dgm:linClrLst>
-    <dgm:effectClrLst/>
-    <dgm:txLinClrLst/>
-    <dgm:txFillClrLst meth="repeat">
-      <a:schemeClr val="lt2"/>
+      <a:schemeClr val="lt1"/>
     </dgm:txFillClrLst>
     <dgm:txEffectClrLst/>
   </dgm:styleLbl>
   <dgm:styleLbl name="parChTrans1D1">
     <dgm:fillClrLst meth="repeat">
-      <a:schemeClr val="dk2"/>
+      <a:schemeClr val="accent2"/>
     </dgm:fillClrLst>
     <dgm:linClrLst meth="repeat">
-      <a:schemeClr val="dk2">
-        <a:shade val="60000"/>
-      </a:schemeClr>
+      <a:schemeClr val="accent1"/>
     </dgm:linClrLst>
     <dgm:effectClrLst/>
     <dgm:txLinClrLst/>
@@ -522,12 +570,12 @@
   </dgm:styleLbl>
   <dgm:styleLbl name="parChTrans1D2">
     <dgm:fillClrLst meth="repeat">
-      <a:schemeClr val="dk2"/>
+      <a:schemeClr val="accent3">
+        <a:tint val="90000"/>
+      </a:schemeClr>
     </dgm:fillClrLst>
     <dgm:linClrLst meth="repeat">
-      <a:schemeClr val="dk2">
-        <a:shade val="60000"/>
-      </a:schemeClr>
+      <a:schemeClr val="accent2"/>
     </dgm:linClrLst>
     <dgm:effectClrLst/>
     <dgm:txLinClrLst/>
@@ -538,12 +586,12 @@
   </dgm:styleLbl>
   <dgm:styleLbl name="parChTrans1D3">
     <dgm:fillClrLst meth="repeat">
-      <a:schemeClr val="dk2"/>
+      <a:schemeClr val="accent4">
+        <a:tint val="70000"/>
+      </a:schemeClr>
     </dgm:fillClrLst>
     <dgm:linClrLst meth="repeat">
-      <a:schemeClr val="dk2">
-        <a:shade val="80000"/>
-      </a:schemeClr>
+      <a:schemeClr val="accent3"/>
     </dgm:linClrLst>
     <dgm:effectClrLst/>
     <dgm:txLinClrLst/>
@@ -554,12 +602,12 @@
   </dgm:styleLbl>
   <dgm:styleLbl name="parChTrans1D4">
     <dgm:fillClrLst meth="repeat">
-      <a:schemeClr val="dk2"/>
+      <a:schemeClr val="accent5">
+        <a:tint val="50000"/>
+      </a:schemeClr>
     </dgm:fillClrLst>
     <dgm:linClrLst meth="repeat">
-      <a:schemeClr val="dk2">
-        <a:shade val="80000"/>
-      </a:schemeClr>
+      <a:schemeClr val="accent4"/>
     </dgm:linClrLst>
     <dgm:effectClrLst/>
     <dgm:txLinClrLst/>
@@ -570,12 +618,16 @@
   </dgm:styleLbl>
   <dgm:styleLbl name="fgAcc1">
     <dgm:fillClrLst meth="repeat">
-      <a:schemeClr val="lt2">
+      <a:schemeClr val="lt1">
         <a:alpha val="90000"/>
       </a:schemeClr>
     </dgm:fillClrLst>
     <dgm:linClrLst meth="repeat">
-      <a:schemeClr val="dk2"/>
+      <a:schemeClr val="accent2"/>
+      <a:schemeClr val="accent3"/>
+      <a:schemeClr val="accent4"/>
+      <a:schemeClr val="accent5"/>
+      <a:schemeClr val="accent6"/>
     </dgm:linClrLst>
     <dgm:effectClrLst/>
     <dgm:txLinClrLst/>
@@ -586,12 +638,16 @@
   </dgm:styleLbl>
   <dgm:styleLbl name="conFgAcc1">
     <dgm:fillClrLst meth="repeat">
-      <a:schemeClr val="lt2">
+      <a:schemeClr val="lt1">
         <a:alpha val="90000"/>
       </a:schemeClr>
     </dgm:fillClrLst>
     <dgm:linClrLst meth="repeat">
-      <a:schemeClr val="dk2"/>
+      <a:schemeClr val="accent2"/>
+      <a:schemeClr val="accent3"/>
+      <a:schemeClr val="accent4"/>
+      <a:schemeClr val="accent5"/>
+      <a:schemeClr val="accent6"/>
     </dgm:linClrLst>
     <dgm:effectClrLst/>
     <dgm:txLinClrLst/>
@@ -602,12 +658,16 @@
   </dgm:styleLbl>
   <dgm:styleLbl name="alignAcc1">
     <dgm:fillClrLst meth="repeat">
-      <a:schemeClr val="lt2">
+      <a:schemeClr val="lt1">
         <a:alpha val="90000"/>
       </a:schemeClr>
     </dgm:fillClrLst>
     <dgm:linClrLst meth="repeat">
-      <a:schemeClr val="dk2"/>
+      <a:schemeClr val="accent2"/>
+      <a:schemeClr val="accent3"/>
+      <a:schemeClr val="accent4"/>
+      <a:schemeClr val="accent5"/>
+      <a:schemeClr val="accent6"/>
     </dgm:linClrLst>
     <dgm:effectClrLst/>
     <dgm:txLinClrLst/>
@@ -618,12 +678,12 @@
   </dgm:styleLbl>
   <dgm:styleLbl name="trAlignAcc1">
     <dgm:fillClrLst meth="repeat">
-      <a:schemeClr val="lt2">
+      <a:schemeClr val="lt1">
         <a:alpha val="40000"/>
       </a:schemeClr>
     </dgm:fillClrLst>
     <dgm:linClrLst meth="repeat">
-      <a:schemeClr val="dk2"/>
+      <a:schemeClr val="accent1"/>
     </dgm:linClrLst>
     <dgm:effectClrLst/>
     <dgm:txLinClrLst/>
@@ -634,12 +694,16 @@
   </dgm:styleLbl>
   <dgm:styleLbl name="bgAcc1">
     <dgm:fillClrLst meth="repeat">
-      <a:schemeClr val="lt2">
+      <a:schemeClr val="lt1">
         <a:alpha val="90000"/>
       </a:schemeClr>
     </dgm:fillClrLst>
     <dgm:linClrLst meth="repeat">
-      <a:schemeClr val="dk2"/>
+      <a:schemeClr val="accent2"/>
+      <a:schemeClr val="accent3"/>
+      <a:schemeClr val="accent4"/>
+      <a:schemeClr val="accent5"/>
+      <a:schemeClr val="accent6"/>
     </dgm:linClrLst>
     <dgm:effectClrLst/>
     <dgm:txLinClrLst/>
@@ -650,10 +714,14 @@
   </dgm:styleLbl>
   <dgm:styleLbl name="solidFgAcc1">
     <dgm:fillClrLst meth="repeat">
-      <a:schemeClr val="lt2"/>
+      <a:schemeClr val="lt1"/>
     </dgm:fillClrLst>
     <dgm:linClrLst meth="repeat">
-      <a:schemeClr val="dk2"/>
+      <a:schemeClr val="accent2"/>
+      <a:schemeClr val="accent3"/>
+      <a:schemeClr val="accent4"/>
+      <a:schemeClr val="accent5"/>
+      <a:schemeClr val="accent6"/>
     </dgm:linClrLst>
     <dgm:effectClrLst/>
     <dgm:txLinClrLst/>
@@ -664,10 +732,14 @@
   </dgm:styleLbl>
   <dgm:styleLbl name="solidAlignAcc1">
     <dgm:fillClrLst meth="repeat">
-      <a:schemeClr val="lt2"/>
+      <a:schemeClr val="lt1"/>
     </dgm:fillClrLst>
     <dgm:linClrLst meth="repeat">
-      <a:schemeClr val="dk2"/>
+      <a:schemeClr val="accent2"/>
+      <a:schemeClr val="accent3"/>
+      <a:schemeClr val="accent4"/>
+      <a:schemeClr val="accent5"/>
+      <a:schemeClr val="accent6"/>
     </dgm:linClrLst>
     <dgm:effectClrLst/>
     <dgm:txLinClrLst/>
@@ -678,10 +750,14 @@
   </dgm:styleLbl>
   <dgm:styleLbl name="solidBgAcc1">
     <dgm:fillClrLst meth="repeat">
-      <a:schemeClr val="lt2"/>
+      <a:schemeClr val="lt1"/>
     </dgm:fillClrLst>
     <dgm:linClrLst meth="repeat">
-      <a:schemeClr val="dk2"/>
+      <a:schemeClr val="accent2"/>
+      <a:schemeClr val="accent3"/>
+      <a:schemeClr val="accent4"/>
+      <a:schemeClr val="accent5"/>
+      <a:schemeClr val="accent6"/>
     </dgm:linClrLst>
     <dgm:effectClrLst/>
     <dgm:txLinClrLst/>
@@ -692,15 +768,47 @@
   </dgm:styleLbl>
   <dgm:styleLbl name="fgAccFollowNode1">
     <dgm:fillClrLst meth="repeat">
-      <a:schemeClr val="dk2">
+      <a:schemeClr val="accent2">
+        <a:tint val="40000"/>
         <a:alpha val="90000"/>
+      </a:schemeClr>
+      <a:schemeClr val="accent3">
         <a:tint val="40000"/>
+        <a:alpha val="90000"/>
+      </a:schemeClr>
+      <a:schemeClr val="accent4">
+        <a:tint val="40000"/>
+        <a:alpha val="90000"/>
+      </a:schemeClr>
+      <a:schemeClr val="accent5">
+        <a:tint val="40000"/>
+        <a:alpha val="90000"/>
+      </a:schemeClr>
+      <a:schemeClr val="accent6">
+        <a:tint val="40000"/>
+        <a:alpha val="90000"/>
       </a:schemeClr>
     </dgm:fillClrLst>
     <dgm:linClrLst meth="repeat">
-      <a:schemeClr val="dk2">
+      <a:schemeClr val="accent2">
+        <a:tint val="40000"/>
         <a:alpha val="90000"/>
+      </a:schemeClr>
+      <a:schemeClr val="accent3">
         <a:tint val="40000"/>
+        <a:alpha val="90000"/>
+      </a:schemeClr>
+      <a:schemeClr val="accent4">
+        <a:tint val="40000"/>
+        <a:alpha val="90000"/>
+      </a:schemeClr>
+      <a:schemeClr val="accent5">
+        <a:tint val="40000"/>
+        <a:alpha val="90000"/>
+      </a:schemeClr>
+      <a:schemeClr val="accent6">
+        <a:tint val="40000"/>
+        <a:alpha val="90000"/>
       </a:schemeClr>
     </dgm:linClrLst>
     <dgm:effectClrLst/>
@@ -712,15 +820,47 @@
   </dgm:styleLbl>
   <dgm:styleLbl name="alignAccFollowNode1">
     <dgm:fillClrLst meth="repeat">
-      <a:schemeClr val="dk2">
+      <a:schemeClr val="accent2">
+        <a:tint val="40000"/>
         <a:alpha val="90000"/>
+      </a:schemeClr>
+      <a:schemeClr val="accent3">
         <a:tint val="40000"/>
+        <a:alpha val="90000"/>
+      </a:schemeClr>
+      <a:schemeClr val="accent4">
+        <a:tint val="40000"/>
+        <a:alpha val="90000"/>
+      </a:schemeClr>
+      <a:schemeClr val="accent5">
+        <a:tint val="40000"/>
+        <a:alpha val="90000"/>
+      </a:schemeClr>
+      <a:schemeClr val="accent6">
+        <a:tint val="40000"/>
+        <a:alpha val="90000"/>
       </a:schemeClr>
     </dgm:fillClrLst>
     <dgm:linClrLst meth="repeat">
-      <a:schemeClr val="dk2">
+      <a:schemeClr val="accent2">
+        <a:tint val="40000"/>
         <a:alpha val="90000"/>
+      </a:schemeClr>
+      <a:schemeClr val="accent3">
         <a:tint val="40000"/>
+        <a:alpha val="90000"/>
+      </a:schemeClr>
+      <a:schemeClr val="accent4">
+        <a:tint val="40000"/>
+        <a:alpha val="90000"/>
+      </a:schemeClr>
+      <a:schemeClr val="accent5">
+        <a:tint val="40000"/>
+        <a:alpha val="90000"/>
+      </a:schemeClr>
+      <a:schemeClr val="accent6">
+        <a:tint val="40000"/>
+        <a:alpha val="90000"/>
       </a:schemeClr>
     </dgm:linClrLst>
     <dgm:effectClrLst/>
@@ -732,15 +872,47 @@
   </dgm:styleLbl>
   <dgm:styleLbl name="bgAccFollowNode1">
     <dgm:fillClrLst meth="repeat">
-      <a:schemeClr val="dk2">
+      <a:schemeClr val="accent2">
+        <a:tint val="40000"/>
         <a:alpha val="90000"/>
+      </a:schemeClr>
+      <a:schemeClr val="accent3">
         <a:tint val="40000"/>
+        <a:alpha val="90000"/>
+      </a:schemeClr>
+      <a:schemeClr val="accent4">
+        <a:tint val="40000"/>
+        <a:alpha val="90000"/>
+      </a:schemeClr>
+      <a:schemeClr val="accent5">
+        <a:tint val="40000"/>
+        <a:alpha val="90000"/>
+      </a:schemeClr>
+      <a:schemeClr val="accent6">
+        <a:tint val="40000"/>
+        <a:alpha val="90000"/>
       </a:schemeClr>
     </dgm:fillClrLst>
     <dgm:linClrLst meth="repeat">
-      <a:schemeClr val="dk2">
+      <a:schemeClr val="accent2">
+        <a:tint val="40000"/>
         <a:alpha val="90000"/>
+      </a:schemeClr>
+      <a:schemeClr val="accent3">
         <a:tint val="40000"/>
+        <a:alpha val="90000"/>
+      </a:schemeClr>
+      <a:schemeClr val="accent4">
+        <a:tint val="40000"/>
+        <a:alpha val="90000"/>
+      </a:schemeClr>
+      <a:schemeClr val="accent5">
+        <a:tint val="40000"/>
+        <a:alpha val="90000"/>
+      </a:schemeClr>
+      <a:schemeClr val="accent6">
+        <a:tint val="40000"/>
+        <a:alpha val="90000"/>
       </a:schemeClr>
     </dgm:linClrLst>
     <dgm:effectClrLst/>
@@ -752,12 +924,12 @@
   </dgm:styleLbl>
   <dgm:styleLbl name="fgAcc0">
     <dgm:fillClrLst meth="repeat">
-      <a:schemeClr val="lt2">
+      <a:schemeClr val="lt1">
         <a:alpha val="90000"/>
       </a:schemeClr>
     </dgm:fillClrLst>
-    <dgm:linClrLst meth="repeat">
-      <a:schemeClr val="dk2"/>
+    <dgm:linClrLst>
+      <a:schemeClr val="accent1"/>
     </dgm:linClrLst>
     <dgm:effectClrLst/>
     <dgm:txLinClrLst/>
@@ -768,12 +940,12 @@
   </dgm:styleLbl>
   <dgm:styleLbl name="fgAcc2">
     <dgm:fillClrLst meth="repeat">
-      <a:schemeClr val="lt2">
+      <a:schemeClr val="lt1">
         <a:alpha val="90000"/>
       </a:schemeClr>
     </dgm:fillClrLst>
-    <dgm:linClrLst meth="repeat">
-      <a:schemeClr val="dk2"/>
+    <dgm:linClrLst>
+      <a:schemeClr val="accent2"/>
     </dgm:linClrLst>
     <dgm:effectClrLst/>
     <dgm:txLinClrLst/>
@@ -784,12 +956,12 @@
   </dgm:styleLbl>
   <dgm:styleLbl name="fgAcc3">
     <dgm:fillClrLst meth="repeat">
-      <a:schemeClr val="lt2">
+      <a:schemeClr val="lt1">
         <a:alpha val="90000"/>
       </a:schemeClr>
     </dgm:fillClrLst>
-    <dgm:linClrLst meth="repeat">
-      <a:schemeClr val="dk2"/>
+    <dgm:linClrLst>
+      <a:schemeClr val="accent3"/>
     </dgm:linClrLst>
     <dgm:effectClrLst/>
     <dgm:txLinClrLst/>
@@ -800,12 +972,12 @@
   </dgm:styleLbl>
   <dgm:styleLbl name="fgAcc4">
     <dgm:fillClrLst meth="repeat">
-      <a:schemeClr val="lt2">
+      <a:schemeClr val="lt1">
         <a:alpha val="90000"/>
       </a:schemeClr>
     </dgm:fillClrLst>
-    <dgm:linClrLst meth="repeat">
-      <a:schemeClr val="dk2"/>
+    <dgm:linClrLst>
+      <a:schemeClr val="accent4"/>
     </dgm:linClrLst>
     <dgm:effectClrLst/>
     <dgm:txLinClrLst/>
@@ -816,12 +988,12 @@
   </dgm:styleLbl>
   <dgm:styleLbl name="bgShp">
     <dgm:fillClrLst meth="repeat">
-      <a:schemeClr val="dk2">
+      <a:schemeClr val="accent2">
         <a:tint val="40000"/>
       </a:schemeClr>
     </dgm:fillClrLst>
     <dgm:linClrLst meth="repeat">
-      <a:schemeClr val="dk2"/>
+      <a:schemeClr val="dk1"/>
     </dgm:linClrLst>
     <dgm:effectClrLst/>
     <dgm:txLinClrLst/>
@@ -832,12 +1004,12 @@
   </dgm:styleLbl>
   <dgm:styleLbl name="dkBgShp">
     <dgm:fillClrLst meth="repeat">
-      <a:schemeClr val="dk2">
-        <a:shade val="80000"/>
+      <a:schemeClr val="accent2">
+        <a:shade val="90000"/>
       </a:schemeClr>
     </dgm:fillClrLst>
     <dgm:linClrLst meth="repeat">
-      <a:schemeClr val="dk2"/>
+      <a:schemeClr val="dk1"/>
     </dgm:linClrLst>
     <dgm:effectClrLst/>
     <dgm:txLinClrLst/>
@@ -848,13 +1020,13 @@
   </dgm:styleLbl>
   <dgm:styleLbl name="trBgShp">
     <dgm:fillClrLst meth="repeat">
-      <a:schemeClr val="dk2">
+      <a:schemeClr val="accent1">
         <a:tint val="50000"/>
         <a:alpha val="40000"/>
       </a:schemeClr>
     </dgm:fillClrLst>
     <dgm:linClrLst meth="repeat">
-      <a:schemeClr val="dk2"/>
+      <a:schemeClr val="accent2"/>
     </dgm:linClrLst>
     <dgm:effectClrLst/>
     <dgm:txLinClrLst/>
@@ -865,12 +1037,12 @@
   </dgm:styleLbl>
   <dgm:styleLbl name="fgShp">
     <dgm:fillClrLst meth="repeat">
-      <a:schemeClr val="dk2">
-        <a:tint val="60000"/>
+      <a:schemeClr val="accent2">
+        <a:tint val="40000"/>
       </a:schemeClr>
     </dgm:fillClrLst>
     <dgm:linClrLst meth="repeat">
-      <a:schemeClr val="lt2"/>
+      <a:schemeClr val="lt1"/>
     </dgm:linClrLst>
     <dgm:effectClrLst/>
     <dgm:txLinClrLst/>
@@ -881,7 +1053,7 @@
   </dgm:styleLbl>
   <dgm:styleLbl name="revTx">
     <dgm:fillClrLst meth="repeat">
-      <a:schemeClr val="lt2">
+      <a:schemeClr val="lt1">
         <a:alpha val="0"/>
       </a:schemeClr>
     </dgm:fillClrLst>
@@ -904,11 +1076,11 @@
 <dgm:dataModel xmlns:dgm="http://schemas.openxmlformats.org/drawingml/2006/diagram" xmlns:a="http://schemas.openxmlformats.org/drawingml/2006/main">
   <dgm:ptLst>
     <dgm:pt modelId="{D75A9632-4EB0-4862-92FF-00CF01BE2205}" type="doc">
-      <dgm:prSet loTypeId="urn:microsoft.com/office/officeart/2005/8/layout/hierarchy1" loCatId="hierarchy" qsTypeId="urn:microsoft.com/office/officeart/2005/8/quickstyle/simple1" qsCatId="simple" csTypeId="urn:microsoft.com/office/officeart/2005/8/colors/accent0_3" csCatId="mainScheme" phldr="1"/>
+      <dgm:prSet loTypeId="urn:microsoft.com/office/officeart/2009/3/layout/HorizontalOrganizationChart" loCatId="hierarchy" qsTypeId="urn:microsoft.com/office/officeart/2005/8/quickstyle/simple2" qsCatId="simple" csTypeId="urn:microsoft.com/office/officeart/2005/8/colors/colorful1" csCatId="colorful" phldr="1"/>
       <dgm:spPr/>
     </dgm:pt>
     <dgm:pt modelId="{5D3F0ED0-2EB6-453D-BE4B-4BBCD8987238}">
-      <dgm:prSet phldrT="[Text]"/>
+      <dgm:prSet phldrT="[Text]" custT="1"/>
       <dgm:spPr/>
       <dgm:t>
         <a:bodyPr rtlCol="0"/>
@@ -918,7 +1090,7 @@
             <a:defRPr b="1"/>
           </a:pPr>
           <a:r>
-            <a:rPr lang="de-DE" noProof="0"/>
+            <a:rPr lang="de-DE" sz="2400" noProof="0" dirty="0"/>
             <a:t>Einführung</a:t>
           </a:r>
         </a:p>
@@ -949,7 +1121,7 @@
       </dgm:t>
     </dgm:pt>
     <dgm:pt modelId="{00C4C7D7-43FB-4C62-B653-0BAA02E17855}">
-      <dgm:prSet phldrT="[Text]"/>
+      <dgm:prSet phldrT="[Text]" custT="1"/>
       <dgm:spPr/>
       <dgm:t>
         <a:bodyPr rtlCol="0"/>
@@ -959,8 +1131,8 @@
             <a:defRPr b="1"/>
           </a:pPr>
           <a:r>
-            <a:rPr lang="de-DE" noProof="0"/>
-            <a:t>Code &amp; GitHub</a:t>
+            <a:rPr lang="de-DE" sz="2400" noProof="0" dirty="0"/>
+            <a:t>Datenbank</a:t>
           </a:r>
         </a:p>
       </dgm:t>
@@ -990,7 +1162,7 @@
       </dgm:t>
     </dgm:pt>
     <dgm:pt modelId="{BE3AF4B6-F5EC-44DF-9BDC-CB79D95FB3F4}">
-      <dgm:prSet phldrT="[Text]"/>
+      <dgm:prSet phldrT="[Text]" custT="1"/>
       <dgm:spPr/>
       <dgm:t>
         <a:bodyPr rtlCol="0"/>
@@ -1000,9 +1172,18 @@
             <a:defRPr b="1"/>
           </a:pPr>
           <a:r>
-            <a:rPr lang="de-DE" noProof="0"/>
-            <a:t>Ausblick</a:t>
+            <a:rPr lang="de-DE" sz="2400" noProof="0" dirty="0" err="1"/>
+            <a:t>Lessons</a:t>
           </a:r>
+          <a:r>
+            <a:rPr lang="de-DE" sz="2400" noProof="0" dirty="0"/>
+            <a:t> </a:t>
+          </a:r>
+          <a:r>
+            <a:rPr lang="de-DE" sz="2400" noProof="0" dirty="0" err="1"/>
+            <a:t>Learned</a:t>
+          </a:r>
+          <a:endParaRPr lang="de-DE" sz="2400" noProof="0" dirty="0"/>
         </a:p>
       </dgm:t>
     </dgm:pt>
@@ -1030,9 +1211,88 @@
         </a:p>
       </dgm:t>
     </dgm:pt>
-    <dgm:pt modelId="{32A61121-97A1-4958-B0D0-1E06DF59C946}" type="pres">
+    <dgm:pt modelId="{70668596-E9CC-4698-8A01-016E1F8E6F46}">
+      <dgm:prSet phldrT="[Text]" custT="1"/>
+      <dgm:spPr/>
+      <dgm:t>
+        <a:bodyPr rtlCol="0"/>
+        <a:lstStyle/>
+        <a:p>
+          <a:pPr>
+            <a:defRPr b="1"/>
+          </a:pPr>
+          <a:r>
+            <a:rPr lang="de-DE" sz="2400" noProof="0" dirty="0"/>
+            <a:t>Deploy</a:t>
+          </a:r>
+        </a:p>
+      </dgm:t>
+    </dgm:pt>
+    <dgm:pt modelId="{EDF271CF-D42E-45D0-9334-04FCF1DA506D}" type="parTrans" cxnId="{2A67421D-9466-4AA7-94C4-520139CC6858}">
+      <dgm:prSet/>
+      <dgm:spPr/>
+      <dgm:t>
+        <a:bodyPr/>
+        <a:lstStyle/>
+        <a:p>
+          <a:endParaRPr lang="de-DE"/>
+        </a:p>
+      </dgm:t>
+    </dgm:pt>
+    <dgm:pt modelId="{0B80253E-7ED3-4310-B077-01D55AE1071C}" type="sibTrans" cxnId="{2A67421D-9466-4AA7-94C4-520139CC6858}">
+      <dgm:prSet/>
+      <dgm:spPr/>
+      <dgm:t>
+        <a:bodyPr/>
+        <a:lstStyle/>
+        <a:p>
+          <a:endParaRPr lang="de-DE"/>
+        </a:p>
+      </dgm:t>
+    </dgm:pt>
+    <dgm:pt modelId="{4EE0A925-BC89-490E-B3C5-D5596FBAB247}">
+      <dgm:prSet phldrT="[Text]" custT="1"/>
+      <dgm:spPr/>
+      <dgm:t>
+        <a:bodyPr rtlCol="0"/>
+        <a:lstStyle/>
+        <a:p>
+          <a:pPr>
+            <a:defRPr b="1"/>
+          </a:pPr>
+          <a:r>
+            <a:rPr lang="de-DE" sz="2400" noProof="0" dirty="0"/>
+            <a:t>Test der Webseite</a:t>
+          </a:r>
+        </a:p>
+      </dgm:t>
+    </dgm:pt>
+    <dgm:pt modelId="{F176E636-3CF0-4BA9-AED5-64B011671E0C}" type="parTrans" cxnId="{641DD2F8-EE5B-49FB-AD42-13F8DDA1D2E7}">
+      <dgm:prSet/>
+      <dgm:spPr/>
+      <dgm:t>
+        <a:bodyPr/>
+        <a:lstStyle/>
+        <a:p>
+          <a:endParaRPr lang="de-DE"/>
+        </a:p>
+      </dgm:t>
+    </dgm:pt>
+    <dgm:pt modelId="{A715DD85-F2D3-41E4-B95D-11DAEE82F83F}" type="sibTrans" cxnId="{641DD2F8-EE5B-49FB-AD42-13F8DDA1D2E7}">
+      <dgm:prSet/>
+      <dgm:spPr/>
+      <dgm:t>
+        <a:bodyPr/>
+        <a:lstStyle/>
+        <a:p>
+          <a:endParaRPr lang="de-DE"/>
+        </a:p>
+      </dgm:t>
+    </dgm:pt>
+    <dgm:pt modelId="{9D47FB11-33B4-48E9-9FC2-A65E51265124}" type="pres">
       <dgm:prSet presAssocID="{D75A9632-4EB0-4862-92FF-00CF01BE2205}" presName="hierChild1" presStyleCnt="0">
         <dgm:presLayoutVars>
+          <dgm:orgChart val="1"/>
           <dgm:chPref val="1"/>
           <dgm:dir/>
           <dgm:animOne val="branch"/>
@@ -1042,114 +1302,214 @@
       </dgm:prSet>
       <dgm:spPr/>
     </dgm:pt>
-    <dgm:pt modelId="{14F20E5F-592C-4F6A-9B78-E98F27BD167E}" type="pres">
-      <dgm:prSet presAssocID="{5D3F0ED0-2EB6-453D-BE4B-4BBCD8987238}" presName="hierRoot1" presStyleCnt="0"/>
+    <dgm:pt modelId="{BDBAD208-8CA8-47D3-8F7E-7E9D4BD1B67F}" type="pres">
+      <dgm:prSet presAssocID="{5D3F0ED0-2EB6-453D-BE4B-4BBCD8987238}" presName="hierRoot1" presStyleCnt="0">
+        <dgm:presLayoutVars>
+          <dgm:hierBranch val="init"/>
+        </dgm:presLayoutVars>
+      </dgm:prSet>
       <dgm:spPr/>
     </dgm:pt>
-    <dgm:pt modelId="{70F6417A-6C70-4091-913D-F06529B2591B}" type="pres">
-      <dgm:prSet presAssocID="{5D3F0ED0-2EB6-453D-BE4B-4BBCD8987238}" presName="composite" presStyleCnt="0"/>
+    <dgm:pt modelId="{D21E5021-6EA3-4D37-BD50-E8DDA292EE3B}" type="pres">
+      <dgm:prSet presAssocID="{5D3F0ED0-2EB6-453D-BE4B-4BBCD8987238}" presName="rootComposite1" presStyleCnt="0"/>
       <dgm:spPr/>
     </dgm:pt>
-    <dgm:pt modelId="{1B82647E-CED8-49BA-8D89-D2249CACF199}" type="pres">
-      <dgm:prSet presAssocID="{5D3F0ED0-2EB6-453D-BE4B-4BBCD8987238}" presName="background" presStyleLbl="node0" presStyleIdx="0" presStyleCnt="3"/>
-      <dgm:spPr>
-        <a:solidFill>
-          <a:srgbClr val="EC6708"/>
-        </a:solidFill>
-      </dgm:spPr>
-    </dgm:pt>
-    <dgm:pt modelId="{959C8971-5DCD-4EFF-AC83-166D3649C360}" type="pres">
-      <dgm:prSet presAssocID="{5D3F0ED0-2EB6-453D-BE4B-4BBCD8987238}" presName="text" presStyleLbl="fgAcc0" presStyleIdx="0" presStyleCnt="3" custLinFactNeighborX="1389" custLinFactNeighborY="-3031">
+    <dgm:pt modelId="{922FAB3C-8DC6-4B4E-81BA-6DD29440B0AC}" type="pres">
+      <dgm:prSet presAssocID="{5D3F0ED0-2EB6-453D-BE4B-4BBCD8987238}" presName="rootText1" presStyleLbl="node0" presStyleIdx="0" presStyleCnt="5" custScaleX="86125" custScaleY="64833">
         <dgm:presLayoutVars>
           <dgm:chPref val="3"/>
         </dgm:presLayoutVars>
       </dgm:prSet>
       <dgm:spPr/>
     </dgm:pt>
-    <dgm:pt modelId="{BD23D1EB-AF80-47F0-944A-E1B8B84F97B2}" type="pres">
+    <dgm:pt modelId="{AF494A36-726F-4260-932B-5405377148C7}" type="pres">
+      <dgm:prSet presAssocID="{5D3F0ED0-2EB6-453D-BE4B-4BBCD8987238}" presName="rootConnector1" presStyleLbl="node1" presStyleIdx="0" presStyleCnt="0"/>
+      <dgm:spPr/>
+    </dgm:pt>
+    <dgm:pt modelId="{4B59475B-4E00-4BA1-B33C-E6ADE2B908F7}" type="pres">
       <dgm:prSet presAssocID="{5D3F0ED0-2EB6-453D-BE4B-4BBCD8987238}" presName="hierChild2" presStyleCnt="0"/>
       <dgm:spPr/>
     </dgm:pt>
-    <dgm:pt modelId="{DB987D15-88C7-45FE-AFC7-E502FD60A4C2}" type="pres">
-      <dgm:prSet presAssocID="{00C4C7D7-43FB-4C62-B653-0BAA02E17855}" presName="hierRoot1" presStyleCnt="0"/>
+    <dgm:pt modelId="{161E1A74-A59D-4967-9D20-F98B267ECE6B}" type="pres">
+      <dgm:prSet presAssocID="{5D3F0ED0-2EB6-453D-BE4B-4BBCD8987238}" presName="hierChild3" presStyleCnt="0"/>
       <dgm:spPr/>
     </dgm:pt>
-    <dgm:pt modelId="{6B8E2C20-9768-4F2F-A466-F92819857719}" type="pres">
-      <dgm:prSet presAssocID="{00C4C7D7-43FB-4C62-B653-0BAA02E17855}" presName="composite" presStyleCnt="0"/>
+    <dgm:pt modelId="{F925AEFA-5F16-456D-84F0-FC1303A2A3C9}" type="pres">
+      <dgm:prSet presAssocID="{00C4C7D7-43FB-4C62-B653-0BAA02E17855}" presName="hierRoot1" presStyleCnt="0">
+        <dgm:presLayoutVars>
+          <dgm:hierBranch val="init"/>
+        </dgm:presLayoutVars>
+      </dgm:prSet>
       <dgm:spPr/>
     </dgm:pt>
-    <dgm:pt modelId="{918247F9-6A97-459A-BC35-68C3CE52B22F}" type="pres">
-      <dgm:prSet presAssocID="{00C4C7D7-43FB-4C62-B653-0BAA02E17855}" presName="background" presStyleLbl="node0" presStyleIdx="1" presStyleCnt="3"/>
-      <dgm:spPr>
-        <a:solidFill>
-          <a:srgbClr val="EC6708"/>
-        </a:solidFill>
-      </dgm:spPr>
+    <dgm:pt modelId="{086C9DBA-88A8-4531-87B9-51357D0CEE70}" type="pres">
+      <dgm:prSet presAssocID="{00C4C7D7-43FB-4C62-B653-0BAA02E17855}" presName="rootComposite1" presStyleCnt="0"/>
+      <dgm:spPr/>
     </dgm:pt>
-    <dgm:pt modelId="{C743947A-1839-4A13-83E7-48579395E738}" type="pres">
-      <dgm:prSet presAssocID="{00C4C7D7-43FB-4C62-B653-0BAA02E17855}" presName="text" presStyleLbl="fgAcc0" presStyleIdx="1" presStyleCnt="3">
+    <dgm:pt modelId="{C483AB77-D90E-4834-8F4B-1826FF0CA448}" type="pres">
+      <dgm:prSet presAssocID="{00C4C7D7-43FB-4C62-B653-0BAA02E17855}" presName="rootText1" presStyleLbl="node0" presStyleIdx="1" presStyleCnt="5" custScaleX="86125" custScaleY="64833">
         <dgm:presLayoutVars>
           <dgm:chPref val="3"/>
         </dgm:presLayoutVars>
       </dgm:prSet>
       <dgm:spPr/>
     </dgm:pt>
-    <dgm:pt modelId="{8B431503-FB7C-4C91-9D9B-B0A1C4946F48}" type="pres">
+    <dgm:pt modelId="{686DB669-0E09-480A-A0B5-4B64F05B70FF}" type="pres">
+      <dgm:prSet presAssocID="{00C4C7D7-43FB-4C62-B653-0BAA02E17855}" presName="rootConnector1" presStyleLbl="node1" presStyleIdx="0" presStyleCnt="0"/>
+      <dgm:spPr/>
+    </dgm:pt>
+    <dgm:pt modelId="{2943712B-9774-446D-BFB1-89A0C6229DDF}" type="pres">
       <dgm:prSet presAssocID="{00C4C7D7-43FB-4C62-B653-0BAA02E17855}" presName="hierChild2" presStyleCnt="0"/>
       <dgm:spPr/>
     </dgm:pt>
-    <dgm:pt modelId="{A6568810-DF20-4D5A-8B9D-7728E0067891}" type="pres">
-      <dgm:prSet presAssocID="{BE3AF4B6-F5EC-44DF-9BDC-CB79D95FB3F4}" presName="hierRoot1" presStyleCnt="0"/>
+    <dgm:pt modelId="{6BA1B9EE-C685-4453-B26C-B93B4865A248}" type="pres">
+      <dgm:prSet presAssocID="{00C4C7D7-43FB-4C62-B653-0BAA02E17855}" presName="hierChild3" presStyleCnt="0"/>
       <dgm:spPr/>
     </dgm:pt>
-    <dgm:pt modelId="{35B586C2-1932-460A-A32E-7789990A236D}" type="pres">
-      <dgm:prSet presAssocID="{BE3AF4B6-F5EC-44DF-9BDC-CB79D95FB3F4}" presName="composite" presStyleCnt="0"/>
+    <dgm:pt modelId="{5045EEA0-283A-41CD-BB8A-79B09CC08BE6}" type="pres">
+      <dgm:prSet presAssocID="{70668596-E9CC-4698-8A01-016E1F8E6F46}" presName="hierRoot1" presStyleCnt="0">
+        <dgm:presLayoutVars>
+          <dgm:hierBranch val="init"/>
+        </dgm:presLayoutVars>
+      </dgm:prSet>
       <dgm:spPr/>
     </dgm:pt>
-    <dgm:pt modelId="{933DD7AA-51C0-4607-BBAC-582296A91BA1}" type="pres">
-      <dgm:prSet presAssocID="{BE3AF4B6-F5EC-44DF-9BDC-CB79D95FB3F4}" presName="background" presStyleLbl="node0" presStyleIdx="2" presStyleCnt="3"/>
-      <dgm:spPr>
-        <a:solidFill>
-          <a:srgbClr val="EC6708"/>
-        </a:solidFill>
-      </dgm:spPr>
+    <dgm:pt modelId="{010E815E-4072-4F73-B355-7B2DBBC7B567}" type="pres">
+      <dgm:prSet presAssocID="{70668596-E9CC-4698-8A01-016E1F8E6F46}" presName="rootComposite1" presStyleCnt="0"/>
+      <dgm:spPr/>
     </dgm:pt>
-    <dgm:pt modelId="{0FC1B650-5189-40CE-B2A6-146C015C90A6}" type="pres">
-      <dgm:prSet presAssocID="{BE3AF4B6-F5EC-44DF-9BDC-CB79D95FB3F4}" presName="text" presStyleLbl="fgAcc0" presStyleIdx="2" presStyleCnt="3">
+    <dgm:pt modelId="{D07A68CE-9D6F-4E41-9D4F-EBA802447EC3}" type="pres">
+      <dgm:prSet presAssocID="{70668596-E9CC-4698-8A01-016E1F8E6F46}" presName="rootText1" presStyleLbl="node0" presStyleIdx="2" presStyleCnt="5" custScaleX="86125" custScaleY="64833">
         <dgm:presLayoutVars>
           <dgm:chPref val="3"/>
         </dgm:presLayoutVars>
       </dgm:prSet>
       <dgm:spPr/>
     </dgm:pt>
-    <dgm:pt modelId="{408A615F-8A62-4C9A-9D5F-5312A6C298B5}" type="pres">
+    <dgm:pt modelId="{867AF7C8-8088-4633-9689-A720BCEADAC7}" type="pres">
+      <dgm:prSet presAssocID="{70668596-E9CC-4698-8A01-016E1F8E6F46}" presName="rootConnector1" presStyleLbl="node1" presStyleIdx="0" presStyleCnt="0"/>
+      <dgm:spPr/>
+    </dgm:pt>
+    <dgm:pt modelId="{6B0FDB1F-4641-44EC-8B09-5FB7A39262A0}" type="pres">
+      <dgm:prSet presAssocID="{70668596-E9CC-4698-8A01-016E1F8E6F46}" presName="hierChild2" presStyleCnt="0"/>
+      <dgm:spPr/>
+    </dgm:pt>
+    <dgm:pt modelId="{3857C2AF-DE74-46FF-934A-37015C6C72F3}" type="pres">
+      <dgm:prSet presAssocID="{70668596-E9CC-4698-8A01-016E1F8E6F46}" presName="hierChild3" presStyleCnt="0"/>
+      <dgm:spPr/>
+    </dgm:pt>
+    <dgm:pt modelId="{D12E04D6-E8DC-4EA5-817E-5B921BFD4BD4}" type="pres">
+      <dgm:prSet presAssocID="{4EE0A925-BC89-490E-B3C5-D5596FBAB247}" presName="hierRoot1" presStyleCnt="0">
+        <dgm:presLayoutVars>
+          <dgm:hierBranch val="init"/>
+        </dgm:presLayoutVars>
+      </dgm:prSet>
+      <dgm:spPr/>
+    </dgm:pt>
+    <dgm:pt modelId="{71462CEA-2518-4798-ABCE-2405CD7B05C4}" type="pres">
+      <dgm:prSet presAssocID="{4EE0A925-BC89-490E-B3C5-D5596FBAB247}" presName="rootComposite1" presStyleCnt="0"/>
+      <dgm:spPr/>
+    </dgm:pt>
+    <dgm:pt modelId="{CCA35A53-8902-4E8E-B56F-6A8F3DDF35D5}" type="pres">
+      <dgm:prSet presAssocID="{4EE0A925-BC89-490E-B3C5-D5596FBAB247}" presName="rootText1" presStyleLbl="node0" presStyleIdx="3" presStyleCnt="5" custScaleX="86125" custScaleY="64833">
+        <dgm:presLayoutVars>
+          <dgm:chPref val="3"/>
+        </dgm:presLayoutVars>
+      </dgm:prSet>
+      <dgm:spPr/>
+    </dgm:pt>
+    <dgm:pt modelId="{EFA00353-B659-414A-854C-B7E689A35818}" type="pres">
+      <dgm:prSet presAssocID="{4EE0A925-BC89-490E-B3C5-D5596FBAB247}" presName="rootConnector1" presStyleLbl="node1" presStyleIdx="0" presStyleCnt="0"/>
+      <dgm:spPr/>
+    </dgm:pt>
+    <dgm:pt modelId="{16E60090-159E-4462-9E46-AC8374EDE2DE}" type="pres">
+      <dgm:prSet presAssocID="{4EE0A925-BC89-490E-B3C5-D5596FBAB247}" presName="hierChild2" presStyleCnt="0"/>
+      <dgm:spPr/>
+    </dgm:pt>
+    <dgm:pt modelId="{B6123800-43A3-415C-AE46-BCDB9031B6B9}" type="pres">
+      <dgm:prSet presAssocID="{4EE0A925-BC89-490E-B3C5-D5596FBAB247}" presName="hierChild3" presStyleCnt="0"/>
+      <dgm:spPr/>
+    </dgm:pt>
+    <dgm:pt modelId="{E701E425-DBA7-4156-8C1C-AF3896A5B8F1}" type="pres">
+      <dgm:prSet presAssocID="{BE3AF4B6-F5EC-44DF-9BDC-CB79D95FB3F4}" presName="hierRoot1" presStyleCnt="0">
+        <dgm:presLayoutVars>
+          <dgm:hierBranch val="init"/>
+        </dgm:presLayoutVars>
+      </dgm:prSet>
+      <dgm:spPr/>
+    </dgm:pt>
+    <dgm:pt modelId="{D69269B0-122E-4426-920E-D896CD3C8267}" type="pres">
+      <dgm:prSet presAssocID="{BE3AF4B6-F5EC-44DF-9BDC-CB79D95FB3F4}" presName="rootComposite1" presStyleCnt="0"/>
+      <dgm:spPr/>
+    </dgm:pt>
+    <dgm:pt modelId="{D0F1789C-5031-4ED2-8612-D54DCD69DF19}" type="pres">
+      <dgm:prSet presAssocID="{BE3AF4B6-F5EC-44DF-9BDC-CB79D95FB3F4}" presName="rootText1" presStyleLbl="node0" presStyleIdx="4" presStyleCnt="5" custScaleX="86125" custScaleY="64833">
+        <dgm:presLayoutVars>
+          <dgm:chPref val="3"/>
+        </dgm:presLayoutVars>
+      </dgm:prSet>
+      <dgm:spPr/>
+    </dgm:pt>
+    <dgm:pt modelId="{7055C870-DF68-441F-899C-8AE927A7E8BD}" type="pres">
+      <dgm:prSet presAssocID="{BE3AF4B6-F5EC-44DF-9BDC-CB79D95FB3F4}" presName="rootConnector1" presStyleLbl="node1" presStyleIdx="0" presStyleCnt="0"/>
+      <dgm:spPr/>
+    </dgm:pt>
+    <dgm:pt modelId="{EFA118CD-DF23-4150-A8E3-6CD0C7266DFE}" type="pres">
       <dgm:prSet presAssocID="{BE3AF4B6-F5EC-44DF-9BDC-CB79D95FB3F4}" presName="hierChild2" presStyleCnt="0"/>
+      <dgm:spPr/>
+    </dgm:pt>
+    <dgm:pt modelId="{B037AB12-1AFA-4B92-9D27-A51DD9C1270E}" type="pres">
+      <dgm:prSet presAssocID="{BE3AF4B6-F5EC-44DF-9BDC-CB79D95FB3F4}" presName="hierChild3" presStyleCnt="0"/>
       <dgm:spPr/>
     </dgm:pt>
   </dgm:ptLst>
   <dgm:cxnLst>
-    <dgm:cxn modelId="{ED69D201-B954-44DA-9249-E739FE69E13E}" type="presOf" srcId="{00C4C7D7-43FB-4C62-B653-0BAA02E17855}" destId="{C743947A-1839-4A13-83E7-48579395E738}" srcOrd="0" destOrd="0" presId="urn:microsoft.com/office/officeart/2005/8/layout/hierarchy1"/>
-    <dgm:cxn modelId="{234E721A-9CE5-4A16-943F-4C22CD1C962B}" type="presOf" srcId="{D75A9632-4EB0-4862-92FF-00CF01BE2205}" destId="{32A61121-97A1-4958-B0D0-1E06DF59C946}" srcOrd="0" destOrd="0" presId="urn:microsoft.com/office/officeart/2005/8/layout/hierarchy1"/>
-    <dgm:cxn modelId="{179F4E1D-8615-43F1-9FE1-9A6DDE890CE6}" type="presOf" srcId="{5D3F0ED0-2EB6-453D-BE4B-4BBCD8987238}" destId="{959C8971-5DCD-4EFF-AC83-166D3649C360}" srcOrd="0" destOrd="0" presId="urn:microsoft.com/office/officeart/2005/8/layout/hierarchy1"/>
-    <dgm:cxn modelId="{8059B95D-5238-487F-9EF9-DC508342BA71}" srcId="{D75A9632-4EB0-4862-92FF-00CF01BE2205}" destId="{BE3AF4B6-F5EC-44DF-9BDC-CB79D95FB3F4}" srcOrd="2" destOrd="0" parTransId="{5DC69E6B-E902-4549-ACA2-C87487FCD048}" sibTransId="{3B148F1D-FDFC-4CDA-B894-16E41EDC0348}"/>
-    <dgm:cxn modelId="{C6792344-E820-4C1F-93F9-155B710A1425}" type="presOf" srcId="{BE3AF4B6-F5EC-44DF-9BDC-CB79D95FB3F4}" destId="{0FC1B650-5189-40CE-B2A6-146C015C90A6}" srcOrd="0" destOrd="0" presId="urn:microsoft.com/office/officeart/2005/8/layout/hierarchy1"/>
+    <dgm:cxn modelId="{2A67421D-9466-4AA7-94C4-520139CC6858}" srcId="{D75A9632-4EB0-4862-92FF-00CF01BE2205}" destId="{70668596-E9CC-4698-8A01-016E1F8E6F46}" srcOrd="2" destOrd="0" parTransId="{EDF271CF-D42E-45D0-9334-04FCF1DA506D}" sibTransId="{0B80253E-7ED3-4310-B077-01D55AE1071C}"/>
+    <dgm:cxn modelId="{A907E01F-93CB-466D-A5C1-4AF2854D4E51}" type="presOf" srcId="{00C4C7D7-43FB-4C62-B653-0BAA02E17855}" destId="{C483AB77-D90E-4834-8F4B-1826FF0CA448}" srcOrd="0" destOrd="0" presId="urn:microsoft.com/office/officeart/2009/3/layout/HorizontalOrganizationChart"/>
+    <dgm:cxn modelId="{7661682C-962B-48FB-B8EB-247678287587}" type="presOf" srcId="{4EE0A925-BC89-490E-B3C5-D5596FBAB247}" destId="{CCA35A53-8902-4E8E-B56F-6A8F3DDF35D5}" srcOrd="0" destOrd="0" presId="urn:microsoft.com/office/officeart/2009/3/layout/HorizontalOrganizationChart"/>
+    <dgm:cxn modelId="{947DA031-960C-4336-A377-EC247512A20F}" type="presOf" srcId="{70668596-E9CC-4698-8A01-016E1F8E6F46}" destId="{D07A68CE-9D6F-4E41-9D4F-EBA802447EC3}" srcOrd="0" destOrd="0" presId="urn:microsoft.com/office/officeart/2009/3/layout/HorizontalOrganizationChart"/>
+    <dgm:cxn modelId="{C638373B-8679-43D2-975A-C8F6F18B597A}" type="presOf" srcId="{00C4C7D7-43FB-4C62-B653-0BAA02E17855}" destId="{686DB669-0E09-480A-A0B5-4B64F05B70FF}" srcOrd="1" destOrd="0" presId="urn:microsoft.com/office/officeart/2009/3/layout/HorizontalOrganizationChart"/>
+    <dgm:cxn modelId="{F96A083D-1A4B-499F-98FF-D7DEFFDA9101}" type="presOf" srcId="{BE3AF4B6-F5EC-44DF-9BDC-CB79D95FB3F4}" destId="{7055C870-DF68-441F-899C-8AE927A7E8BD}" srcOrd="1" destOrd="0" presId="urn:microsoft.com/office/officeart/2009/3/layout/HorizontalOrganizationChart"/>
+    <dgm:cxn modelId="{57397D3E-2374-404D-8858-2B9A395EEB21}" type="presOf" srcId="{4EE0A925-BC89-490E-B3C5-D5596FBAB247}" destId="{EFA00353-B659-414A-854C-B7E689A35818}" srcOrd="1" destOrd="0" presId="urn:microsoft.com/office/officeart/2009/3/layout/HorizontalOrganizationChart"/>
+    <dgm:cxn modelId="{8059B95D-5238-487F-9EF9-DC508342BA71}" srcId="{D75A9632-4EB0-4862-92FF-00CF01BE2205}" destId="{BE3AF4B6-F5EC-44DF-9BDC-CB79D95FB3F4}" srcOrd="4" destOrd="0" parTransId="{5DC69E6B-E902-4549-ACA2-C87487FCD048}" sibTransId="{3B148F1D-FDFC-4CDA-B894-16E41EDC0348}"/>
+    <dgm:cxn modelId="{4D30D27A-A291-479A-A188-656286E7BA8F}" type="presOf" srcId="{70668596-E9CC-4698-8A01-016E1F8E6F46}" destId="{867AF7C8-8088-4633-9689-A720BCEADAC7}" srcOrd="1" destOrd="0" presId="urn:microsoft.com/office/officeart/2009/3/layout/HorizontalOrganizationChart"/>
     <dgm:cxn modelId="{6013628C-81BE-42D0-96B9-999F0382D570}" srcId="{D75A9632-4EB0-4862-92FF-00CF01BE2205}" destId="{00C4C7D7-43FB-4C62-B653-0BAA02E17855}" srcOrd="1" destOrd="0" parTransId="{D3913AE7-4A70-4B94-8990-85FA8AA36E6B}" sibTransId="{26407BAA-24CA-40B6-A34E-07DAAD20ECB5}"/>
     <dgm:cxn modelId="{DC7A4FA1-590E-402E-B3C9-432D9D9BC84E}" srcId="{D75A9632-4EB0-4862-92FF-00CF01BE2205}" destId="{5D3F0ED0-2EB6-453D-BE4B-4BBCD8987238}" srcOrd="0" destOrd="0" parTransId="{D6F3F8CC-AE84-4149-B520-1874B1B79F46}" sibTransId="{2E2BF50E-B394-4636-BF63-257039995E33}"/>
-    <dgm:cxn modelId="{9003FB7A-06DB-4DCD-BD1C-1F84CC772066}" type="presParOf" srcId="{32A61121-97A1-4958-B0D0-1E06DF59C946}" destId="{14F20E5F-592C-4F6A-9B78-E98F27BD167E}" srcOrd="0" destOrd="0" presId="urn:microsoft.com/office/officeart/2005/8/layout/hierarchy1"/>
-    <dgm:cxn modelId="{403E4EBD-6C47-4154-B0EC-BC1A4F5D396D}" type="presParOf" srcId="{14F20E5F-592C-4F6A-9B78-E98F27BD167E}" destId="{70F6417A-6C70-4091-913D-F06529B2591B}" srcOrd="0" destOrd="0" presId="urn:microsoft.com/office/officeart/2005/8/layout/hierarchy1"/>
-    <dgm:cxn modelId="{3BEC1641-9391-4C28-BFFB-95F4E48F80BD}" type="presParOf" srcId="{70F6417A-6C70-4091-913D-F06529B2591B}" destId="{1B82647E-CED8-49BA-8D89-D2249CACF199}" srcOrd="0" destOrd="0" presId="urn:microsoft.com/office/officeart/2005/8/layout/hierarchy1"/>
-    <dgm:cxn modelId="{537B977D-E11A-4044-A2E8-57AF7D1DB954}" type="presParOf" srcId="{70F6417A-6C70-4091-913D-F06529B2591B}" destId="{959C8971-5DCD-4EFF-AC83-166D3649C360}" srcOrd="1" destOrd="0" presId="urn:microsoft.com/office/officeart/2005/8/layout/hierarchy1"/>
-    <dgm:cxn modelId="{18FD453C-28BB-4BB7-BFF1-930185AE8889}" type="presParOf" srcId="{14F20E5F-592C-4F6A-9B78-E98F27BD167E}" destId="{BD23D1EB-AF80-47F0-944A-E1B8B84F97B2}" srcOrd="1" destOrd="0" presId="urn:microsoft.com/office/officeart/2005/8/layout/hierarchy1"/>
-    <dgm:cxn modelId="{4EF55463-BC8E-4892-A281-BC75967690BB}" type="presParOf" srcId="{32A61121-97A1-4958-B0D0-1E06DF59C946}" destId="{DB987D15-88C7-45FE-AFC7-E502FD60A4C2}" srcOrd="1" destOrd="0" presId="urn:microsoft.com/office/officeart/2005/8/layout/hierarchy1"/>
-    <dgm:cxn modelId="{EE102A13-A1E5-4003-BC47-BE1A377D982C}" type="presParOf" srcId="{DB987D15-88C7-45FE-AFC7-E502FD60A4C2}" destId="{6B8E2C20-9768-4F2F-A466-F92819857719}" srcOrd="0" destOrd="0" presId="urn:microsoft.com/office/officeart/2005/8/layout/hierarchy1"/>
-    <dgm:cxn modelId="{B61F4A82-0554-48BE-9632-91B0F639F5A5}" type="presParOf" srcId="{6B8E2C20-9768-4F2F-A466-F92819857719}" destId="{918247F9-6A97-459A-BC35-68C3CE52B22F}" srcOrd="0" destOrd="0" presId="urn:microsoft.com/office/officeart/2005/8/layout/hierarchy1"/>
-    <dgm:cxn modelId="{77B68955-60B9-4A1E-ACEE-5402E3424AB5}" type="presParOf" srcId="{6B8E2C20-9768-4F2F-A466-F92819857719}" destId="{C743947A-1839-4A13-83E7-48579395E738}" srcOrd="1" destOrd="0" presId="urn:microsoft.com/office/officeart/2005/8/layout/hierarchy1"/>
-    <dgm:cxn modelId="{C9B39F57-6162-4CD4-90EC-E836E0B9B6B0}" type="presParOf" srcId="{DB987D15-88C7-45FE-AFC7-E502FD60A4C2}" destId="{8B431503-FB7C-4C91-9D9B-B0A1C4946F48}" srcOrd="1" destOrd="0" presId="urn:microsoft.com/office/officeart/2005/8/layout/hierarchy1"/>
-    <dgm:cxn modelId="{879A11FE-21F5-4843-953A-8B8D52EC684F}" type="presParOf" srcId="{32A61121-97A1-4958-B0D0-1E06DF59C946}" destId="{A6568810-DF20-4D5A-8B9D-7728E0067891}" srcOrd="2" destOrd="0" presId="urn:microsoft.com/office/officeart/2005/8/layout/hierarchy1"/>
-    <dgm:cxn modelId="{D9030D0A-7763-4030-A53E-CC17AA613FE5}" type="presParOf" srcId="{A6568810-DF20-4D5A-8B9D-7728E0067891}" destId="{35B586C2-1932-460A-A32E-7789990A236D}" srcOrd="0" destOrd="0" presId="urn:microsoft.com/office/officeart/2005/8/layout/hierarchy1"/>
-    <dgm:cxn modelId="{19419A2A-1FC2-4400-9C05-E9A7D40CBA27}" type="presParOf" srcId="{35B586C2-1932-460A-A32E-7789990A236D}" destId="{933DD7AA-51C0-4607-BBAC-582296A91BA1}" srcOrd="0" destOrd="0" presId="urn:microsoft.com/office/officeart/2005/8/layout/hierarchy1"/>
-    <dgm:cxn modelId="{F81D876D-950A-4939-AE99-B34F15216BBE}" type="presParOf" srcId="{35B586C2-1932-460A-A32E-7789990A236D}" destId="{0FC1B650-5189-40CE-B2A6-146C015C90A6}" srcOrd="1" destOrd="0" presId="urn:microsoft.com/office/officeart/2005/8/layout/hierarchy1"/>
-    <dgm:cxn modelId="{E0A18284-C055-4D30-9D07-24378B880601}" type="presParOf" srcId="{A6568810-DF20-4D5A-8B9D-7728E0067891}" destId="{408A615F-8A62-4C9A-9D5F-5312A6C298B5}" srcOrd="1" destOrd="0" presId="urn:microsoft.com/office/officeart/2005/8/layout/hierarchy1"/>
+    <dgm:cxn modelId="{3D0C1AA3-0AFA-4F6D-82DC-F890DA11ACAC}" type="presOf" srcId="{5D3F0ED0-2EB6-453D-BE4B-4BBCD8987238}" destId="{AF494A36-726F-4260-932B-5405377148C7}" srcOrd="1" destOrd="0" presId="urn:microsoft.com/office/officeart/2009/3/layout/HorizontalOrganizationChart"/>
+    <dgm:cxn modelId="{F6B368BB-52FC-49B9-908A-11444FC1A02F}" type="presOf" srcId="{5D3F0ED0-2EB6-453D-BE4B-4BBCD8987238}" destId="{922FAB3C-8DC6-4B4E-81BA-6DD29440B0AC}" srcOrd="0" destOrd="0" presId="urn:microsoft.com/office/officeart/2009/3/layout/HorizontalOrganizationChart"/>
+    <dgm:cxn modelId="{2C5C0AC5-ED6C-4FA6-8E31-9120A3C41C4D}" type="presOf" srcId="{BE3AF4B6-F5EC-44DF-9BDC-CB79D95FB3F4}" destId="{D0F1789C-5031-4ED2-8612-D54DCD69DF19}" srcOrd="0" destOrd="0" presId="urn:microsoft.com/office/officeart/2009/3/layout/HorizontalOrganizationChart"/>
+    <dgm:cxn modelId="{C31AF8C9-F1F7-4636-9E8B-9856C48EE672}" type="presOf" srcId="{D75A9632-4EB0-4862-92FF-00CF01BE2205}" destId="{9D47FB11-33B4-48E9-9FC2-A65E51265124}" srcOrd="0" destOrd="0" presId="urn:microsoft.com/office/officeart/2009/3/layout/HorizontalOrganizationChart"/>
+    <dgm:cxn modelId="{641DD2F8-EE5B-49FB-AD42-13F8DDA1D2E7}" srcId="{D75A9632-4EB0-4862-92FF-00CF01BE2205}" destId="{4EE0A925-BC89-490E-B3C5-D5596FBAB247}" srcOrd="3" destOrd="0" parTransId="{F176E636-3CF0-4BA9-AED5-64B011671E0C}" sibTransId="{A715DD85-F2D3-41E4-B95D-11DAEE82F83F}"/>
+    <dgm:cxn modelId="{049EB4C9-08AB-4E0E-A7D8-6292894C566F}" type="presParOf" srcId="{9D47FB11-33B4-48E9-9FC2-A65E51265124}" destId="{BDBAD208-8CA8-47D3-8F7E-7E9D4BD1B67F}" srcOrd="0" destOrd="0" presId="urn:microsoft.com/office/officeart/2009/3/layout/HorizontalOrganizationChart"/>
+    <dgm:cxn modelId="{EF44F98A-5109-4B5E-B560-9A76B107683D}" type="presParOf" srcId="{BDBAD208-8CA8-47D3-8F7E-7E9D4BD1B67F}" destId="{D21E5021-6EA3-4D37-BD50-E8DDA292EE3B}" srcOrd="0" destOrd="0" presId="urn:microsoft.com/office/officeart/2009/3/layout/HorizontalOrganizationChart"/>
+    <dgm:cxn modelId="{1D5B9A13-E87E-4F6C-8FDA-5C2424AB222D}" type="presParOf" srcId="{D21E5021-6EA3-4D37-BD50-E8DDA292EE3B}" destId="{922FAB3C-8DC6-4B4E-81BA-6DD29440B0AC}" srcOrd="0" destOrd="0" presId="urn:microsoft.com/office/officeart/2009/3/layout/HorizontalOrganizationChart"/>
+    <dgm:cxn modelId="{3EE8CA09-FBF4-4B28-A312-D3F188B4B96E}" type="presParOf" srcId="{D21E5021-6EA3-4D37-BD50-E8DDA292EE3B}" destId="{AF494A36-726F-4260-932B-5405377148C7}" srcOrd="1" destOrd="0" presId="urn:microsoft.com/office/officeart/2009/3/layout/HorizontalOrganizationChart"/>
+    <dgm:cxn modelId="{0DD2E6A2-5001-42D3-B736-AF3FD874E2C4}" type="presParOf" srcId="{BDBAD208-8CA8-47D3-8F7E-7E9D4BD1B67F}" destId="{4B59475B-4E00-4BA1-B33C-E6ADE2B908F7}" srcOrd="1" destOrd="0" presId="urn:microsoft.com/office/officeart/2009/3/layout/HorizontalOrganizationChart"/>
+    <dgm:cxn modelId="{D56EF680-B3D3-442C-BE0F-FA7CC1047AD1}" type="presParOf" srcId="{BDBAD208-8CA8-47D3-8F7E-7E9D4BD1B67F}" destId="{161E1A74-A59D-4967-9D20-F98B267ECE6B}" srcOrd="2" destOrd="0" presId="urn:microsoft.com/office/officeart/2009/3/layout/HorizontalOrganizationChart"/>
+    <dgm:cxn modelId="{DCE7D019-1A02-4F26-9297-F482C6FEF42B}" type="presParOf" srcId="{9D47FB11-33B4-48E9-9FC2-A65E51265124}" destId="{F925AEFA-5F16-456D-84F0-FC1303A2A3C9}" srcOrd="1" destOrd="0" presId="urn:microsoft.com/office/officeart/2009/3/layout/HorizontalOrganizationChart"/>
+    <dgm:cxn modelId="{4FB0CFB7-2D54-49E6-8F25-F7E1EDBD0A86}" type="presParOf" srcId="{F925AEFA-5F16-456D-84F0-FC1303A2A3C9}" destId="{086C9DBA-88A8-4531-87B9-51357D0CEE70}" srcOrd="0" destOrd="0" presId="urn:microsoft.com/office/officeart/2009/3/layout/HorizontalOrganizationChart"/>
+    <dgm:cxn modelId="{4A9ADF73-12F4-4618-8FEE-5EE34ECF2885}" type="presParOf" srcId="{086C9DBA-88A8-4531-87B9-51357D0CEE70}" destId="{C483AB77-D90E-4834-8F4B-1826FF0CA448}" srcOrd="0" destOrd="0" presId="urn:microsoft.com/office/officeart/2009/3/layout/HorizontalOrganizationChart"/>
+    <dgm:cxn modelId="{6205A47C-7C91-451E-B7EE-10758DB9D508}" type="presParOf" srcId="{086C9DBA-88A8-4531-87B9-51357D0CEE70}" destId="{686DB669-0E09-480A-A0B5-4B64F05B70FF}" srcOrd="1" destOrd="0" presId="urn:microsoft.com/office/officeart/2009/3/layout/HorizontalOrganizationChart"/>
+    <dgm:cxn modelId="{2FE8C811-B0A6-4EC3-845A-96D44B6644FA}" type="presParOf" srcId="{F925AEFA-5F16-456D-84F0-FC1303A2A3C9}" destId="{2943712B-9774-446D-BFB1-89A0C6229DDF}" srcOrd="1" destOrd="0" presId="urn:microsoft.com/office/officeart/2009/3/layout/HorizontalOrganizationChart"/>
+    <dgm:cxn modelId="{C611BC69-71E9-4032-AF52-5C18E47EDB47}" type="presParOf" srcId="{F925AEFA-5F16-456D-84F0-FC1303A2A3C9}" destId="{6BA1B9EE-C685-4453-B26C-B93B4865A248}" srcOrd="2" destOrd="0" presId="urn:microsoft.com/office/officeart/2009/3/layout/HorizontalOrganizationChart"/>
+    <dgm:cxn modelId="{BB29CD8F-B2B3-404E-83C8-C06DEC11042A}" type="presParOf" srcId="{9D47FB11-33B4-48E9-9FC2-A65E51265124}" destId="{5045EEA0-283A-41CD-BB8A-79B09CC08BE6}" srcOrd="2" destOrd="0" presId="urn:microsoft.com/office/officeart/2009/3/layout/HorizontalOrganizationChart"/>
+    <dgm:cxn modelId="{31EB1C41-2F95-4A20-80A1-60D900BB8661}" type="presParOf" srcId="{5045EEA0-283A-41CD-BB8A-79B09CC08BE6}" destId="{010E815E-4072-4F73-B355-7B2DBBC7B567}" srcOrd="0" destOrd="0" presId="urn:microsoft.com/office/officeart/2009/3/layout/HorizontalOrganizationChart"/>
+    <dgm:cxn modelId="{18E2B2E1-9831-4498-8877-31C7EE027B46}" type="presParOf" srcId="{010E815E-4072-4F73-B355-7B2DBBC7B567}" destId="{D07A68CE-9D6F-4E41-9D4F-EBA802447EC3}" srcOrd="0" destOrd="0" presId="urn:microsoft.com/office/officeart/2009/3/layout/HorizontalOrganizationChart"/>
+    <dgm:cxn modelId="{3063926B-F199-4F9F-A4F9-D6A44E142860}" type="presParOf" srcId="{010E815E-4072-4F73-B355-7B2DBBC7B567}" destId="{867AF7C8-8088-4633-9689-A720BCEADAC7}" srcOrd="1" destOrd="0" presId="urn:microsoft.com/office/officeart/2009/3/layout/HorizontalOrganizationChart"/>
+    <dgm:cxn modelId="{FD8A4ADE-994A-48A4-95E3-499E1E96FCA6}" type="presParOf" srcId="{5045EEA0-283A-41CD-BB8A-79B09CC08BE6}" destId="{6B0FDB1F-4641-44EC-8B09-5FB7A39262A0}" srcOrd="1" destOrd="0" presId="urn:microsoft.com/office/officeart/2009/3/layout/HorizontalOrganizationChart"/>
+    <dgm:cxn modelId="{6E1A1B02-5E4A-4207-BF27-5ED4EC67B5A8}" type="presParOf" srcId="{5045EEA0-283A-41CD-BB8A-79B09CC08BE6}" destId="{3857C2AF-DE74-46FF-934A-37015C6C72F3}" srcOrd="2" destOrd="0" presId="urn:microsoft.com/office/officeart/2009/3/layout/HorizontalOrganizationChart"/>
+    <dgm:cxn modelId="{D58FFA66-66B1-4B21-BEB4-583CEDF059DA}" type="presParOf" srcId="{9D47FB11-33B4-48E9-9FC2-A65E51265124}" destId="{D12E04D6-E8DC-4EA5-817E-5B921BFD4BD4}" srcOrd="3" destOrd="0" presId="urn:microsoft.com/office/officeart/2009/3/layout/HorizontalOrganizationChart"/>
+    <dgm:cxn modelId="{4922DF0C-EC2A-4288-B844-3D81BBA421BB}" type="presParOf" srcId="{D12E04D6-E8DC-4EA5-817E-5B921BFD4BD4}" destId="{71462CEA-2518-4798-ABCE-2405CD7B05C4}" srcOrd="0" destOrd="0" presId="urn:microsoft.com/office/officeart/2009/3/layout/HorizontalOrganizationChart"/>
+    <dgm:cxn modelId="{63471875-CF78-4F01-B5DC-F232806AAEFC}" type="presParOf" srcId="{71462CEA-2518-4798-ABCE-2405CD7B05C4}" destId="{CCA35A53-8902-4E8E-B56F-6A8F3DDF35D5}" srcOrd="0" destOrd="0" presId="urn:microsoft.com/office/officeart/2009/3/layout/HorizontalOrganizationChart"/>
+    <dgm:cxn modelId="{7A660B59-0D84-41A7-9519-069E7E329224}" type="presParOf" srcId="{71462CEA-2518-4798-ABCE-2405CD7B05C4}" destId="{EFA00353-B659-414A-854C-B7E689A35818}" srcOrd="1" destOrd="0" presId="urn:microsoft.com/office/officeart/2009/3/layout/HorizontalOrganizationChart"/>
+    <dgm:cxn modelId="{5A97758C-A4C9-4F56-BFFA-BED363598F88}" type="presParOf" srcId="{D12E04D6-E8DC-4EA5-817E-5B921BFD4BD4}" destId="{16E60090-159E-4462-9E46-AC8374EDE2DE}" srcOrd="1" destOrd="0" presId="urn:microsoft.com/office/officeart/2009/3/layout/HorizontalOrganizationChart"/>
+    <dgm:cxn modelId="{BB165BDF-E509-4A78-93F7-AD7F11C04BBA}" type="presParOf" srcId="{D12E04D6-E8DC-4EA5-817E-5B921BFD4BD4}" destId="{B6123800-43A3-415C-AE46-BCDB9031B6B9}" srcOrd="2" destOrd="0" presId="urn:microsoft.com/office/officeart/2009/3/layout/HorizontalOrganizationChart"/>
+    <dgm:cxn modelId="{1338DC68-1918-4A5D-B08A-92328F7237DB}" type="presParOf" srcId="{9D47FB11-33B4-48E9-9FC2-A65E51265124}" destId="{E701E425-DBA7-4156-8C1C-AF3896A5B8F1}" srcOrd="4" destOrd="0" presId="urn:microsoft.com/office/officeart/2009/3/layout/HorizontalOrganizationChart"/>
+    <dgm:cxn modelId="{0F6A342E-6B50-4523-B255-BD6530CF44C4}" type="presParOf" srcId="{E701E425-DBA7-4156-8C1C-AF3896A5B8F1}" destId="{D69269B0-122E-4426-920E-D896CD3C8267}" srcOrd="0" destOrd="0" presId="urn:microsoft.com/office/officeart/2009/3/layout/HorizontalOrganizationChart"/>
+    <dgm:cxn modelId="{42C41854-8D1B-4DAA-99D3-6240B3E6BB3B}" type="presParOf" srcId="{D69269B0-122E-4426-920E-D896CD3C8267}" destId="{D0F1789C-5031-4ED2-8612-D54DCD69DF19}" srcOrd="0" destOrd="0" presId="urn:microsoft.com/office/officeart/2009/3/layout/HorizontalOrganizationChart"/>
+    <dgm:cxn modelId="{DF132866-51BE-4E08-A1E2-1FFF400D90F9}" type="presParOf" srcId="{D69269B0-122E-4426-920E-D896CD3C8267}" destId="{7055C870-DF68-441F-899C-8AE927A7E8BD}" srcOrd="1" destOrd="0" presId="urn:microsoft.com/office/officeart/2009/3/layout/HorizontalOrganizationChart"/>
+    <dgm:cxn modelId="{6BC5A8B0-6FFC-4CAB-BED0-D27E7123B061}" type="presParOf" srcId="{E701E425-DBA7-4156-8C1C-AF3896A5B8F1}" destId="{EFA118CD-DF23-4150-A8E3-6CD0C7266DFE}" srcOrd="1" destOrd="0" presId="urn:microsoft.com/office/officeart/2009/3/layout/HorizontalOrganizationChart"/>
+    <dgm:cxn modelId="{54E6F757-FF69-48B4-89A9-9B7217D39D0D}" type="presParOf" srcId="{E701E425-DBA7-4156-8C1C-AF3896A5B8F1}" destId="{B037AB12-1AFA-4B92-9D27-A51DD9C1270E}" srcOrd="2" destOrd="0" presId="urn:microsoft.com/office/officeart/2009/3/layout/HorizontalOrganizationChart"/>
   </dgm:cxnLst>
   <dgm:bg/>
   <dgm:whole/>
@@ -1169,27 +1529,30 @@
       <dsp:cNvGrpSpPr/>
     </dsp:nvGrpSpPr>
     <dsp:grpSpPr/>
-    <dsp:sp modelId="{1B82647E-CED8-49BA-8D89-D2249CACF199}">
+    <dsp:sp modelId="{922FAB3C-8DC6-4B4E-81BA-6DD29440B0AC}">
       <dsp:nvSpPr>
         <dsp:cNvPr id="0" name=""/>
         <dsp:cNvSpPr/>
       </dsp:nvSpPr>
       <dsp:spPr>
         <a:xfrm>
-          <a:off x="28577" y="1759229"/>
-          <a:ext cx="2057399" cy="1306448"/>
+          <a:off x="2177141" y="1608"/>
+          <a:ext cx="2960916" cy="679818"/>
         </a:xfrm>
-        <a:prstGeom prst="roundRect">
-          <a:avLst>
-            <a:gd name="adj" fmla="val 10000"/>
-          </a:avLst>
+        <a:prstGeom prst="rect">
+          <a:avLst/>
         </a:prstGeom>
         <a:solidFill>
-          <a:srgbClr val="EC6708"/>
+          <a:schemeClr val="accent1">
+            <a:hueOff val="0"/>
+            <a:satOff val="0"/>
+            <a:lumOff val="0"/>
+            <a:alphaOff val="0"/>
+          </a:schemeClr>
         </a:solidFill>
-        <a:ln w="19050" cap="rnd" cmpd="sng" algn="ctr">
+        <a:ln w="25400" cap="rnd" cmpd="sng" algn="ctr">
           <a:solidFill>
-            <a:schemeClr val="lt2">
+            <a:schemeClr val="lt1">
               <a:hueOff val="0"/>
               <a:satOff val="0"/>
               <a:lumOff val="0"/>
@@ -1201,76 +1564,26 @@
         <a:effectLst/>
       </dsp:spPr>
       <dsp:style>
-        <a:lnRef idx="2">
+        <a:lnRef idx="3">
           <a:scrgbClr r="0" g="0" b="0"/>
         </a:lnRef>
         <a:fillRef idx="1">
           <a:scrgbClr r="0" g="0" b="0"/>
         </a:fillRef>
-        <a:effectRef idx="0">
+        <a:effectRef idx="1">
           <a:scrgbClr r="0" g="0" b="0"/>
         </a:effectRef>
         <a:fontRef idx="minor">
           <a:schemeClr val="lt1"/>
         </a:fontRef>
       </dsp:style>
-    </dsp:sp>
-    <dsp:sp modelId="{959C8971-5DCD-4EFF-AC83-166D3649C360}">
-      <dsp:nvSpPr>
-        <dsp:cNvPr id="0" name=""/>
-        <dsp:cNvSpPr/>
-      </dsp:nvSpPr>
-      <dsp:spPr>
-        <a:xfrm>
-          <a:off x="257177" y="1976399"/>
-          <a:ext cx="2057399" cy="1306448"/>
-        </a:xfrm>
-        <a:prstGeom prst="roundRect">
-          <a:avLst>
-            <a:gd name="adj" fmla="val 10000"/>
-          </a:avLst>
-        </a:prstGeom>
-        <a:solidFill>
-          <a:schemeClr val="lt2">
-            <a:alpha val="90000"/>
-            <a:hueOff val="0"/>
-            <a:satOff val="0"/>
-            <a:lumOff val="0"/>
-            <a:alphaOff val="0"/>
-          </a:schemeClr>
-        </a:solidFill>
-        <a:ln w="19050" cap="rnd" cmpd="sng" algn="ctr">
-          <a:solidFill>
-            <a:schemeClr val="dk2">
-              <a:hueOff val="0"/>
-              <a:satOff val="0"/>
-              <a:lumOff val="0"/>
-              <a:alphaOff val="0"/>
-            </a:schemeClr>
-          </a:solidFill>
-          <a:prstDash val="solid"/>
-        </a:ln>
-        <a:effectLst/>
-      </dsp:spPr>
-      <dsp:style>
-        <a:lnRef idx="2">
-          <a:scrgbClr r="0" g="0" b="0"/>
-        </a:lnRef>
-        <a:fillRef idx="1">
-          <a:scrgbClr r="0" g="0" b="0"/>
-        </a:fillRef>
-        <a:effectRef idx="0">
-          <a:scrgbClr r="0" g="0" b="0"/>
-        </a:effectRef>
-        <a:fontRef idx="minor"/>
-      </dsp:style>
       <dsp:txBody>
-        <a:bodyPr spcFirstLastPara="0" vert="horz" wrap="square" lIns="102870" tIns="102870" rIns="102870" bIns="102870" numCol="1" spcCol="1270" rtlCol="0" anchor="ctr" anchorCtr="0">
+        <a:bodyPr spcFirstLastPara="0" vert="horz" wrap="square" lIns="15240" tIns="15240" rIns="15240" bIns="15240" numCol="1" spcCol="1270" rtlCol="0" anchor="ctr" anchorCtr="0">
           <a:noAutofit/>
         </a:bodyPr>
         <a:lstStyle/>
         <a:p>
-          <a:pPr marL="0" lvl="0" indent="0" algn="ctr" defTabSz="1200150">
+          <a:pPr marL="0" lvl="0" indent="0" algn="ctr" defTabSz="1066800">
             <a:lnSpc>
               <a:spcPct val="90000"/>
             </a:lnSpc>
@@ -1284,37 +1597,40 @@
             <a:defRPr b="1"/>
           </a:pPr>
           <a:r>
-            <a:rPr lang="de-DE" sz="2700" kern="1200" noProof="0"/>
+            <a:rPr lang="de-DE" sz="2400" kern="1200" noProof="0" dirty="0"/>
             <a:t>Einführung</a:t>
           </a:r>
         </a:p>
       </dsp:txBody>
       <dsp:txXfrm>
-        <a:off x="295442" y="2014664"/>
-        <a:ext cx="1980869" cy="1229918"/>
+        <a:off x="2177141" y="1608"/>
+        <a:ext cx="2960916" cy="679818"/>
       </dsp:txXfrm>
     </dsp:sp>
-    <dsp:sp modelId="{918247F9-6A97-459A-BC35-68C3CE52B22F}">
+    <dsp:sp modelId="{C483AB77-D90E-4834-8F4B-1826FF0CA448}">
       <dsp:nvSpPr>
         <dsp:cNvPr id="0" name=""/>
         <dsp:cNvSpPr/>
       </dsp:nvSpPr>
       <dsp:spPr>
         <a:xfrm>
-          <a:off x="2514599" y="1798828"/>
-          <a:ext cx="2057399" cy="1306448"/>
+          <a:off x="2177141" y="1111168"/>
+          <a:ext cx="2960916" cy="679818"/>
         </a:xfrm>
-        <a:prstGeom prst="roundRect">
-          <a:avLst>
-            <a:gd name="adj" fmla="val 10000"/>
-          </a:avLst>
+        <a:prstGeom prst="rect">
+          <a:avLst/>
         </a:prstGeom>
         <a:solidFill>
-          <a:srgbClr val="EC6708"/>
+          <a:schemeClr val="accent1">
+            <a:hueOff val="0"/>
+            <a:satOff val="0"/>
+            <a:lumOff val="0"/>
+            <a:alphaOff val="0"/>
+          </a:schemeClr>
         </a:solidFill>
-        <a:ln w="19050" cap="rnd" cmpd="sng" algn="ctr">
+        <a:ln w="25400" cap="rnd" cmpd="sng" algn="ctr">
           <a:solidFill>
-            <a:schemeClr val="lt2">
+            <a:schemeClr val="lt1">
               <a:hueOff val="0"/>
               <a:satOff val="0"/>
               <a:lumOff val="0"/>
@@ -1326,76 +1642,26 @@
         <a:effectLst/>
       </dsp:spPr>
       <dsp:style>
-        <a:lnRef idx="2">
+        <a:lnRef idx="3">
           <a:scrgbClr r="0" g="0" b="0"/>
         </a:lnRef>
         <a:fillRef idx="1">
           <a:scrgbClr r="0" g="0" b="0"/>
         </a:fillRef>
-        <a:effectRef idx="0">
+        <a:effectRef idx="1">
           <a:scrgbClr r="0" g="0" b="0"/>
         </a:effectRef>
         <a:fontRef idx="minor">
           <a:schemeClr val="lt1"/>
         </a:fontRef>
       </dsp:style>
-    </dsp:sp>
-    <dsp:sp modelId="{C743947A-1839-4A13-83E7-48579395E738}">
-      <dsp:nvSpPr>
-        <dsp:cNvPr id="0" name=""/>
-        <dsp:cNvSpPr/>
-      </dsp:nvSpPr>
-      <dsp:spPr>
-        <a:xfrm>
-          <a:off x="2743199" y="2015998"/>
-          <a:ext cx="2057399" cy="1306448"/>
-        </a:xfrm>
-        <a:prstGeom prst="roundRect">
-          <a:avLst>
-            <a:gd name="adj" fmla="val 10000"/>
-          </a:avLst>
-        </a:prstGeom>
-        <a:solidFill>
-          <a:schemeClr val="lt2">
-            <a:alpha val="90000"/>
-            <a:hueOff val="0"/>
-            <a:satOff val="0"/>
-            <a:lumOff val="0"/>
-            <a:alphaOff val="0"/>
-          </a:schemeClr>
-        </a:solidFill>
-        <a:ln w="19050" cap="rnd" cmpd="sng" algn="ctr">
-          <a:solidFill>
-            <a:schemeClr val="dk2">
-              <a:hueOff val="0"/>
-              <a:satOff val="0"/>
-              <a:lumOff val="0"/>
-              <a:alphaOff val="0"/>
-            </a:schemeClr>
-          </a:solidFill>
-          <a:prstDash val="solid"/>
-        </a:ln>
-        <a:effectLst/>
-      </dsp:spPr>
-      <dsp:style>
-        <a:lnRef idx="2">
-          <a:scrgbClr r="0" g="0" b="0"/>
-        </a:lnRef>
-        <a:fillRef idx="1">
-          <a:scrgbClr r="0" g="0" b="0"/>
-        </a:fillRef>
-        <a:effectRef idx="0">
-          <a:scrgbClr r="0" g="0" b="0"/>
-        </a:effectRef>
-        <a:fontRef idx="minor"/>
-      </dsp:style>
       <dsp:txBody>
-        <a:bodyPr spcFirstLastPara="0" vert="horz" wrap="square" lIns="102870" tIns="102870" rIns="102870" bIns="102870" numCol="1" spcCol="1270" rtlCol="0" anchor="ctr" anchorCtr="0">
+        <a:bodyPr spcFirstLastPara="0" vert="horz" wrap="square" lIns="15240" tIns="15240" rIns="15240" bIns="15240" numCol="1" spcCol="1270" rtlCol="0" anchor="ctr" anchorCtr="0">
           <a:noAutofit/>
         </a:bodyPr>
         <a:lstStyle/>
         <a:p>
-          <a:pPr marL="0" lvl="0" indent="0" algn="ctr" defTabSz="1200150">
+          <a:pPr marL="0" lvl="0" indent="0" algn="ctr" defTabSz="1066800">
             <a:lnSpc>
               <a:spcPct val="90000"/>
             </a:lnSpc>
@@ -1409,37 +1675,40 @@
             <a:defRPr b="1"/>
           </a:pPr>
           <a:r>
-            <a:rPr lang="de-DE" sz="2700" kern="1200" noProof="0"/>
-            <a:t>Code &amp; GitHub</a:t>
+            <a:rPr lang="de-DE" sz="2400" kern="1200" noProof="0" dirty="0"/>
+            <a:t>Datenbank</a:t>
           </a:r>
         </a:p>
       </dsp:txBody>
       <dsp:txXfrm>
-        <a:off x="2781464" y="2054263"/>
-        <a:ext cx="1980869" cy="1229918"/>
+        <a:off x="2177141" y="1111168"/>
+        <a:ext cx="2960916" cy="679818"/>
       </dsp:txXfrm>
     </dsp:sp>
-    <dsp:sp modelId="{933DD7AA-51C0-4607-BBAC-582296A91BA1}">
+    <dsp:sp modelId="{D07A68CE-9D6F-4E41-9D4F-EBA802447EC3}">
       <dsp:nvSpPr>
         <dsp:cNvPr id="0" name=""/>
         <dsp:cNvSpPr/>
       </dsp:nvSpPr>
       <dsp:spPr>
         <a:xfrm>
-          <a:off x="5029199" y="1798828"/>
-          <a:ext cx="2057399" cy="1306448"/>
+          <a:off x="2177141" y="2220728"/>
+          <a:ext cx="2960916" cy="679818"/>
         </a:xfrm>
-        <a:prstGeom prst="roundRect">
-          <a:avLst>
-            <a:gd name="adj" fmla="val 10000"/>
-          </a:avLst>
+        <a:prstGeom prst="rect">
+          <a:avLst/>
         </a:prstGeom>
         <a:solidFill>
-          <a:srgbClr val="EC6708"/>
+          <a:schemeClr val="accent1">
+            <a:hueOff val="0"/>
+            <a:satOff val="0"/>
+            <a:lumOff val="0"/>
+            <a:alphaOff val="0"/>
+          </a:schemeClr>
         </a:solidFill>
-        <a:ln w="19050" cap="rnd" cmpd="sng" algn="ctr">
+        <a:ln w="25400" cap="rnd" cmpd="sng" algn="ctr">
           <a:solidFill>
-            <a:schemeClr val="lt2">
+            <a:schemeClr val="lt1">
               <a:hueOff val="0"/>
               <a:satOff val="0"/>
               <a:lumOff val="0"/>
@@ -1451,76 +1720,26 @@
         <a:effectLst/>
       </dsp:spPr>
       <dsp:style>
-        <a:lnRef idx="2">
+        <a:lnRef idx="3">
           <a:scrgbClr r="0" g="0" b="0"/>
         </a:lnRef>
         <a:fillRef idx="1">
           <a:scrgbClr r="0" g="0" b="0"/>
         </a:fillRef>
-        <a:effectRef idx="0">
+        <a:effectRef idx="1">
           <a:scrgbClr r="0" g="0" b="0"/>
         </a:effectRef>
         <a:fontRef idx="minor">
           <a:schemeClr val="lt1"/>
         </a:fontRef>
       </dsp:style>
-    </dsp:sp>
-    <dsp:sp modelId="{0FC1B650-5189-40CE-B2A6-146C015C90A6}">
-      <dsp:nvSpPr>
-        <dsp:cNvPr id="0" name=""/>
-        <dsp:cNvSpPr/>
-      </dsp:nvSpPr>
-      <dsp:spPr>
-        <a:xfrm>
-          <a:off x="5257799" y="2015998"/>
-          <a:ext cx="2057399" cy="1306448"/>
-        </a:xfrm>
-        <a:prstGeom prst="roundRect">
-          <a:avLst>
-            <a:gd name="adj" fmla="val 10000"/>
-          </a:avLst>
-        </a:prstGeom>
-        <a:solidFill>
-          <a:schemeClr val="lt2">
-            <a:alpha val="90000"/>
-            <a:hueOff val="0"/>
-            <a:satOff val="0"/>
-            <a:lumOff val="0"/>
-            <a:alphaOff val="0"/>
-          </a:schemeClr>
-        </a:solidFill>
-        <a:ln w="19050" cap="rnd" cmpd="sng" algn="ctr">
-          <a:solidFill>
-            <a:schemeClr val="dk2">
-              <a:hueOff val="0"/>
-              <a:satOff val="0"/>
-              <a:lumOff val="0"/>
-              <a:alphaOff val="0"/>
-            </a:schemeClr>
-          </a:solidFill>
-          <a:prstDash val="solid"/>
-        </a:ln>
-        <a:effectLst/>
-      </dsp:spPr>
-      <dsp:style>
-        <a:lnRef idx="2">
-          <a:scrgbClr r="0" g="0" b="0"/>
-        </a:lnRef>
-        <a:fillRef idx="1">
-          <a:scrgbClr r="0" g="0" b="0"/>
-        </a:fillRef>
-        <a:effectRef idx="0">
-          <a:scrgbClr r="0" g="0" b="0"/>
-        </a:effectRef>
-        <a:fontRef idx="minor"/>
-      </dsp:style>
       <dsp:txBody>
-        <a:bodyPr spcFirstLastPara="0" vert="horz" wrap="square" lIns="102870" tIns="102870" rIns="102870" bIns="102870" numCol="1" spcCol="1270" rtlCol="0" anchor="ctr" anchorCtr="0">
+        <a:bodyPr spcFirstLastPara="0" vert="horz" wrap="square" lIns="15240" tIns="15240" rIns="15240" bIns="15240" numCol="1" spcCol="1270" rtlCol="0" anchor="ctr" anchorCtr="0">
           <a:noAutofit/>
         </a:bodyPr>
         <a:lstStyle/>
         <a:p>
-          <a:pPr marL="0" lvl="0" indent="0" algn="ctr" defTabSz="1200150">
+          <a:pPr marL="0" lvl="0" indent="0" algn="ctr" defTabSz="1066800">
             <a:lnSpc>
               <a:spcPct val="90000"/>
             </a:lnSpc>
@@ -1534,14 +1753,179 @@
             <a:defRPr b="1"/>
           </a:pPr>
           <a:r>
-            <a:rPr lang="de-DE" sz="2700" kern="1200" noProof="0"/>
-            <a:t>Ausblick</a:t>
+            <a:rPr lang="de-DE" sz="2400" kern="1200" noProof="0" dirty="0"/>
+            <a:t>Deploy</a:t>
           </a:r>
         </a:p>
       </dsp:txBody>
       <dsp:txXfrm>
-        <a:off x="5296064" y="2054263"/>
-        <a:ext cx="1980869" cy="1229918"/>
+        <a:off x="2177141" y="2220728"/>
+        <a:ext cx="2960916" cy="679818"/>
+      </dsp:txXfrm>
+    </dsp:sp>
+    <dsp:sp modelId="{CCA35A53-8902-4E8E-B56F-6A8F3DDF35D5}">
+      <dsp:nvSpPr>
+        <dsp:cNvPr id="0" name=""/>
+        <dsp:cNvSpPr/>
+      </dsp:nvSpPr>
+      <dsp:spPr>
+        <a:xfrm>
+          <a:off x="2177141" y="3330287"/>
+          <a:ext cx="2960916" cy="679818"/>
+        </a:xfrm>
+        <a:prstGeom prst="rect">
+          <a:avLst/>
+        </a:prstGeom>
+        <a:solidFill>
+          <a:schemeClr val="accent1">
+            <a:hueOff val="0"/>
+            <a:satOff val="0"/>
+            <a:lumOff val="0"/>
+            <a:alphaOff val="0"/>
+          </a:schemeClr>
+        </a:solidFill>
+        <a:ln w="25400" cap="rnd" cmpd="sng" algn="ctr">
+          <a:solidFill>
+            <a:schemeClr val="lt1">
+              <a:hueOff val="0"/>
+              <a:satOff val="0"/>
+              <a:lumOff val="0"/>
+              <a:alphaOff val="0"/>
+            </a:schemeClr>
+          </a:solidFill>
+          <a:prstDash val="solid"/>
+        </a:ln>
+        <a:effectLst/>
+      </dsp:spPr>
+      <dsp:style>
+        <a:lnRef idx="3">
+          <a:scrgbClr r="0" g="0" b="0"/>
+        </a:lnRef>
+        <a:fillRef idx="1">
+          <a:scrgbClr r="0" g="0" b="0"/>
+        </a:fillRef>
+        <a:effectRef idx="1">
+          <a:scrgbClr r="0" g="0" b="0"/>
+        </a:effectRef>
+        <a:fontRef idx="minor">
+          <a:schemeClr val="lt1"/>
+        </a:fontRef>
+      </dsp:style>
+      <dsp:txBody>
+        <a:bodyPr spcFirstLastPara="0" vert="horz" wrap="square" lIns="15240" tIns="15240" rIns="15240" bIns="15240" numCol="1" spcCol="1270" rtlCol="0" anchor="ctr" anchorCtr="0">
+          <a:noAutofit/>
+        </a:bodyPr>
+        <a:lstStyle/>
+        <a:p>
+          <a:pPr marL="0" lvl="0" indent="0" algn="ctr" defTabSz="1066800">
+            <a:lnSpc>
+              <a:spcPct val="90000"/>
+            </a:lnSpc>
+            <a:spcBef>
+              <a:spcPct val="0"/>
+            </a:spcBef>
+            <a:spcAft>
+              <a:spcPct val="35000"/>
+            </a:spcAft>
+            <a:buNone/>
+            <a:defRPr b="1"/>
+          </a:pPr>
+          <a:r>
+            <a:rPr lang="de-DE" sz="2400" kern="1200" noProof="0" dirty="0"/>
+            <a:t>Test der Webseite</a:t>
+          </a:r>
+        </a:p>
+      </dsp:txBody>
+      <dsp:txXfrm>
+        <a:off x="2177141" y="3330287"/>
+        <a:ext cx="2960916" cy="679818"/>
+      </dsp:txXfrm>
+    </dsp:sp>
+    <dsp:sp modelId="{D0F1789C-5031-4ED2-8612-D54DCD69DF19}">
+      <dsp:nvSpPr>
+        <dsp:cNvPr id="0" name=""/>
+        <dsp:cNvSpPr/>
+      </dsp:nvSpPr>
+      <dsp:spPr>
+        <a:xfrm>
+          <a:off x="2177141" y="4439847"/>
+          <a:ext cx="2960916" cy="679818"/>
+        </a:xfrm>
+        <a:prstGeom prst="rect">
+          <a:avLst/>
+        </a:prstGeom>
+        <a:solidFill>
+          <a:schemeClr val="accent1">
+            <a:hueOff val="0"/>
+            <a:satOff val="0"/>
+            <a:lumOff val="0"/>
+            <a:alphaOff val="0"/>
+          </a:schemeClr>
+        </a:solidFill>
+        <a:ln w="25400" cap="rnd" cmpd="sng" algn="ctr">
+          <a:solidFill>
+            <a:schemeClr val="lt1">
+              <a:hueOff val="0"/>
+              <a:satOff val="0"/>
+              <a:lumOff val="0"/>
+              <a:alphaOff val="0"/>
+            </a:schemeClr>
+          </a:solidFill>
+          <a:prstDash val="solid"/>
+        </a:ln>
+        <a:effectLst/>
+      </dsp:spPr>
+      <dsp:style>
+        <a:lnRef idx="3">
+          <a:scrgbClr r="0" g="0" b="0"/>
+        </a:lnRef>
+        <a:fillRef idx="1">
+          <a:scrgbClr r="0" g="0" b="0"/>
+        </a:fillRef>
+        <a:effectRef idx="1">
+          <a:scrgbClr r="0" g="0" b="0"/>
+        </a:effectRef>
+        <a:fontRef idx="minor">
+          <a:schemeClr val="lt1"/>
+        </a:fontRef>
+      </dsp:style>
+      <dsp:txBody>
+        <a:bodyPr spcFirstLastPara="0" vert="horz" wrap="square" lIns="15240" tIns="15240" rIns="15240" bIns="15240" numCol="1" spcCol="1270" rtlCol="0" anchor="ctr" anchorCtr="0">
+          <a:noAutofit/>
+        </a:bodyPr>
+        <a:lstStyle/>
+        <a:p>
+          <a:pPr marL="0" lvl="0" indent="0" algn="ctr" defTabSz="1066800">
+            <a:lnSpc>
+              <a:spcPct val="90000"/>
+            </a:lnSpc>
+            <a:spcBef>
+              <a:spcPct val="0"/>
+            </a:spcBef>
+            <a:spcAft>
+              <a:spcPct val="35000"/>
+            </a:spcAft>
+            <a:buNone/>
+            <a:defRPr b="1"/>
+          </a:pPr>
+          <a:r>
+            <a:rPr lang="de-DE" sz="2400" kern="1200" noProof="0" dirty="0" err="1"/>
+            <a:t>Lessons</a:t>
+          </a:r>
+          <a:r>
+            <a:rPr lang="de-DE" sz="2400" kern="1200" noProof="0" dirty="0"/>
+            <a:t> </a:t>
+          </a:r>
+          <a:r>
+            <a:rPr lang="de-DE" sz="2400" kern="1200" noProof="0" dirty="0" err="1"/>
+            <a:t>Learned</a:t>
+          </a:r>
+          <a:endParaRPr lang="de-DE" sz="2400" kern="1200" noProof="0" dirty="0"/>
+        </a:p>
+      </dsp:txBody>
+      <dsp:txXfrm>
+        <a:off x="2177141" y="4439847"/>
+        <a:ext cx="2960916" cy="679818"/>
       </dsp:txXfrm>
     </dsp:sp>
   </dsp:spTree>
@@ -1549,11 +1933,11 @@
 </file>
 
 <file path=ppt/diagrams/layout1.xml><?xml version="1.0" encoding="utf-8"?>
-<dgm:layoutDef xmlns:dgm="http://schemas.openxmlformats.org/drawingml/2006/diagram" xmlns:a="http://schemas.openxmlformats.org/drawingml/2006/main" uniqueId="urn:microsoft.com/office/officeart/2005/8/layout/hierarchy1">
+<dgm:layoutDef xmlns:dgm="http://schemas.openxmlformats.org/drawingml/2006/diagram" xmlns:a="http://schemas.openxmlformats.org/drawingml/2006/main" uniqueId="urn:microsoft.com/office/officeart/2009/3/layout/HorizontalOrganizationChart">
   <dgm:title val=""/>
   <dgm:desc val=""/>
   <dgm:catLst>
-    <dgm:cat type="hierarchy" pri="2000"/>
+    <dgm:cat type="hierarchy" pri="4300"/>
   </dgm:catLst>
   <dgm:sampData>
     <dgm:dataModel>
@@ -1562,29 +1946,25 @@
         <dgm:pt modelId="1">
           <dgm:prSet phldr="1"/>
         </dgm:pt>
-        <dgm:pt modelId="2">
-          <dgm:prSet phldr="1"/>
-        </dgm:pt>
-        <dgm:pt modelId="21">
-          <dgm:prSet phldr="1"/>
-        </dgm:pt>
-        <dgm:pt modelId="22">
+        <dgm:pt modelId="2" type="asst">
           <dgm:prSet phldr="1"/>
         </dgm:pt>
         <dgm:pt modelId="3">
           <dgm:prSet phldr="1"/>
         </dgm:pt>
-        <dgm:pt modelId="31">
+        <dgm:pt modelId="4">
+          <dgm:prSet phldr="1"/>
+        </dgm:pt>
+        <dgm:pt modelId="5">
           <dgm:prSet phldr="1"/>
         </dgm:pt>
       </dgm:ptLst>
       <dgm:cxnLst>
-        <dgm:cxn modelId="4" srcId="0" destId="1" srcOrd="0" destOrd="0"/>
-        <dgm:cxn modelId="5" srcId="1" destId="2" srcOrd="0" destOrd="0"/>
-        <dgm:cxn modelId="6" srcId="1" destId="3" srcOrd="1" destOrd="0"/>
-        <dgm:cxn modelId="23" srcId="2" destId="21" srcOrd="0" destOrd="0"/>
-        <dgm:cxn modelId="24" srcId="2" destId="22" srcOrd="1" destOrd="0"/>
-        <dgm:cxn modelId="33" srcId="3" destId="31" srcOrd="0" destOrd="0"/>
+        <dgm:cxn modelId="5" srcId="0" destId="1" srcOrd="0" destOrd="0"/>
+        <dgm:cxn modelId="6" srcId="1" destId="2" srcOrd="0" destOrd="0"/>
+        <dgm:cxn modelId="7" srcId="1" destId="3" srcOrd="1" destOrd="0"/>
+        <dgm:cxn modelId="8" srcId="1" destId="4" srcOrd="2" destOrd="0"/>
+        <dgm:cxn modelId="9" srcId="1" destId="5" srcOrd="3" destOrd="0"/>
       </dgm:cxnLst>
       <dgm:bg/>
       <dgm:whole/>
@@ -1595,13 +1975,13 @@
       <dgm:ptLst>
         <dgm:pt modelId="0" type="doc"/>
         <dgm:pt modelId="1"/>
-        <dgm:pt modelId="11"/>
         <dgm:pt modelId="12"/>
+        <dgm:pt modelId="13"/>
       </dgm:ptLst>
       <dgm:cxnLst>
         <dgm:cxn modelId="2" srcId="0" destId="1" srcOrd="0" destOrd="0"/>
-        <dgm:cxn modelId="13" srcId="1" destId="11" srcOrd="0" destOrd="0"/>
-        <dgm:cxn modelId="14" srcId="1" destId="12" srcOrd="1" destOrd="0"/>
+        <dgm:cxn modelId="16" srcId="1" destId="12" srcOrd="1" destOrd="0"/>
+        <dgm:cxn modelId="17" srcId="1" destId="13" srcOrd="2" destOrd="0"/>
       </dgm:cxnLst>
       <dgm:bg/>
       <dgm:whole/>
@@ -1612,21 +1992,17 @@
       <dgm:ptLst>
         <dgm:pt modelId="0" type="doc"/>
         <dgm:pt modelId="1"/>
-        <dgm:pt modelId="2"/>
-        <dgm:pt modelId="21"/>
-        <dgm:pt modelId="211"/>
-        <dgm:pt modelId="3"/>
-        <dgm:pt modelId="31"/>
-        <dgm:pt modelId="311"/>
+        <dgm:pt modelId="11" type="asst"/>
+        <dgm:pt modelId="12"/>
+        <dgm:pt modelId="13"/>
+        <dgm:pt modelId="14"/>
       </dgm:ptLst>
       <dgm:cxnLst>
-        <dgm:cxn modelId="4" srcId="0" destId="1" srcOrd="0" destOrd="0"/>
-        <dgm:cxn modelId="5" srcId="1" destId="2" srcOrd="0" destOrd="0"/>
-        <dgm:cxn modelId="6" srcId="1" destId="3" srcOrd="1" destOrd="0"/>
-        <dgm:cxn modelId="23" srcId="2" destId="21" srcOrd="0" destOrd="0"/>
-        <dgm:cxn modelId="24" srcId="21" destId="211" srcOrd="0" destOrd="0"/>
-        <dgm:cxn modelId="33" srcId="3" destId="31" srcOrd="0" destOrd="0"/>
-        <dgm:cxn modelId="34" srcId="31" destId="311" srcOrd="0" destOrd="0"/>
+        <dgm:cxn modelId="2" srcId="0" destId="1" srcOrd="0" destOrd="0"/>
+        <dgm:cxn modelId="15" srcId="1" destId="11" srcOrd="0" destOrd="0"/>
+        <dgm:cxn modelId="16" srcId="1" destId="12" srcOrd="1" destOrd="0"/>
+        <dgm:cxn modelId="17" srcId="1" destId="13" srcOrd="2" destOrd="0"/>
+        <dgm:cxn modelId="18" srcId="1" destId="14" srcOrd="2" destOrd="0"/>
       </dgm:cxnLst>
       <dgm:bg/>
       <dgm:whole/>
@@ -1634,6 +2010,7 @@
   </dgm:clrData>
   <dgm:layoutNode name="hierChild1">
     <dgm:varLst>
+      <dgm:orgChart val="1"/>
       <dgm:chPref val="1"/>
       <dgm:dir/>
       <dgm:animOne val="branch"/>
@@ -1643,12 +2020,14 @@
     <dgm:choose name="Name0">
       <dgm:if name="Name1" func="var" arg="dir" op="equ" val="norm">
         <dgm:alg type="hierChild">
-          <dgm:param type="linDir" val="fromL"/>
+          <dgm:param type="linDir" val="fromT"/>
+          <dgm:param type="chAlign" val="l"/>
         </dgm:alg>
       </dgm:if>
       <dgm:else name="Name2">
         <dgm:alg type="hierChild">
-          <dgm:param type="linDir" val="fromR"/>
+          <dgm:param type="linDir" val="fromT"/>
+          <dgm:param type="chAlign" val="r"/>
         </dgm:alg>
       </dgm:else>
     </dgm:choose>
@@ -1657,102 +2036,747 @@
     </dgm:shape>
     <dgm:presOf/>
     <dgm:constrLst>
-      <dgm:constr type="primFontSz" for="des" ptType="node" op="equ" val="65"/>
-      <dgm:constr type="w" for="des" forName="composite" refType="w"/>
-      <dgm:constr type="h" for="des" forName="composite" refType="w" refFor="des" refForName="composite" fact="0.667"/>
-      <dgm:constr type="w" for="des" forName="composite2" refType="w" refFor="des" refForName="composite"/>
-      <dgm:constr type="h" for="des" forName="composite2" refType="h" refFor="des" refForName="composite"/>
-      <dgm:constr type="w" for="des" forName="composite3" refType="w" refFor="des" refForName="composite"/>
-      <dgm:constr type="h" for="des" forName="composite3" refType="h" refFor="des" refForName="composite"/>
-      <dgm:constr type="w" for="des" forName="composite4" refType="w" refFor="des" refForName="composite"/>
-      <dgm:constr type="h" for="des" forName="composite4" refType="h" refFor="des" refForName="composite"/>
-      <dgm:constr type="w" for="des" forName="composite5" refType="w" refFor="des" refForName="composite"/>
-      <dgm:constr type="h" for="des" forName="composite5" refType="h" refFor="des" refForName="composite"/>
-      <dgm:constr type="sibSp" refType="w" refFor="des" refForName="composite" fact="0.1"/>
+      <dgm:constr type="w" for="des" forName="rootComposite1" refType="w" fact="10"/>
+      <dgm:constr type="h" for="des" forName="rootComposite1" refType="w" refFor="des" refForName="rootComposite1" fact="0.305"/>
+      <dgm:constr type="w" for="des" forName="rootComposite" refType="w" fact="10"/>
+      <dgm:constr type="h" for="des" forName="rootComposite" refType="w" refFor="des" refForName="rootComposite1" fact="0.305"/>
+      <dgm:constr type="w" for="des" forName="rootComposite3" refType="w" fact="10"/>
+      <dgm:constr type="h" for="des" forName="rootComposite3" refType="w" refFor="des" refForName="rootComposite1" fact="0.305"/>
+      <dgm:constr type="primFontSz" for="des" ptType="node" op="equ"/>
+      <dgm:constr type="sp" for="des" op="equ"/>
+      <dgm:constr type="sp" for="des" forName="hierRoot1" refType="w" refFor="des" refForName="rootComposite1" fact="0.2"/>
+      <dgm:constr type="sp" for="des" forName="hierRoot2" refType="sp" refFor="des" refForName="hierRoot1"/>
+      <dgm:constr type="sp" for="des" forName="hierRoot3" refType="sp" refFor="des" refForName="hierRoot1"/>
+      <dgm:constr type="sibSp" refType="w" refFor="des" refForName="rootComposite1" fact="0.125"/>
       <dgm:constr type="sibSp" for="des" forName="hierChild2" refType="sibSp"/>
       <dgm:constr type="sibSp" for="des" forName="hierChild3" refType="sibSp"/>
       <dgm:constr type="sibSp" for="des" forName="hierChild4" refType="sibSp"/>
       <dgm:constr type="sibSp" for="des" forName="hierChild5" refType="sibSp"/>
       <dgm:constr type="sibSp" for="des" forName="hierChild6" refType="sibSp"/>
-      <dgm:constr type="sp" for="des" forName="hierRoot1" refType="h" refFor="des" refForName="composite" fact="0.25"/>
-      <dgm:constr type="sp" for="des" forName="hierRoot2" refType="sp" refFor="des" refForName="hierRoot1"/>
-      <dgm:constr type="sp" for="des" forName="hierRoot3" refType="sp" refFor="des" refForName="hierRoot1"/>
-      <dgm:constr type="sp" for="des" forName="hierRoot4" refType="sp" refFor="des" refForName="hierRoot1"/>
-      <dgm:constr type="sp" for="des" forName="hierRoot5" refType="sp" refFor="des" refForName="hierRoot1"/>
+      <dgm:constr type="sibSp" for="des" forName="hierChild7" refType="sibSp"/>
+      <dgm:constr type="secSibSp" refType="w" refFor="des" refForName="rootComposite1" fact="0.125"/>
+      <dgm:constr type="secSibSp" for="des" forName="hierChild2" refType="secSibSp"/>
+      <dgm:constr type="secSibSp" for="des" forName="hierChild3" refType="secSibSp"/>
+      <dgm:constr type="secSibSp" for="des" forName="hierChild4" refType="secSibSp"/>
+      <dgm:constr type="secSibSp" for="des" forName="hierChild5" refType="secSibSp"/>
+      <dgm:constr type="secSibSp" for="des" forName="hierChild6" refType="secSibSp"/>
+      <dgm:constr type="secSibSp" for="des" forName="hierChild7" refType="secSibSp"/>
     </dgm:constrLst>
     <dgm:ruleLst/>
     <dgm:forEach name="Name3" axis="ch">
       <dgm:forEach name="Name4" axis="self" ptType="node">
         <dgm:layoutNode name="hierRoot1">
-          <dgm:alg type="hierRoot"/>
+          <dgm:varLst>
+            <dgm:hierBranch val="init"/>
+          </dgm:varLst>
+          <dgm:choose name="Name5">
+            <dgm:if name="Name6" func="var" arg="hierBranch" op="equ" val="l">
+              <dgm:choose name="Name7">
+                <dgm:if name="Name8" func="var" arg="dir" op="equ" val="norm">
+                  <dgm:alg type="hierRoot">
+                    <dgm:param type="hierAlign" val="lT"/>
+                  </dgm:alg>
+                  <dgm:constrLst>
+                    <dgm:constr type="alignOff" val="0.75"/>
+                  </dgm:constrLst>
+                </dgm:if>
+                <dgm:else name="Name9">
+                  <dgm:alg type="hierRoot">
+                    <dgm:param type="hierAlign" val="rT"/>
+                  </dgm:alg>
+                  <dgm:constrLst>
+                    <dgm:constr type="alignOff" val="0.75"/>
+                  </dgm:constrLst>
+                </dgm:else>
+              </dgm:choose>
+            </dgm:if>
+            <dgm:if name="Name10" func="var" arg="hierBranch" op="equ" val="r">
+              <dgm:choose name="Name11">
+                <dgm:if name="Name12" func="var" arg="dir" op="equ" val="norm">
+                  <dgm:alg type="hierRoot">
+                    <dgm:param type="hierAlign" val="lB"/>
+                  </dgm:alg>
+                  <dgm:constrLst>
+                    <dgm:constr type="alignOff" val="0.75"/>
+                  </dgm:constrLst>
+                </dgm:if>
+                <dgm:else name="Name13">
+                  <dgm:alg type="hierRoot">
+                    <dgm:param type="hierAlign" val="rB"/>
+                  </dgm:alg>
+                  <dgm:constrLst>
+                    <dgm:constr type="alignOff" val="0.75"/>
+                  </dgm:constrLst>
+                </dgm:else>
+              </dgm:choose>
+            </dgm:if>
+            <dgm:if name="Name14" func="var" arg="hierBranch" op="equ" val="hang">
+              <dgm:choose name="Name15">
+                <dgm:if name="Name16" func="var" arg="dir" op="equ" val="norm">
+                  <dgm:alg type="hierRoot">
+                    <dgm:param type="hierAlign" val="lCtrCh"/>
+                  </dgm:alg>
+                  <dgm:constrLst>
+                    <dgm:constr type="alignOff" val="0.65"/>
+                  </dgm:constrLst>
+                </dgm:if>
+                <dgm:else name="Name17">
+                  <dgm:alg type="hierRoot">
+                    <dgm:param type="hierAlign" val="rCtrCh"/>
+                  </dgm:alg>
+                  <dgm:constrLst>
+                    <dgm:constr type="alignOff" val="0.65"/>
+                  </dgm:constrLst>
+                </dgm:else>
+              </dgm:choose>
+            </dgm:if>
+            <dgm:else name="Name18">
+              <dgm:choose name="Name19">
+                <dgm:if name="Name20" func="var" arg="dir" op="equ" val="norm">
+                  <dgm:alg type="hierRoot">
+                    <dgm:param type="hierAlign" val="lCtrCh"/>
+                  </dgm:alg>
+                  <dgm:constrLst>
+                    <dgm:constr type="alignOff"/>
+                    <dgm:constr type="bendDist" for="des" ptType="parTrans" refType="sp" fact="0.5"/>
+                  </dgm:constrLst>
+                </dgm:if>
+                <dgm:else name="Name21">
+                  <dgm:alg type="hierRoot">
+                    <dgm:param type="hierAlign" val="rCtrCh"/>
+                  </dgm:alg>
+                  <dgm:constrLst>
+                    <dgm:constr type="alignOff"/>
+                    <dgm:constr type="bendDist" for="des" ptType="parTrans" refType="sp" fact="0.5"/>
+                  </dgm:constrLst>
+                </dgm:else>
+              </dgm:choose>
+            </dgm:else>
+          </dgm:choose>
           <dgm:shape xmlns:r="http://schemas.openxmlformats.org/officeDocument/2006/relationships" r:blip="">
             <dgm:adjLst/>
           </dgm:shape>
           <dgm:presOf/>
-          <dgm:constrLst>
-            <dgm:constr type="bendDist" for="des" ptType="parTrans" refType="sp" fact="0.5"/>
-          </dgm:constrLst>
           <dgm:ruleLst/>
-          <dgm:layoutNode name="composite">
+          <dgm:layoutNode name="rootComposite1">
             <dgm:alg type="composite"/>
             <dgm:shape xmlns:r="http://schemas.openxmlformats.org/officeDocument/2006/relationships" r:blip="">
               <dgm:adjLst/>
             </dgm:shape>
-            <dgm:presOf/>
-            <dgm:constrLst>
-              <dgm:constr type="w" for="ch" forName="background" refType="w" fact="0.9"/>
-              <dgm:constr type="h" for="ch" forName="background" refType="w" refFor="ch" refForName="background" fact="0.635"/>
-              <dgm:constr type="t" for="ch" forName="background"/>
-              <dgm:constr type="l" for="ch" forName="background"/>
-              <dgm:constr type="w" for="ch" forName="text" refType="w" fact="0.9"/>
-              <dgm:constr type="h" for="ch" forName="text" refType="w" refFor="ch" refForName="text" fact="0.635"/>
-              <dgm:constr type="t" for="ch" forName="text" refType="w" fact="0.095"/>
-              <dgm:constr type="l" for="ch" forName="text" refType="w" fact="0.1"/>
-            </dgm:constrLst>
+            <dgm:presOf axis="self" ptType="node" cnt="1"/>
+            <dgm:choose name="Name22">
+              <dgm:if name="Name23" func="var" arg="hierBranch" op="equ" val="init">
+                <dgm:constrLst>
+                  <dgm:constr type="l" for="ch" forName="rootText1"/>
+                  <dgm:constr type="t" for="ch" forName="rootText1"/>
+                  <dgm:constr type="w" for="ch" forName="rootText1" refType="w"/>
+                  <dgm:constr type="h" for="ch" forName="rootText1" refType="h"/>
+                  <dgm:constr type="l" for="ch" forName="rootConnector1"/>
+                  <dgm:constr type="t" for="ch" forName="rootConnector1"/>
+                  <dgm:constr type="w" for="ch" forName="rootConnector1" refType="w" refFor="ch" refForName="rootText1" fact="0.2"/>
+                  <dgm:constr type="h" for="ch" forName="rootConnector1" refType="h" refFor="ch" refForName="rootText1"/>
+                </dgm:constrLst>
+              </dgm:if>
+              <dgm:if name="Name24" func="var" arg="hierBranch" op="equ" val="l">
+                <dgm:constrLst>
+                  <dgm:constr type="l" for="ch" forName="rootText1"/>
+                  <dgm:constr type="t" for="ch" forName="rootText1"/>
+                  <dgm:constr type="w" for="ch" forName="rootText1" refType="w"/>
+                  <dgm:constr type="h" for="ch" forName="rootText1" refType="h"/>
+                  <dgm:constr type="r" for="ch" forName="rootConnector1" refType="w"/>
+                  <dgm:constr type="t" for="ch" forName="rootConnector1"/>
+                  <dgm:constr type="w" for="ch" forName="rootConnector1" refType="w" refFor="ch" refForName="rootText1" fact="0.2"/>
+                  <dgm:constr type="h" for="ch" forName="rootConnector1" refType="h" refFor="ch" refForName="rootText1"/>
+                </dgm:constrLst>
+              </dgm:if>
+              <dgm:if name="Name25" func="var" arg="hierBranch" op="equ" val="r">
+                <dgm:constrLst>
+                  <dgm:constr type="l" for="ch" forName="rootText1"/>
+                  <dgm:constr type="t" for="ch" forName="rootText1"/>
+                  <dgm:constr type="w" for="ch" forName="rootText1" refType="w"/>
+                  <dgm:constr type="h" for="ch" forName="rootText1" refType="h"/>
+                  <dgm:constr type="l" for="ch" forName="rootConnector1"/>
+                  <dgm:constr type="t" for="ch" forName="rootConnector1"/>
+                  <dgm:constr type="w" for="ch" forName="rootConnector1" refType="w" refFor="ch" refForName="rootText1" fact="0.2"/>
+                  <dgm:constr type="h" for="ch" forName="rootConnector1" refType="h" refFor="ch" refForName="rootText1"/>
+                </dgm:constrLst>
+              </dgm:if>
+              <dgm:else name="Name26">
+                <dgm:constrLst>
+                  <dgm:constr type="l" for="ch" forName="rootText1"/>
+                  <dgm:constr type="t" for="ch" forName="rootText1"/>
+                  <dgm:constr type="w" for="ch" forName="rootText1" refType="w"/>
+                  <dgm:constr type="h" for="ch" forName="rootText1" refType="h"/>
+                  <dgm:constr type="r" for="ch" forName="rootConnector1" refType="w"/>
+                  <dgm:constr type="t" for="ch" forName="rootConnector1"/>
+                  <dgm:constr type="w" for="ch" forName="rootConnector1" refType="w" refFor="ch" refForName="rootText1" fact="0.2"/>
+                  <dgm:constr type="h" for="ch" forName="rootConnector1" refType="h" refFor="ch" refForName="rootText1"/>
+                </dgm:constrLst>
+              </dgm:else>
+            </dgm:choose>
             <dgm:ruleLst/>
-            <dgm:layoutNode name="background" styleLbl="node0" moveWith="text">
-              <dgm:alg type="sp"/>
-              <dgm:shape xmlns:r="http://schemas.openxmlformats.org/officeDocument/2006/relationships" type="roundRect" r:blip="">
-                <dgm:adjLst>
-                  <dgm:adj idx="1" val="0.1"/>
-                </dgm:adjLst>
-              </dgm:shape>
-              <dgm:presOf/>
-              <dgm:constrLst/>
-              <dgm:ruleLst/>
-            </dgm:layoutNode>
-            <dgm:layoutNode name="text" styleLbl="fgAcc0">
+            <dgm:layoutNode name="rootText1" styleLbl="node0">
               <dgm:varLst>
                 <dgm:chPref val="3"/>
               </dgm:varLst>
               <dgm:alg type="tx"/>
-              <dgm:shape xmlns:r="http://schemas.openxmlformats.org/officeDocument/2006/relationships" type="roundRect" r:blip="">
-                <dgm:adjLst>
-                  <dgm:adj idx="1" val="0.1"/>
-                </dgm:adjLst>
+              <dgm:shape xmlns:r="http://schemas.openxmlformats.org/officeDocument/2006/relationships" type="rect" r:blip="">
+                <dgm:adjLst/>
               </dgm:shape>
-              <dgm:presOf axis="self"/>
+              <dgm:presOf axis="self" ptType="node" cnt="1"/>
               <dgm:constrLst>
-                <dgm:constr type="tMarg" refType="primFontSz" fact="0.3"/>
-                <dgm:constr type="bMarg" refType="primFontSz" fact="0.3"/>
-                <dgm:constr type="lMarg" refType="primFontSz" fact="0.3"/>
-                <dgm:constr type="rMarg" refType="primFontSz" fact="0.3"/>
+                <dgm:constr type="primFontSz" val="65"/>
+                <dgm:constr type="lMarg" refType="primFontSz" fact="0.05"/>
+                <dgm:constr type="rMarg" refType="primFontSz" fact="0.05"/>
+                <dgm:constr type="tMarg" refType="primFontSz" fact="0.05"/>
+                <dgm:constr type="bMarg" refType="primFontSz" fact="0.05"/>
               </dgm:constrLst>
               <dgm:ruleLst>
                 <dgm:rule type="primFontSz" val="5" fact="NaN" max="NaN"/>
               </dgm:ruleLst>
             </dgm:layoutNode>
+            <dgm:layoutNode name="rootConnector1" moveWith="rootText1">
+              <dgm:alg type="sp"/>
+              <dgm:shape xmlns:r="http://schemas.openxmlformats.org/officeDocument/2006/relationships" type="rect" r:blip="" hideGeom="1">
+                <dgm:adjLst/>
+              </dgm:shape>
+              <dgm:presOf axis="self" ptType="node" cnt="1"/>
+              <dgm:constrLst/>
+              <dgm:ruleLst/>
+            </dgm:layoutNode>
           </dgm:layoutNode>
           <dgm:layoutNode name="hierChild2">
-            <dgm:choose name="Name5">
-              <dgm:if name="Name6" func="var" arg="dir" op="equ" val="norm">
+            <dgm:choose name="Name27">
+              <dgm:if name="Name28" func="var" arg="hierBranch" op="equ" val="l">
+                <dgm:choose name="Name29">
+                  <dgm:if name="Name30" func="var" arg="dir" op="equ" val="norm">
+                    <dgm:alg type="hierChild">
+                      <dgm:param type="chAlign" val="t"/>
+                      <dgm:param type="linDir" val="fromL"/>
+                    </dgm:alg>
+                  </dgm:if>
+                  <dgm:else name="Name31">
+                    <dgm:alg type="hierChild">
+                      <dgm:param type="chAlign" val="t"/>
+                      <dgm:param type="linDir" val="fromR"/>
+                    </dgm:alg>
+                  </dgm:else>
+                </dgm:choose>
+              </dgm:if>
+              <dgm:if name="Name32" func="var" arg="hierBranch" op="equ" val="r">
+                <dgm:choose name="Name33">
+                  <dgm:if name="Name34" func="var" arg="dir" op="equ" val="norm">
+                    <dgm:alg type="hierChild">
+                      <dgm:param type="chAlign" val="b"/>
+                      <dgm:param type="linDir" val="fromL"/>
+                    </dgm:alg>
+                  </dgm:if>
+                  <dgm:else name="Name35">
+                    <dgm:alg type="hierChild">
+                      <dgm:param type="chAlign" val="b"/>
+                      <dgm:param type="linDir" val="fromR"/>
+                    </dgm:alg>
+                  </dgm:else>
+                </dgm:choose>
+              </dgm:if>
+              <dgm:if name="Name36" func="var" arg="hierBranch" op="equ" val="hang">
+                <dgm:choose name="Name37">
+                  <dgm:if name="Name38" func="var" arg="dir" op="equ" val="norm">
+                    <dgm:alg type="hierChild">
+                      <dgm:param type="chAlign" val="l"/>
+                      <dgm:param type="linDir" val="fromT"/>
+                      <dgm:param type="secChAlign" val="t"/>
+                      <dgm:param type="secLinDir" val="fromL"/>
+                    </dgm:alg>
+                  </dgm:if>
+                  <dgm:else name="Name39">
+                    <dgm:alg type="hierChild">
+                      <dgm:param type="chAlign" val="r"/>
+                      <dgm:param type="linDir" val="fromT"/>
+                      <dgm:param type="secChAlign" val="t"/>
+                      <dgm:param type="secLinDir" val="fromR"/>
+                    </dgm:alg>
+                  </dgm:else>
+                </dgm:choose>
+              </dgm:if>
+              <dgm:else name="Name40">
+                <dgm:choose name="Name41">
+                  <dgm:if name="Name42" func="var" arg="dir" op="equ" val="norm">
+                    <dgm:alg type="hierChild">
+                      <dgm:param type="linDir" val="fromT"/>
+                      <dgm:param type="chAlign" val="l"/>
+                    </dgm:alg>
+                  </dgm:if>
+                  <dgm:else name="Name43">
+                    <dgm:alg type="hierChild">
+                      <dgm:param type="linDir" val="fromT"/>
+                      <dgm:param type="chAlign" val="r"/>
+                    </dgm:alg>
+                  </dgm:else>
+                </dgm:choose>
+              </dgm:else>
+            </dgm:choose>
+            <dgm:shape xmlns:r="http://schemas.openxmlformats.org/officeDocument/2006/relationships" r:blip="">
+              <dgm:adjLst/>
+            </dgm:shape>
+            <dgm:presOf/>
+            <dgm:constrLst/>
+            <dgm:ruleLst/>
+            <dgm:forEach name="rep2a" axis="ch" ptType="nonAsst">
+              <dgm:forEach name="Name44" axis="precedSib" ptType="parTrans" st="-1" cnt="1">
+                <dgm:choose name="Name45">
+                  <dgm:if name="Name46" func="var" arg="hierBranch" op="equ" val="hang">
+                    <dgm:layoutNode name="Name47">
+                      <dgm:choose name="Name48">
+                        <dgm:if name="Name49" func="var" arg="dir" op="equ" val="norm">
+                          <dgm:alg type="conn">
+                            <dgm:param type="connRout" val="bend"/>
+                            <dgm:param type="dim" val="1D"/>
+                            <dgm:param type="endSty" val="noArr"/>
+                            <dgm:param type="begPts" val="midR"/>
+                            <dgm:param type="endPts" val="bCtr tCtr"/>
+                          </dgm:alg>
+                        </dgm:if>
+                        <dgm:else name="Name50">
+                          <dgm:alg type="conn">
+                            <dgm:param type="connRout" val="bend"/>
+                            <dgm:param type="dim" val="1D"/>
+                            <dgm:param type="endSty" val="noArr"/>
+                            <dgm:param type="begPts" val="midL"/>
+                            <dgm:param type="endPts" val="bCtr tCtr"/>
+                          </dgm:alg>
+                        </dgm:else>
+                      </dgm:choose>
+                      <dgm:shape xmlns:r="http://schemas.openxmlformats.org/officeDocument/2006/relationships" type="conn" r:blip="" zOrderOff="-99999">
+                        <dgm:adjLst/>
+                      </dgm:shape>
+                      <dgm:presOf axis="self"/>
+                      <dgm:constrLst>
+                        <dgm:constr type="begPad"/>
+                        <dgm:constr type="endPad"/>
+                      </dgm:constrLst>
+                      <dgm:ruleLst/>
+                    </dgm:layoutNode>
+                  </dgm:if>
+                  <dgm:if name="Name51" func="var" arg="hierBranch" op="equ" val="l">
+                    <dgm:layoutNode name="Name52">
+                      <dgm:choose name="Name53">
+                        <dgm:if name="Name54" func="var" arg="dir" op="equ" val="norm">
+                          <dgm:alg type="conn">
+                            <dgm:param type="connRout" val="bend"/>
+                            <dgm:param type="dim" val="1D"/>
+                            <dgm:param type="endSty" val="noArr"/>
+                            <dgm:param type="begPts" val="midR"/>
+                            <dgm:param type="endPts" val="tCtr"/>
+                          </dgm:alg>
+                        </dgm:if>
+                        <dgm:else name="Name55">
+                          <dgm:alg type="conn">
+                            <dgm:param type="connRout" val="bend"/>
+                            <dgm:param type="dim" val="1D"/>
+                            <dgm:param type="endSty" val="noArr"/>
+                            <dgm:param type="begPts" val="midL"/>
+                            <dgm:param type="endPts" val="tCtr"/>
+                          </dgm:alg>
+                        </dgm:else>
+                      </dgm:choose>
+                      <dgm:shape xmlns:r="http://schemas.openxmlformats.org/officeDocument/2006/relationships" type="conn" r:blip="" zOrderOff="-99999">
+                        <dgm:adjLst/>
+                      </dgm:shape>
+                      <dgm:presOf axis="self"/>
+                      <dgm:constrLst>
+                        <dgm:constr type="begPad"/>
+                        <dgm:constr type="endPad"/>
+                      </dgm:constrLst>
+                      <dgm:ruleLst/>
+                    </dgm:layoutNode>
+                  </dgm:if>
+                  <dgm:if name="Name56" func="var" arg="hierBranch" op="equ" val="r">
+                    <dgm:layoutNode name="Name57">
+                      <dgm:choose name="Name58">
+                        <dgm:if name="Name59" func="var" arg="dir" op="equ" val="norm">
+                          <dgm:alg type="conn">
+                            <dgm:param type="connRout" val="bend"/>
+                            <dgm:param type="dim" val="1D"/>
+                            <dgm:param type="endSty" val="noArr"/>
+                            <dgm:param type="begPts" val="midR"/>
+                            <dgm:param type="endPts" val="bCtr"/>
+                          </dgm:alg>
+                        </dgm:if>
+                        <dgm:else name="Name60">
+                          <dgm:alg type="conn">
+                            <dgm:param type="connRout" val="bend"/>
+                            <dgm:param type="dim" val="1D"/>
+                            <dgm:param type="endSty" val="noArr"/>
+                            <dgm:param type="begPts" val="midL"/>
+                            <dgm:param type="endPts" val="bCtr"/>
+                          </dgm:alg>
+                        </dgm:else>
+                      </dgm:choose>
+                      <dgm:shape xmlns:r="http://schemas.openxmlformats.org/officeDocument/2006/relationships" type="conn" r:blip="" zOrderOff="-99999">
+                        <dgm:adjLst/>
+                      </dgm:shape>
+                      <dgm:presOf axis="self"/>
+                      <dgm:constrLst>
+                        <dgm:constr type="begPad"/>
+                        <dgm:constr type="endPad"/>
+                      </dgm:constrLst>
+                      <dgm:ruleLst/>
+                    </dgm:layoutNode>
+                  </dgm:if>
+                  <dgm:else name="Name61">
+                    <dgm:choose name="Name62">
+                      <dgm:if name="Name63" func="var" arg="dir" op="equ" val="norm">
+                        <dgm:layoutNode name="Name64">
+                          <dgm:alg type="conn">
+                            <dgm:param type="connRout" val="bend"/>
+                            <dgm:param type="dim" val="1D"/>
+                            <dgm:param type="endSty" val="noArr"/>
+                            <dgm:param type="begPts" val="midR"/>
+                            <dgm:param type="endPts" val="midL"/>
+                            <dgm:param type="bendPt" val="end"/>
+                          </dgm:alg>
+                          <dgm:shape xmlns:r="http://schemas.openxmlformats.org/officeDocument/2006/relationships" type="conn" r:blip="" zOrderOff="-99999">
+                            <dgm:adjLst/>
+                          </dgm:shape>
+                          <dgm:presOf axis="self"/>
+                          <dgm:constrLst>
+                            <dgm:constr type="begPad"/>
+                            <dgm:constr type="endPad"/>
+                          </dgm:constrLst>
+                          <dgm:ruleLst/>
+                        </dgm:layoutNode>
+                      </dgm:if>
+                      <dgm:else name="Name65">
+                        <dgm:layoutNode name="Name66">
+                          <dgm:alg type="conn">
+                            <dgm:param type="connRout" val="bend"/>
+                            <dgm:param type="dim" val="1D"/>
+                            <dgm:param type="endSty" val="noArr"/>
+                            <dgm:param type="begPts" val="midL"/>
+                            <dgm:param type="endPts" val="midR"/>
+                            <dgm:param type="bendPt" val="end"/>
+                          </dgm:alg>
+                          <dgm:shape xmlns:r="http://schemas.openxmlformats.org/officeDocument/2006/relationships" type="conn" r:blip="" zOrderOff="-99999">
+                            <dgm:adjLst/>
+                          </dgm:shape>
+                          <dgm:presOf axis="self"/>
+                          <dgm:constrLst>
+                            <dgm:constr type="begPad"/>
+                            <dgm:constr type="endPad"/>
+                          </dgm:constrLst>
+                          <dgm:ruleLst/>
+                        </dgm:layoutNode>
+                      </dgm:else>
+                    </dgm:choose>
+                  </dgm:else>
+                </dgm:choose>
+              </dgm:forEach>
+              <dgm:layoutNode name="hierRoot2">
+                <dgm:varLst>
+                  <dgm:hierBranch val="init"/>
+                </dgm:varLst>
+                <dgm:choose name="Name67">
+                  <dgm:if name="Name68" func="var" arg="hierBranch" op="equ" val="l">
+                    <dgm:choose name="Name69">
+                      <dgm:if name="Name70" func="var" arg="dir" op="equ" val="norm">
+                        <dgm:alg type="hierRoot">
+                          <dgm:param type="hierAlign" val="lT"/>
+                        </dgm:alg>
+                        <dgm:constrLst>
+                          <dgm:constr type="alignOff" val="0.75"/>
+                        </dgm:constrLst>
+                      </dgm:if>
+                      <dgm:else name="Name71">
+                        <dgm:alg type="hierRoot">
+                          <dgm:param type="hierAlign" val="rT"/>
+                        </dgm:alg>
+                        <dgm:constrLst>
+                          <dgm:constr type="alignOff" val="0.75"/>
+                        </dgm:constrLst>
+                      </dgm:else>
+                    </dgm:choose>
+                  </dgm:if>
+                  <dgm:if name="Name72" func="var" arg="hierBranch" op="equ" val="r">
+                    <dgm:choose name="Name73">
+                      <dgm:if name="Name74" func="var" arg="dir" op="equ" val="norm">
+                        <dgm:alg type="hierRoot">
+                          <dgm:param type="hierAlign" val="lB"/>
+                        </dgm:alg>
+                        <dgm:constrLst>
+                          <dgm:constr type="alignOff" val="0.75"/>
+                        </dgm:constrLst>
+                      </dgm:if>
+                      <dgm:else name="Name75">
+                        <dgm:alg type="hierRoot">
+                          <dgm:param type="hierAlign" val="rB"/>
+                        </dgm:alg>
+                        <dgm:constrLst>
+                          <dgm:constr type="alignOff" val="0.75"/>
+                        </dgm:constrLst>
+                      </dgm:else>
+                    </dgm:choose>
+                  </dgm:if>
+                  <dgm:if name="Name76" func="var" arg="hierBranch" op="equ" val="hang">
+                    <dgm:choose name="Name77">
+                      <dgm:if name="Name78" func="var" arg="dir" op="equ" val="norm">
+                        <dgm:alg type="hierRoot">
+                          <dgm:param type="hierAlign" val="lCtrCh"/>
+                        </dgm:alg>
+                        <dgm:constrLst>
+                          <dgm:constr type="alignOff" val="0.65"/>
+                        </dgm:constrLst>
+                      </dgm:if>
+                      <dgm:else name="Name79">
+                        <dgm:alg type="hierRoot">
+                          <dgm:param type="hierAlign" val="rCtrCh"/>
+                        </dgm:alg>
+                        <dgm:constrLst>
+                          <dgm:constr type="alignOff" val="0.65"/>
+                        </dgm:constrLst>
+                      </dgm:else>
+                    </dgm:choose>
+                  </dgm:if>
+                  <dgm:else name="Name80">
+                    <dgm:choose name="Name81">
+                      <dgm:if name="Name82" func="var" arg="dir" op="equ" val="norm">
+                        <dgm:alg type="hierRoot">
+                          <dgm:param type="hierAlign" val="lCtrCh"/>
+                        </dgm:alg>
+                        <dgm:constrLst>
+                          <dgm:constr type="alignOff"/>
+                          <dgm:constr type="bendDist" for="des" ptType="parTrans" refType="sp" fact="0.5"/>
+                        </dgm:constrLst>
+                      </dgm:if>
+                      <dgm:else name="Name83">
+                        <dgm:alg type="hierRoot">
+                          <dgm:param type="hierAlign" val="rCtrCh"/>
+                        </dgm:alg>
+                        <dgm:constrLst>
+                          <dgm:constr type="alignOff"/>
+                          <dgm:constr type="bendDist" for="des" ptType="parTrans" refType="sp" fact="0.5"/>
+                        </dgm:constrLst>
+                      </dgm:else>
+                    </dgm:choose>
+                  </dgm:else>
+                </dgm:choose>
+                <dgm:shape xmlns:r="http://schemas.openxmlformats.org/officeDocument/2006/relationships" r:blip="">
+                  <dgm:adjLst/>
+                </dgm:shape>
+                <dgm:presOf/>
+                <dgm:ruleLst/>
+                <dgm:layoutNode name="rootComposite">
+                  <dgm:alg type="composite"/>
+                  <dgm:shape xmlns:r="http://schemas.openxmlformats.org/officeDocument/2006/relationships" r:blip="">
+                    <dgm:adjLst/>
+                  </dgm:shape>
+                  <dgm:presOf axis="self" ptType="node" cnt="1"/>
+                  <dgm:choose name="Name84">
+                    <dgm:if name="Name85" func="var" arg="hierBranch" op="equ" val="init">
+                      <dgm:constrLst>
+                        <dgm:constr type="l" for="ch" forName="rootText"/>
+                        <dgm:constr type="t" for="ch" forName="rootText"/>
+                        <dgm:constr type="w" for="ch" forName="rootText" refType="w"/>
+                        <dgm:constr type="h" for="ch" forName="rootText" refType="h"/>
+                        <dgm:constr type="l" for="ch" forName="rootConnector"/>
+                        <dgm:constr type="t" for="ch" forName="rootConnector"/>
+                        <dgm:constr type="w" for="ch" forName="rootConnector" refType="w" refFor="ch" refForName="rootText" fact="0.2"/>
+                        <dgm:constr type="h" for="ch" forName="rootConnector" refType="h" refFor="ch" refForName="rootText"/>
+                      </dgm:constrLst>
+                    </dgm:if>
+                    <dgm:if name="Name86" func="var" arg="hierBranch" op="equ" val="l">
+                      <dgm:constrLst>
+                        <dgm:constr type="l" for="ch" forName="rootText"/>
+                        <dgm:constr type="t" for="ch" forName="rootText"/>
+                        <dgm:constr type="w" for="ch" forName="rootText" refType="w"/>
+                        <dgm:constr type="h" for="ch" forName="rootText" refType="h"/>
+                        <dgm:constr type="r" for="ch" forName="rootConnector" refType="w"/>
+                        <dgm:constr type="t" for="ch" forName="rootConnector"/>
+                        <dgm:constr type="w" for="ch" forName="rootConnector" refType="w" refFor="ch" refForName="rootText" fact="0.2"/>
+                        <dgm:constr type="h" for="ch" forName="rootConnector" refType="h" refFor="ch" refForName="rootText"/>
+                      </dgm:constrLst>
+                    </dgm:if>
+                    <dgm:if name="Name87" func="var" arg="hierBranch" op="equ" val="r">
+                      <dgm:constrLst>
+                        <dgm:constr type="l" for="ch" forName="rootText"/>
+                        <dgm:constr type="t" for="ch" forName="rootText"/>
+                        <dgm:constr type="w" for="ch" forName="rootText" refType="w"/>
+                        <dgm:constr type="h" for="ch" forName="rootText" refType="h"/>
+                        <dgm:constr type="l" for="ch" forName="rootConnector"/>
+                        <dgm:constr type="t" for="ch" forName="rootConnector"/>
+                        <dgm:constr type="w" for="ch" forName="rootConnector" refType="w" refFor="ch" refForName="rootText" fact="0.2"/>
+                        <dgm:constr type="h" for="ch" forName="rootConnector" refType="h" refFor="ch" refForName="rootText"/>
+                      </dgm:constrLst>
+                    </dgm:if>
+                    <dgm:else name="Name88">
+                      <dgm:constrLst>
+                        <dgm:constr type="l" for="ch" forName="rootText"/>
+                        <dgm:constr type="t" for="ch" forName="rootText"/>
+                        <dgm:constr type="w" for="ch" forName="rootText" refType="w"/>
+                        <dgm:constr type="h" for="ch" forName="rootText" refType="h"/>
+                        <dgm:constr type="r" for="ch" forName="rootConnector" refType="w"/>
+                        <dgm:constr type="t" for="ch" forName="rootConnector"/>
+                        <dgm:constr type="w" for="ch" forName="rootConnector" refType="w" refFor="ch" refForName="rootText" fact="0.2"/>
+                        <dgm:constr type="h" for="ch" forName="rootConnector" refType="h" refFor="ch" refForName="rootText"/>
+                      </dgm:constrLst>
+                    </dgm:else>
+                  </dgm:choose>
+                  <dgm:ruleLst/>
+                  <dgm:layoutNode name="rootText">
+                    <dgm:varLst>
+                      <dgm:chPref val="3"/>
+                    </dgm:varLst>
+                    <dgm:alg type="tx"/>
+                    <dgm:shape xmlns:r="http://schemas.openxmlformats.org/officeDocument/2006/relationships" type="rect" r:blip="">
+                      <dgm:adjLst/>
+                    </dgm:shape>
+                    <dgm:presOf axis="self" ptType="node" cnt="1"/>
+                    <dgm:constrLst>
+                      <dgm:constr type="primFontSz" val="65"/>
+                      <dgm:constr type="lMarg" refType="primFontSz" fact="0.05"/>
+                      <dgm:constr type="rMarg" refType="primFontSz" fact="0.05"/>
+                      <dgm:constr type="tMarg" refType="primFontSz" fact="0.05"/>
+                      <dgm:constr type="bMarg" refType="primFontSz" fact="0.05"/>
+                    </dgm:constrLst>
+                    <dgm:ruleLst>
+                      <dgm:rule type="primFontSz" val="5" fact="NaN" max="NaN"/>
+                    </dgm:ruleLst>
+                  </dgm:layoutNode>
+                  <dgm:layoutNode name="rootConnector" moveWith="rootText">
+                    <dgm:alg type="sp"/>
+                    <dgm:shape xmlns:r="http://schemas.openxmlformats.org/officeDocument/2006/relationships" type="rect" r:blip="" hideGeom="1">
+                      <dgm:adjLst/>
+                    </dgm:shape>
+                    <dgm:presOf axis="self" ptType="node" cnt="1"/>
+                    <dgm:constrLst/>
+                    <dgm:ruleLst/>
+                  </dgm:layoutNode>
+                </dgm:layoutNode>
+                <dgm:layoutNode name="hierChild4">
+                  <dgm:choose name="Name89">
+                    <dgm:if name="Name90" func="var" arg="hierBranch" op="equ" val="l">
+                      <dgm:choose name="Name91">
+                        <dgm:if name="Name92" func="var" arg="dir" op="equ" val="norm">
+                          <dgm:alg type="hierChild">
+                            <dgm:param type="chAlign" val="t"/>
+                            <dgm:param type="linDir" val="fromL"/>
+                          </dgm:alg>
+                        </dgm:if>
+                        <dgm:else name="Name93">
+                          <dgm:alg type="hierChild">
+                            <dgm:param type="chAlign" val="t"/>
+                            <dgm:param type="linDir" val="fromR"/>
+                          </dgm:alg>
+                        </dgm:else>
+                      </dgm:choose>
+                    </dgm:if>
+                    <dgm:if name="Name94" func="var" arg="hierBranch" op="equ" val="r">
+                      <dgm:choose name="Name95">
+                        <dgm:if name="Name96" func="var" arg="dir" op="equ" val="norm">
+                          <dgm:alg type="hierChild">
+                            <dgm:param type="chAlign" val="b"/>
+                            <dgm:param type="linDir" val="fromL"/>
+                          </dgm:alg>
+                        </dgm:if>
+                        <dgm:else name="Name97">
+                          <dgm:alg type="hierChild">
+                            <dgm:param type="chAlign" val="b"/>
+                            <dgm:param type="linDir" val="fromR"/>
+                          </dgm:alg>
+                        </dgm:else>
+                      </dgm:choose>
+                    </dgm:if>
+                    <dgm:if name="Name98" func="var" arg="hierBranch" op="equ" val="hang">
+                      <dgm:choose name="Name99">
+                        <dgm:if name="Name100" func="var" arg="dir" op="equ" val="norm">
+                          <dgm:alg type="hierChild">
+                            <dgm:param type="chAlign" val="l"/>
+                            <dgm:param type="linDir" val="fromT"/>
+                            <dgm:param type="secChAlign" val="t"/>
+                            <dgm:param type="secLinDir" val="fromL"/>
+                          </dgm:alg>
+                        </dgm:if>
+                        <dgm:else name="Name101">
+                          <dgm:alg type="hierChild">
+                            <dgm:param type="chAlign" val="r"/>
+                            <dgm:param type="linDir" val="fromT"/>
+                            <dgm:param type="secChAlign" val="t"/>
+                            <dgm:param type="secLinDir" val="fromR"/>
+                          </dgm:alg>
+                        </dgm:else>
+                      </dgm:choose>
+                    </dgm:if>
+                    <dgm:else name="Name102">
+                      <dgm:choose name="Name103">
+                        <dgm:if name="Name104" func="var" arg="dir" op="equ" val="norm">
+                          <dgm:alg type="hierChild">
+                            <dgm:param type="linDir" val="fromT"/>
+                            <dgm:param type="chAlign" val="l"/>
+                          </dgm:alg>
+                        </dgm:if>
+                        <dgm:else name="Name105">
+                          <dgm:alg type="hierChild">
+                            <dgm:param type="linDir" val="fromT"/>
+                            <dgm:param type="chAlign" val="r"/>
+                          </dgm:alg>
+                        </dgm:else>
+                      </dgm:choose>
+                    </dgm:else>
+                  </dgm:choose>
+                  <dgm:shape xmlns:r="http://schemas.openxmlformats.org/officeDocument/2006/relationships" r:blip="">
+                    <dgm:adjLst/>
+                  </dgm:shape>
+                  <dgm:presOf/>
+                  <dgm:constrLst/>
+                  <dgm:ruleLst/>
+                  <dgm:forEach name="Name106" ref="rep2a"/>
+                </dgm:layoutNode>
+                <dgm:layoutNode name="hierChild5">
+                  <dgm:choose name="Name107">
+                    <dgm:if name="Name108" func="var" arg="dir" op="equ" val="norm">
+                      <dgm:alg type="hierChild">
+                        <dgm:param type="chAlign" val="l"/>
+                        <dgm:param type="linDir" val="fromT"/>
+                        <dgm:param type="secChAlign" val="t"/>
+                        <dgm:param type="secLinDir" val="fromL"/>
+                      </dgm:alg>
+                    </dgm:if>
+                    <dgm:else name="Name109">
+                      <dgm:alg type="hierChild">
+                        <dgm:param type="chAlign" val="r"/>
+                        <dgm:param type="linDir" val="fromT"/>
+                        <dgm:param type="secChAlign" val="t"/>
+                        <dgm:param type="secLinDir" val="fromR"/>
+                      </dgm:alg>
+                    </dgm:else>
+                  </dgm:choose>
+                  <dgm:shape xmlns:r="http://schemas.openxmlformats.org/officeDocument/2006/relationships" r:blip="">
+                    <dgm:adjLst/>
+                  </dgm:shape>
+                  <dgm:presOf/>
+                  <dgm:constrLst/>
+                  <dgm:ruleLst/>
+                  <dgm:forEach name="Name110" ref="rep2b"/>
+                </dgm:layoutNode>
+              </dgm:layoutNode>
+            </dgm:forEach>
+          </dgm:layoutNode>
+          <dgm:layoutNode name="hierChild3">
+            <dgm:choose name="Name111">
+              <dgm:if name="Name112" func="var" arg="dir" op="equ" val="norm">
                 <dgm:alg type="hierChild">
-                  <dgm:param type="linDir" val="fromL"/>
+                  <dgm:param type="chAlign" val="l"/>
+                  <dgm:param type="linDir" val="fromT"/>
+                  <dgm:param type="secChAlign" val="t"/>
+                  <dgm:param type="secLinDir" val="fromL"/>
                 </dgm:alg>
               </dgm:if>
-              <dgm:else name="Name7">
+              <dgm:else name="Name113">
                 <dgm:alg type="hierChild">
-                  <dgm:param type="linDir" val="fromR"/>
+                  <dgm:param type="chAlign" val="r"/>
+                  <dgm:param type="linDir" val="fromT"/>
+                  <dgm:param type="secChAlign" val="t"/>
+                  <dgm:param type="secLinDir" val="fromR"/>
                 </dgm:alg>
               </dgm:else>
             </dgm:choose>
@@ -1762,20 +2786,30 @@
             <dgm:presOf/>
             <dgm:constrLst/>
             <dgm:ruleLst/>
-            <dgm:forEach name="Name8" axis="ch">
-              <dgm:forEach name="Name9" axis="self" ptType="parTrans" cnt="1">
-                <dgm:layoutNode name="Name10">
-                  <dgm:alg type="conn">
-                    <dgm:param type="dim" val="1D"/>
-                    <dgm:param type="endSty" val="noArr"/>
-                    <dgm:param type="connRout" val="bend"/>
-                    <dgm:param type="bendPt" val="end"/>
-                    <dgm:param type="begPts" val="bCtr"/>
-                    <dgm:param type="endPts" val="tCtr"/>
-                    <dgm:param type="srcNode" val="background"/>
-                    <dgm:param type="dstNode" val="background2"/>
-                  </dgm:alg>
-                  <dgm:shape xmlns:r="http://schemas.openxmlformats.org/officeDocument/2006/relationships" type="conn" r:blip="" zOrderOff="-999">
+            <dgm:forEach name="rep2b" axis="ch" ptType="asst">
+              <dgm:forEach name="Name114" axis="precedSib" ptType="parTrans" st="-1" cnt="1">
+                <dgm:layoutNode name="Name115">
+                  <dgm:choose name="Name116">
+                    <dgm:if name="Name117" func="var" arg="dir" op="equ" val="norm">
+                      <dgm:alg type="conn">
+                        <dgm:param type="connRout" val="bend"/>
+                        <dgm:param type="dim" val="1D"/>
+                        <dgm:param type="endSty" val="noArr"/>
+                        <dgm:param type="begPts" val="midR"/>
+                        <dgm:param type="endPts" val="bCtr tCtr"/>
+                      </dgm:alg>
+                    </dgm:if>
+                    <dgm:else name="Name118">
+                      <dgm:alg type="conn">
+                        <dgm:param type="connRout" val="bend"/>
+                        <dgm:param type="dim" val="1D"/>
+                        <dgm:param type="endSty" val="noArr"/>
+                        <dgm:param type="begPts" val="midL"/>
+                        <dgm:param type="endPts" val="bCtr tCtr"/>
+                      </dgm:alg>
+                    </dgm:else>
+                  </dgm:choose>
+                  <dgm:shape xmlns:r="http://schemas.openxmlformats.org/officeDocument/2006/relationships" type="conn" r:blip="" zOrderOff="-99999">
                     <dgm:adjLst/>
                   </dgm:shape>
                   <dgm:presOf axis="self"/>
@@ -1786,322 +2820,293 @@
                   <dgm:ruleLst/>
                 </dgm:layoutNode>
               </dgm:forEach>
-              <dgm:forEach name="Name11" axis="self" ptType="node">
-                <dgm:layoutNode name="hierRoot2">
-                  <dgm:alg type="hierRoot"/>
+              <dgm:layoutNode name="hierRoot3">
+                <dgm:varLst>
+                  <dgm:hierBranch val="init"/>
+                </dgm:varLst>
+                <dgm:choose name="Name119">
+                  <dgm:if name="Name120" func="var" arg="hierBranch" op="equ" val="l">
+                    <dgm:choose name="Name121">
+                      <dgm:if name="Name122" func="var" arg="dir" op="equ" val="norm">
+                        <dgm:alg type="hierRoot">
+                          <dgm:param type="hierAlign" val="lT"/>
+                        </dgm:alg>
+                        <dgm:constrLst>
+                          <dgm:constr type="alignOff" val="0.75"/>
+                        </dgm:constrLst>
+                      </dgm:if>
+                      <dgm:else name="Name123">
+                        <dgm:alg type="hierRoot">
+                          <dgm:param type="hierAlign" val="rT"/>
+                        </dgm:alg>
+                        <dgm:constrLst>
+                          <dgm:constr type="alignOff" val="0.75"/>
+                        </dgm:constrLst>
+                      </dgm:else>
+                    </dgm:choose>
+                  </dgm:if>
+                  <dgm:if name="Name124" func="var" arg="hierBranch" op="equ" val="r">
+                    <dgm:choose name="Name125">
+                      <dgm:if name="Name126" func="var" arg="dir" op="equ" val="norm">
+                        <dgm:alg type="hierRoot">
+                          <dgm:param type="hierAlign" val="lB"/>
+                        </dgm:alg>
+                        <dgm:constrLst>
+                          <dgm:constr type="alignOff" val="0.75"/>
+                        </dgm:constrLst>
+                      </dgm:if>
+                      <dgm:else name="Name127">
+                        <dgm:alg type="hierRoot">
+                          <dgm:param type="hierAlign" val="rB"/>
+                        </dgm:alg>
+                        <dgm:constrLst>
+                          <dgm:constr type="alignOff" val="0.75"/>
+                        </dgm:constrLst>
+                      </dgm:else>
+                    </dgm:choose>
+                  </dgm:if>
+                  <dgm:if name="Name128" func="var" arg="hierBranch" op="equ" val="hang">
+                    <dgm:choose name="Name129">
+                      <dgm:if name="Name130" func="var" arg="dir" op="equ" val="norm">
+                        <dgm:alg type="hierRoot">
+                          <dgm:param type="hierAlign" val="lCtrCh"/>
+                        </dgm:alg>
+                        <dgm:constrLst>
+                          <dgm:constr type="alignOff" val="0.65"/>
+                        </dgm:constrLst>
+                      </dgm:if>
+                      <dgm:else name="Name131">
+                        <dgm:alg type="hierRoot">
+                          <dgm:param type="hierAlign" val="rCtrCh"/>
+                        </dgm:alg>
+                        <dgm:constrLst>
+                          <dgm:constr type="alignOff" val="0.65"/>
+                        </dgm:constrLst>
+                      </dgm:else>
+                    </dgm:choose>
+                  </dgm:if>
+                  <dgm:else name="Name132">
+                    <dgm:choose name="Name133">
+                      <dgm:if name="Name134" func="var" arg="dir" op="equ" val="norm">
+                        <dgm:alg type="hierRoot">
+                          <dgm:param type="hierAlign" val="lCtrCh"/>
+                        </dgm:alg>
+                        <dgm:constrLst>
+                          <dgm:constr type="alignOff"/>
+                          <dgm:constr type="bendDist" for="des" ptType="parTrans" refType="sp" fact="0.5"/>
+                        </dgm:constrLst>
+                      </dgm:if>
+                      <dgm:else name="Name135">
+                        <dgm:alg type="hierRoot">
+                          <dgm:param type="hierAlign" val="rCtrCh"/>
+                        </dgm:alg>
+                        <dgm:constrLst>
+                          <dgm:constr type="alignOff"/>
+                          <dgm:constr type="bendDist" for="des" ptType="parTrans" refType="sp" fact="0.5"/>
+                        </dgm:constrLst>
+                      </dgm:else>
+                    </dgm:choose>
+                  </dgm:else>
+                </dgm:choose>
+                <dgm:shape xmlns:r="http://schemas.openxmlformats.org/officeDocument/2006/relationships" r:blip="">
+                  <dgm:adjLst/>
+                </dgm:shape>
+                <dgm:presOf/>
+                <dgm:ruleLst/>
+                <dgm:layoutNode name="rootComposite3">
+                  <dgm:alg type="composite"/>
+                  <dgm:shape xmlns:r="http://schemas.openxmlformats.org/officeDocument/2006/relationships" r:blip="">
+                    <dgm:adjLst/>
+                  </dgm:shape>
+                  <dgm:presOf axis="self" ptType="node" cnt="1"/>
+                  <dgm:choose name="Name136">
+                    <dgm:if name="Name137" func="var" arg="hierBranch" op="equ" val="init">
+                      <dgm:constrLst>
+                        <dgm:constr type="l" for="ch" forName="rootText3"/>
+                        <dgm:constr type="t" for="ch" forName="rootText3"/>
+                        <dgm:constr type="w" for="ch" forName="rootText3" refType="w"/>
+                        <dgm:constr type="h" for="ch" forName="rootText3" refType="h"/>
+                        <dgm:constr type="l" for="ch" forName="rootConnector3"/>
+                        <dgm:constr type="t" for="ch" forName="rootConnector3"/>
+                        <dgm:constr type="w" for="ch" forName="rootConnector3" refType="w" refFor="ch" refForName="rootText3" fact="0.2"/>
+                        <dgm:constr type="h" for="ch" forName="rootConnector3" refType="h" refFor="ch" refForName="rootText3"/>
+                      </dgm:constrLst>
+                    </dgm:if>
+                    <dgm:if name="Name138" func="var" arg="hierBranch" op="equ" val="l">
+                      <dgm:constrLst>
+                        <dgm:constr type="l" for="ch" forName="rootText3"/>
+                        <dgm:constr type="t" for="ch" forName="rootText3"/>
+                        <dgm:constr type="w" for="ch" forName="rootText3" refType="w"/>
+                        <dgm:constr type="h" for="ch" forName="rootText3" refType="h"/>
+                        <dgm:constr type="r" for="ch" forName="rootConnector3" refType="w"/>
+                        <dgm:constr type="t" for="ch" forName="rootConnector3"/>
+                        <dgm:constr type="w" for="ch" forName="rootConnector3" refType="w" refFor="ch" refForName="rootText3" fact="0.2"/>
+                        <dgm:constr type="h" for="ch" forName="rootConnector3" refType="h" refFor="ch" refForName="rootText3"/>
+                      </dgm:constrLst>
+                    </dgm:if>
+                    <dgm:if name="Name139" func="var" arg="hierBranch" op="equ" val="r">
+                      <dgm:constrLst>
+                        <dgm:constr type="l" for="ch" forName="rootText3"/>
+                        <dgm:constr type="t" for="ch" forName="rootText3"/>
+                        <dgm:constr type="w" for="ch" forName="rootText3" refType="w"/>
+                        <dgm:constr type="h" for="ch" forName="rootText3" refType="h"/>
+                        <dgm:constr type="l" for="ch" forName="rootConnector3"/>
+                        <dgm:constr type="t" for="ch" forName="rootConnector3"/>
+                        <dgm:constr type="w" for="ch" forName="rootConnector3" refType="w" refFor="ch" refForName="rootText3" fact="0.2"/>
+                        <dgm:constr type="h" for="ch" forName="rootConnector3" refType="h" refFor="ch" refForName="rootText3"/>
+                      </dgm:constrLst>
+                    </dgm:if>
+                    <dgm:else name="Name140">
+                      <dgm:constrLst>
+                        <dgm:constr type="l" for="ch" forName="rootText3"/>
+                        <dgm:constr type="t" for="ch" forName="rootText3"/>
+                        <dgm:constr type="w" for="ch" forName="rootText3" refType="w"/>
+                        <dgm:constr type="h" for="ch" forName="rootText3" refType="h"/>
+                        <dgm:constr type="r" for="ch" forName="rootConnector3" refType="w"/>
+                        <dgm:constr type="t" for="ch" forName="rootConnector3"/>
+                        <dgm:constr type="w" for="ch" forName="rootConnector3" refType="w" refFor="ch" refForName="rootText3" fact="0.2"/>
+                        <dgm:constr type="h" for="ch" forName="rootConnector3" refType="h" refFor="ch" refForName="rootText3"/>
+                      </dgm:constrLst>
+                    </dgm:else>
+                  </dgm:choose>
+                  <dgm:ruleLst/>
+                  <dgm:layoutNode name="rootText3">
+                    <dgm:varLst>
+                      <dgm:chPref val="3"/>
+                    </dgm:varLst>
+                    <dgm:alg type="tx"/>
+                    <dgm:shape xmlns:r="http://schemas.openxmlformats.org/officeDocument/2006/relationships" type="rect" r:blip="">
+                      <dgm:adjLst/>
+                    </dgm:shape>
+                    <dgm:presOf axis="self" ptType="node" cnt="1"/>
+                    <dgm:constrLst>
+                      <dgm:constr type="primFontSz" val="65"/>
+                      <dgm:constr type="lMarg" refType="primFontSz" fact="0.05"/>
+                      <dgm:constr type="rMarg" refType="primFontSz" fact="0.05"/>
+                      <dgm:constr type="tMarg" refType="primFontSz" fact="0.05"/>
+                      <dgm:constr type="bMarg" refType="primFontSz" fact="0.05"/>
+                    </dgm:constrLst>
+                    <dgm:ruleLst>
+                      <dgm:rule type="primFontSz" val="5" fact="NaN" max="NaN"/>
+                    </dgm:ruleLst>
+                  </dgm:layoutNode>
+                  <dgm:layoutNode name="rootConnector3" moveWith="rootText1">
+                    <dgm:alg type="sp"/>
+                    <dgm:shape xmlns:r="http://schemas.openxmlformats.org/officeDocument/2006/relationships" type="rect" r:blip="" hideGeom="1">
+                      <dgm:adjLst/>
+                    </dgm:shape>
+                    <dgm:presOf axis="self" ptType="node" cnt="1"/>
+                    <dgm:constrLst/>
+                    <dgm:ruleLst/>
+                  </dgm:layoutNode>
+                </dgm:layoutNode>
+                <dgm:layoutNode name="hierChild6">
+                  <dgm:choose name="Name141">
+                    <dgm:if name="Name142" func="var" arg="hierBranch" op="equ" val="l">
+                      <dgm:choose name="Name143">
+                        <dgm:if name="Name144" func="var" arg="dir" op="equ" val="norm">
+                          <dgm:alg type="hierChild">
+                            <dgm:param type="chAlign" val="t"/>
+                            <dgm:param type="linDir" val="fromL"/>
+                          </dgm:alg>
+                        </dgm:if>
+                        <dgm:else name="Name145">
+                          <dgm:alg type="hierChild">
+                            <dgm:param type="chAlign" val="t"/>
+                            <dgm:param type="linDir" val="fromR"/>
+                          </dgm:alg>
+                        </dgm:else>
+                      </dgm:choose>
+                    </dgm:if>
+                    <dgm:if name="Name146" func="var" arg="hierBranch" op="equ" val="r">
+                      <dgm:choose name="Name147">
+                        <dgm:if name="Name148" func="var" arg="dir" op="equ" val="norm">
+                          <dgm:alg type="hierChild">
+                            <dgm:param type="chAlign" val="b"/>
+                            <dgm:param type="linDir" val="fromL"/>
+                          </dgm:alg>
+                        </dgm:if>
+                        <dgm:else name="Name149">
+                          <dgm:alg type="hierChild">
+                            <dgm:param type="chAlign" val="b"/>
+                            <dgm:param type="linDir" val="fromR"/>
+                          </dgm:alg>
+                        </dgm:else>
+                      </dgm:choose>
+                    </dgm:if>
+                    <dgm:if name="Name150" func="var" arg="hierBranch" op="equ" val="hang">
+                      <dgm:choose name="Name151">
+                        <dgm:if name="Name152" func="var" arg="dir" op="equ" val="norm">
+                          <dgm:alg type="hierChild">
+                            <dgm:param type="chAlign" val="l"/>
+                            <dgm:param type="linDir" val="fromT"/>
+                            <dgm:param type="secChAlign" val="t"/>
+                            <dgm:param type="secLinDir" val="fromL"/>
+                          </dgm:alg>
+                        </dgm:if>
+                        <dgm:else name="Name153">
+                          <dgm:alg type="hierChild">
+                            <dgm:param type="chAlign" val="r"/>
+                            <dgm:param type="linDir" val="fromT"/>
+                            <dgm:param type="secChAlign" val="t"/>
+                            <dgm:param type="secLinDir" val="fromR"/>
+                          </dgm:alg>
+                        </dgm:else>
+                      </dgm:choose>
+                    </dgm:if>
+                    <dgm:else name="Name154">
+                      <dgm:choose name="Name155">
+                        <dgm:if name="Name156" func="var" arg="dir" op="equ" val="norm">
+                          <dgm:alg type="hierChild">
+                            <dgm:param type="linDir" val="fromT"/>
+                            <dgm:param type="chAlign" val="l"/>
+                          </dgm:alg>
+                        </dgm:if>
+                        <dgm:else name="Name157">
+                          <dgm:alg type="hierChild">
+                            <dgm:param type="linDir" val="fromT"/>
+                            <dgm:param type="chAlign" val="r"/>
+                          </dgm:alg>
+                        </dgm:else>
+                      </dgm:choose>
+                    </dgm:else>
+                  </dgm:choose>
                   <dgm:shape xmlns:r="http://schemas.openxmlformats.org/officeDocument/2006/relationships" r:blip="">
                     <dgm:adjLst/>
                   </dgm:shape>
                   <dgm:presOf/>
-                  <dgm:constrLst>
-                    <dgm:constr type="bendDist" for="des" ptType="parTrans" refType="sp" fact="0.5"/>
-                  </dgm:constrLst>
+                  <dgm:constrLst/>
                   <dgm:ruleLst/>
-                  <dgm:layoutNode name="composite2">
-                    <dgm:alg type="composite"/>
-                    <dgm:shape xmlns:r="http://schemas.openxmlformats.org/officeDocument/2006/relationships" r:blip="">
-                      <dgm:adjLst/>
-                    </dgm:shape>
-                    <dgm:presOf/>
-                    <dgm:constrLst>
-                      <dgm:constr type="w" for="ch" forName="background2" refType="w" fact="0.9"/>
-                      <dgm:constr type="h" for="ch" forName="background2" refType="w" refFor="ch" refForName="background2" fact="0.635"/>
-                      <dgm:constr type="t" for="ch" forName="background2"/>
-                      <dgm:constr type="l" for="ch" forName="background2"/>
-                      <dgm:constr type="w" for="ch" forName="text2" refType="w" fact="0.9"/>
-                      <dgm:constr type="h" for="ch" forName="text2" refType="w" refFor="ch" refForName="text2" fact="0.635"/>
-                      <dgm:constr type="t" for="ch" forName="text2" refType="w" fact="0.095"/>
-                      <dgm:constr type="l" for="ch" forName="text2" refType="w" fact="0.1"/>
-                    </dgm:constrLst>
-                    <dgm:ruleLst/>
-                    <dgm:layoutNode name="background2" moveWith="text2">
-                      <dgm:alg type="sp"/>
-                      <dgm:shape xmlns:r="http://schemas.openxmlformats.org/officeDocument/2006/relationships" type="roundRect" r:blip="">
-                        <dgm:adjLst>
-                          <dgm:adj idx="1" val="0.1"/>
-                        </dgm:adjLst>
-                      </dgm:shape>
-                      <dgm:presOf/>
-                      <dgm:constrLst/>
-                      <dgm:ruleLst/>
-                    </dgm:layoutNode>
-                    <dgm:layoutNode name="text2" styleLbl="fgAcc2">
-                      <dgm:varLst>
-                        <dgm:chPref val="3"/>
-                      </dgm:varLst>
-                      <dgm:alg type="tx"/>
-                      <dgm:shape xmlns:r="http://schemas.openxmlformats.org/officeDocument/2006/relationships" type="roundRect" r:blip="">
-                        <dgm:adjLst>
-                          <dgm:adj idx="1" val="0.1"/>
-                        </dgm:adjLst>
-                      </dgm:shape>
-                      <dgm:presOf axis="self"/>
-                      <dgm:constrLst>
-                        <dgm:constr type="tMarg" refType="primFontSz" fact="0.3"/>
-                        <dgm:constr type="bMarg" refType="primFontSz" fact="0.3"/>
-                        <dgm:constr type="lMarg" refType="primFontSz" fact="0.3"/>
-                        <dgm:constr type="rMarg" refType="primFontSz" fact="0.3"/>
-                      </dgm:constrLst>
-                      <dgm:ruleLst>
-                        <dgm:rule type="primFontSz" val="5" fact="NaN" max="NaN"/>
-                      </dgm:ruleLst>
-                    </dgm:layoutNode>
-                  </dgm:layoutNode>
-                  <dgm:layoutNode name="hierChild3">
-                    <dgm:choose name="Name12">
-                      <dgm:if name="Name13" func="var" arg="dir" op="equ" val="norm">
-                        <dgm:alg type="hierChild">
-                          <dgm:param type="linDir" val="fromL"/>
-                        </dgm:alg>
-                      </dgm:if>
-                      <dgm:else name="Name14">
-                        <dgm:alg type="hierChild">
-                          <dgm:param type="linDir" val="fromR"/>
-                        </dgm:alg>
-                      </dgm:else>
-                    </dgm:choose>
-                    <dgm:shape xmlns:r="http://schemas.openxmlformats.org/officeDocument/2006/relationships" r:blip="">
-                      <dgm:adjLst/>
-                    </dgm:shape>
-                    <dgm:presOf/>
-                    <dgm:constrLst/>
-                    <dgm:ruleLst/>
-                    <dgm:forEach name="Name15" axis="ch">
-                      <dgm:forEach name="Name16" axis="self" ptType="parTrans" cnt="1">
-                        <dgm:layoutNode name="Name17">
-                          <dgm:alg type="conn">
-                            <dgm:param type="dim" val="1D"/>
-                            <dgm:param type="endSty" val="noArr"/>
-                            <dgm:param type="connRout" val="bend"/>
-                            <dgm:param type="bendPt" val="end"/>
-                            <dgm:param type="begPts" val="bCtr"/>
-                            <dgm:param type="endPts" val="tCtr"/>
-                            <dgm:param type="srcNode" val="background2"/>
-                            <dgm:param type="dstNode" val="background3"/>
-                          </dgm:alg>
-                          <dgm:shape xmlns:r="http://schemas.openxmlformats.org/officeDocument/2006/relationships" type="conn" r:blip="" zOrderOff="-999">
-                            <dgm:adjLst/>
-                          </dgm:shape>
-                          <dgm:presOf axis="self"/>
-                          <dgm:constrLst>
-                            <dgm:constr type="begPad"/>
-                            <dgm:constr type="endPad"/>
-                          </dgm:constrLst>
-                          <dgm:ruleLst/>
-                        </dgm:layoutNode>
-                      </dgm:forEach>
-                      <dgm:forEach name="Name18" axis="self" ptType="node">
-                        <dgm:layoutNode name="hierRoot3">
-                          <dgm:alg type="hierRoot"/>
-                          <dgm:shape xmlns:r="http://schemas.openxmlformats.org/officeDocument/2006/relationships" r:blip="">
-                            <dgm:adjLst/>
-                          </dgm:shape>
-                          <dgm:presOf/>
-                          <dgm:constrLst>
-                            <dgm:constr type="bendDist" for="des" ptType="parTrans" refType="sp" fact="0.5"/>
-                          </dgm:constrLst>
-                          <dgm:ruleLst/>
-                          <dgm:layoutNode name="composite3">
-                            <dgm:alg type="composite"/>
-                            <dgm:shape xmlns:r="http://schemas.openxmlformats.org/officeDocument/2006/relationships" r:blip="">
-                              <dgm:adjLst/>
-                            </dgm:shape>
-                            <dgm:presOf/>
-                            <dgm:constrLst>
-                              <dgm:constr type="w" for="ch" forName="background3" refType="w" fact="0.9"/>
-                              <dgm:constr type="h" for="ch" forName="background3" refType="w" refFor="ch" refForName="background3" fact="0.635"/>
-                              <dgm:constr type="t" for="ch" forName="background3"/>
-                              <dgm:constr type="l" for="ch" forName="background3"/>
-                              <dgm:constr type="w" for="ch" forName="text3" refType="w" fact="0.9"/>
-                              <dgm:constr type="h" for="ch" forName="text3" refType="w" refFor="ch" refForName="text3" fact="0.635"/>
-                              <dgm:constr type="t" for="ch" forName="text3" refType="w" fact="0.095"/>
-                              <dgm:constr type="l" for="ch" forName="text3" refType="w" fact="0.1"/>
-                            </dgm:constrLst>
-                            <dgm:ruleLst/>
-                            <dgm:layoutNode name="background3" moveWith="text3">
-                              <dgm:alg type="sp"/>
-                              <dgm:shape xmlns:r="http://schemas.openxmlformats.org/officeDocument/2006/relationships" type="roundRect" r:blip="">
-                                <dgm:adjLst>
-                                  <dgm:adj idx="1" val="0.1"/>
-                                </dgm:adjLst>
-                              </dgm:shape>
-                              <dgm:presOf/>
-                              <dgm:constrLst/>
-                              <dgm:ruleLst/>
-                            </dgm:layoutNode>
-                            <dgm:layoutNode name="text3" styleLbl="fgAcc3">
-                              <dgm:varLst>
-                                <dgm:chPref val="3"/>
-                              </dgm:varLst>
-                              <dgm:alg type="tx"/>
-                              <dgm:shape xmlns:r="http://schemas.openxmlformats.org/officeDocument/2006/relationships" type="roundRect" r:blip="">
-                                <dgm:adjLst>
-                                  <dgm:adj idx="1" val="0.1"/>
-                                </dgm:adjLst>
-                              </dgm:shape>
-                              <dgm:presOf axis="self"/>
-                              <dgm:constrLst>
-                                <dgm:constr type="tMarg" refType="primFontSz" fact="0.3"/>
-                                <dgm:constr type="bMarg" refType="primFontSz" fact="0.3"/>
-                                <dgm:constr type="lMarg" refType="primFontSz" fact="0.3"/>
-                                <dgm:constr type="rMarg" refType="primFontSz" fact="0.3"/>
-                              </dgm:constrLst>
-                              <dgm:ruleLst>
-                                <dgm:rule type="primFontSz" val="5" fact="NaN" max="NaN"/>
-                              </dgm:ruleLst>
-                            </dgm:layoutNode>
-                          </dgm:layoutNode>
-                          <dgm:layoutNode name="hierChild4">
-                            <dgm:choose name="Name19">
-                              <dgm:if name="Name20" func="var" arg="dir" op="equ" val="norm">
-                                <dgm:alg type="hierChild">
-                                  <dgm:param type="linDir" val="fromL"/>
-                                </dgm:alg>
-                              </dgm:if>
-                              <dgm:else name="Name21">
-                                <dgm:alg type="hierChild">
-                                  <dgm:param type="linDir" val="fromR"/>
-                                </dgm:alg>
-                              </dgm:else>
-                            </dgm:choose>
-                            <dgm:shape xmlns:r="http://schemas.openxmlformats.org/officeDocument/2006/relationships" r:blip="">
-                              <dgm:adjLst/>
-                            </dgm:shape>
-                            <dgm:presOf/>
-                            <dgm:constrLst/>
-                            <dgm:ruleLst/>
-                            <dgm:forEach name="repeat" axis="ch">
-                              <dgm:forEach name="Name22" axis="self" ptType="parTrans" cnt="1">
-                                <dgm:layoutNode name="Name23">
-                                  <dgm:choose name="Name24">
-                                    <dgm:if name="Name25" axis="self" func="depth" op="lte" val="4">
-                                      <dgm:alg type="conn">
-                                        <dgm:param type="dim" val="1D"/>
-                                        <dgm:param type="endSty" val="noArr"/>
-                                        <dgm:param type="connRout" val="bend"/>
-                                        <dgm:param type="bendPt" val="end"/>
-                                        <dgm:param type="begPts" val="bCtr"/>
-                                        <dgm:param type="endPts" val="tCtr"/>
-                                        <dgm:param type="srcNode" val="background3"/>
-                                        <dgm:param type="dstNode" val="background4"/>
-                                      </dgm:alg>
-                                    </dgm:if>
-                                    <dgm:else name="Name26">
-                                      <dgm:alg type="conn">
-                                        <dgm:param type="dim" val="1D"/>
-                                        <dgm:param type="endSty" val="noArr"/>
-                                        <dgm:param type="connRout" val="bend"/>
-                                        <dgm:param type="bendPt" val="end"/>
-                                        <dgm:param type="begPts" val="bCtr"/>
-                                        <dgm:param type="endPts" val="tCtr"/>
-                                        <dgm:param type="srcNode" val="background4"/>
-                                        <dgm:param type="dstNode" val="background4"/>
-                                      </dgm:alg>
-                                    </dgm:else>
-                                  </dgm:choose>
-                                  <dgm:shape xmlns:r="http://schemas.openxmlformats.org/officeDocument/2006/relationships" type="conn" r:blip="" zOrderOff="-999">
-                                    <dgm:adjLst/>
-                                  </dgm:shape>
-                                  <dgm:presOf axis="self"/>
-                                  <dgm:constrLst>
-                                    <dgm:constr type="begPad"/>
-                                    <dgm:constr type="endPad"/>
-                                  </dgm:constrLst>
-                                  <dgm:ruleLst/>
-                                </dgm:layoutNode>
-                              </dgm:forEach>
-                              <dgm:forEach name="Name27" axis="self" ptType="node">
-                                <dgm:layoutNode name="hierRoot4">
-                                  <dgm:alg type="hierRoot"/>
-                                  <dgm:shape xmlns:r="http://schemas.openxmlformats.org/officeDocument/2006/relationships" r:blip="">
-                                    <dgm:adjLst/>
-                                  </dgm:shape>
-                                  <dgm:presOf/>
-                                  <dgm:constrLst>
-                                    <dgm:constr type="bendDist" for="des" ptType="parTrans" refType="sp" fact="0.5"/>
-                                  </dgm:constrLst>
-                                  <dgm:ruleLst/>
-                                  <dgm:layoutNode name="composite4">
-                                    <dgm:alg type="composite"/>
-                                    <dgm:shape xmlns:r="http://schemas.openxmlformats.org/officeDocument/2006/relationships" r:blip="">
-                                      <dgm:adjLst/>
-                                    </dgm:shape>
-                                    <dgm:presOf/>
-                                    <dgm:constrLst>
-                                      <dgm:constr type="w" for="ch" forName="background4" refType="w" fact="0.9"/>
-                                      <dgm:constr type="h" for="ch" forName="background4" refType="w" refFor="ch" refForName="background4" fact="0.635"/>
-                                      <dgm:constr type="t" for="ch" forName="background4"/>
-                                      <dgm:constr type="l" for="ch" forName="background4"/>
-                                      <dgm:constr type="w" for="ch" forName="text4" refType="w" fact="0.9"/>
-                                      <dgm:constr type="h" for="ch" forName="text4" refType="w" refFor="ch" refForName="text4" fact="0.635"/>
-                                      <dgm:constr type="t" for="ch" forName="text4" refType="w" fact="0.095"/>
-                                      <dgm:constr type="l" for="ch" forName="text4" refType="w" fact="0.1"/>
-                                    </dgm:constrLst>
-                                    <dgm:ruleLst/>
-                                    <dgm:layoutNode name="background4" moveWith="text4">
-                                      <dgm:alg type="sp"/>
-                                      <dgm:shape xmlns:r="http://schemas.openxmlformats.org/officeDocument/2006/relationships" type="roundRect" r:blip="">
-                                        <dgm:adjLst>
-                                          <dgm:adj idx="1" val="0.1"/>
-                                        </dgm:adjLst>
-                                      </dgm:shape>
-                                      <dgm:presOf/>
-                                      <dgm:constrLst/>
-                                      <dgm:ruleLst/>
-                                    </dgm:layoutNode>
-                                    <dgm:layoutNode name="text4" styleLbl="fgAcc4">
-                                      <dgm:varLst>
-                                        <dgm:chPref val="3"/>
-                                      </dgm:varLst>
-                                      <dgm:alg type="tx"/>
-                                      <dgm:shape xmlns:r="http://schemas.openxmlformats.org/officeDocument/2006/relationships" type="roundRect" r:blip="">
-                                        <dgm:adjLst>
-                                          <dgm:adj idx="1" val="0.1"/>
-                                        </dgm:adjLst>
-                                      </dgm:shape>
-                                      <dgm:presOf axis="self"/>
-                                      <dgm:constrLst>
-                                        <dgm:constr type="tMarg" refType="primFontSz" fact="0.3"/>
-                                        <dgm:constr type="bMarg" refType="primFontSz" fact="0.3"/>
-                                        <dgm:constr type="lMarg" refType="primFontSz" fact="0.3"/>
-                                        <dgm:constr type="rMarg" refType="primFontSz" fact="0.3"/>
-                                      </dgm:constrLst>
-                                      <dgm:ruleLst>
-                                        <dgm:rule type="primFontSz" val="5" fact="NaN" max="NaN"/>
-                                      </dgm:ruleLst>
-                                    </dgm:layoutNode>
-                                  </dgm:layoutNode>
-                                  <dgm:layoutNode name="hierChild5">
-                                    <dgm:choose name="Name28">
-                                      <dgm:if name="Name29" func="var" arg="dir" op="equ" val="norm">
-                                        <dgm:alg type="hierChild">
-                                          <dgm:param type="linDir" val="fromL"/>
-                                        </dgm:alg>
-                                      </dgm:if>
-                                      <dgm:else name="Name30">
-                                        <dgm:alg type="hierChild">
-                                          <dgm:param type="linDir" val="fromR"/>
-                                        </dgm:alg>
-                                      </dgm:else>
-                                    </dgm:choose>
-                                    <dgm:shape xmlns:r="http://schemas.openxmlformats.org/officeDocument/2006/relationships" r:blip="">
-                                      <dgm:adjLst/>
-                                    </dgm:shape>
-                                    <dgm:presOf/>
-                                    <dgm:constrLst/>
-                                    <dgm:ruleLst/>
-                                    <dgm:forEach name="Name31" ref="repeat"/>
-                                  </dgm:layoutNode>
-                                </dgm:layoutNode>
-                              </dgm:forEach>
-                            </dgm:forEach>
-                          </dgm:layoutNode>
-                        </dgm:layoutNode>
-                      </dgm:forEach>
-                    </dgm:forEach>
-                  </dgm:layoutNode>
+                  <dgm:forEach name="Name158" ref="rep2a"/>
                 </dgm:layoutNode>
-              </dgm:forEach>
+                <dgm:layoutNode name="hierChild7">
+                  <dgm:choose name="Name159">
+                    <dgm:if name="Name160" func="var" arg="dir" op="equ" val="norm">
+                      <dgm:alg type="hierChild">
+                        <dgm:param type="chAlign" val="l"/>
+                        <dgm:param type="linDir" val="fromT"/>
+                        <dgm:param type="secChAlign" val="t"/>
+                        <dgm:param type="secLinDir" val="fromL"/>
+                      </dgm:alg>
+                    </dgm:if>
+                    <dgm:else name="Name161">
+                      <dgm:alg type="hierChild">
+                        <dgm:param type="chAlign" val="r"/>
+                        <dgm:param type="linDir" val="fromT"/>
+                        <dgm:param type="secChAlign" val="t"/>
+                        <dgm:param type="secLinDir" val="fromR"/>
+                      </dgm:alg>
+                    </dgm:else>
+                  </dgm:choose>
+                  <dgm:shape xmlns:r="http://schemas.openxmlformats.org/officeDocument/2006/relationships" r:blip="">
+                    <dgm:adjLst/>
+                  </dgm:shape>
+                  <dgm:presOf/>
+                  <dgm:constrLst/>
+                  <dgm:ruleLst/>
+                  <dgm:forEach name="Name162" ref="rep2b"/>
+                </dgm:layoutNode>
+              </dgm:layoutNode>
             </dgm:forEach>
           </dgm:layoutNode>
         </dgm:layoutNode>
@@ -2112,11 +3117,11 @@
 </file>
 
 <file path=ppt/diagrams/quickStyle1.xml><?xml version="1.0" encoding="utf-8"?>
-<dgm:styleDef xmlns:dgm="http://schemas.openxmlformats.org/drawingml/2006/diagram" xmlns:a="http://schemas.openxmlformats.org/drawingml/2006/main" uniqueId="urn:microsoft.com/office/officeart/2005/8/quickstyle/simple1">
+<dgm:styleDef xmlns:dgm="http://schemas.openxmlformats.org/drawingml/2006/diagram" xmlns:a="http://schemas.openxmlformats.org/drawingml/2006/main" uniqueId="urn:microsoft.com/office/officeart/2005/8/quickstyle/simple2">
   <dgm:title val=""/>
   <dgm:desc val=""/>
   <dgm:catLst>
-    <dgm:cat type="simple" pri="10100"/>
+    <dgm:cat type="simple" pri="10200"/>
   </dgm:catLst>
   <dgm:scene3d>
     <a:camera prst="orthographicFront"/>
@@ -2130,13 +3135,13 @@
     <dgm:sp3d/>
     <dgm:txPr/>
     <dgm:style>
-      <a:lnRef idx="2">
+      <a:lnRef idx="3">
         <a:scrgbClr r="0" g="0" b="0"/>
       </a:lnRef>
       <a:fillRef idx="1">
         <a:scrgbClr r="0" g="0" b="0"/>
       </a:fillRef>
-      <a:effectRef idx="0">
+      <a:effectRef idx="1">
         <a:scrgbClr r="0" g="0" b="0"/>
       </a:effectRef>
       <a:fontRef idx="minor">
@@ -2152,13 +3157,13 @@
     <dgm:sp3d/>
     <dgm:txPr/>
     <dgm:style>
-      <a:lnRef idx="2">
+      <a:lnRef idx="3">
         <a:scrgbClr r="0" g="0" b="0"/>
       </a:lnRef>
       <a:fillRef idx="1">
         <a:scrgbClr r="0" g="0" b="0"/>
       </a:fillRef>
-      <a:effectRef idx="0">
+      <a:effectRef idx="1">
         <a:scrgbClr r="0" g="0" b="0"/>
       </a:effectRef>
       <a:fontRef idx="minor">
@@ -2174,7 +3179,7 @@
     <dgm:sp3d/>
     <dgm:txPr/>
     <dgm:style>
-      <a:lnRef idx="2">
+      <a:lnRef idx="3">
         <a:scrgbClr r="0" g="0" b="0"/>
       </a:lnRef>
       <a:fillRef idx="1">
@@ -2202,7 +3207,7 @@
       <a:fillRef idx="1">
         <a:scrgbClr r="0" g="0" b="0"/>
       </a:fillRef>
-      <a:effectRef idx="0">
+      <a:effectRef idx="1">
         <a:scrgbClr r="0" g="0" b="0"/>
       </a:effectRef>
       <a:fontRef idx="minor">
@@ -2218,13 +3223,13 @@
     <dgm:sp3d/>
     <dgm:txPr/>
     <dgm:style>
-      <a:lnRef idx="2">
+      <a:lnRef idx="3">
         <a:scrgbClr r="0" g="0" b="0"/>
       </a:lnRef>
       <a:fillRef idx="1">
         <a:scrgbClr r="0" g="0" b="0"/>
       </a:fillRef>
-      <a:effectRef idx="0">
+      <a:effectRef idx="1">
         <a:scrgbClr r="0" g="0" b="0"/>
       </a:effectRef>
       <a:fontRef idx="minor">
@@ -2240,13 +3245,13 @@
     <dgm:sp3d/>
     <dgm:txPr/>
     <dgm:style>
-      <a:lnRef idx="2">
+      <a:lnRef idx="3">
         <a:scrgbClr r="0" g="0" b="0"/>
       </a:lnRef>
       <a:fillRef idx="1">
         <a:scrgbClr r="0" g="0" b="0"/>
       </a:fillRef>
-      <a:effectRef idx="0">
+      <a:effectRef idx="1">
         <a:scrgbClr r="0" g="0" b="0"/>
       </a:effectRef>
       <a:fontRef idx="minor">
@@ -2262,13 +3267,13 @@
     <dgm:sp3d/>
     <dgm:txPr/>
     <dgm:style>
-      <a:lnRef idx="2">
+      <a:lnRef idx="3">
         <a:scrgbClr r="0" g="0" b="0"/>
       </a:lnRef>
       <a:fillRef idx="1">
         <a:scrgbClr r="0" g="0" b="0"/>
       </a:fillRef>
-      <a:effectRef idx="0">
+      <a:effectRef idx="1">
         <a:scrgbClr r="0" g="0" b="0"/>
       </a:effectRef>
       <a:fontRef idx="minor">
@@ -2284,13 +3289,13 @@
     <dgm:sp3d/>
     <dgm:txPr/>
     <dgm:style>
-      <a:lnRef idx="2">
+      <a:lnRef idx="3">
         <a:scrgbClr r="0" g="0" b="0"/>
       </a:lnRef>
       <a:fillRef idx="1">
         <a:scrgbClr r="0" g="0" b="0"/>
       </a:fillRef>
-      <a:effectRef idx="0">
+      <a:effectRef idx="1">
         <a:scrgbClr r="0" g="0" b="0"/>
       </a:effectRef>
       <a:fontRef idx="minor">
@@ -2306,13 +3311,13 @@
     <dgm:sp3d/>
     <dgm:txPr/>
     <dgm:style>
-      <a:lnRef idx="2">
+      <a:lnRef idx="3">
         <a:scrgbClr r="0" g="0" b="0"/>
       </a:lnRef>
       <a:fillRef idx="1">
         <a:scrgbClr r="0" g="0" b="0"/>
       </a:fillRef>
-      <a:effectRef idx="0">
+      <a:effectRef idx="1">
         <a:scrgbClr r="0" g="0" b="0"/>
       </a:effectRef>
       <a:fontRef idx="minor"/>
@@ -2326,13 +3331,13 @@
     <dgm:sp3d/>
     <dgm:txPr/>
     <dgm:style>
-      <a:lnRef idx="2">
+      <a:lnRef idx="3">
         <a:scrgbClr r="0" g="0" b="0"/>
       </a:lnRef>
       <a:fillRef idx="1">
         <a:scrgbClr r="0" g="0" b="0"/>
       </a:fillRef>
-      <a:effectRef idx="0">
+      <a:effectRef idx="1">
         <a:scrgbClr r="0" g="0" b="0"/>
       </a:effectRef>
       <a:fontRef idx="minor"/>
@@ -2346,13 +3351,13 @@
     <dgm:sp3d/>
     <dgm:txPr/>
     <dgm:style>
-      <a:lnRef idx="2">
+      <a:lnRef idx="3">
         <a:scrgbClr r="0" g="0" b="0"/>
       </a:lnRef>
       <a:fillRef idx="1">
         <a:scrgbClr r="0" g="0" b="0"/>
       </a:fillRef>
-      <a:effectRef idx="0">
+      <a:effectRef idx="1">
         <a:scrgbClr r="0" g="0" b="0"/>
       </a:effectRef>
       <a:fontRef idx="minor"/>
@@ -2372,7 +3377,7 @@
       <a:fillRef idx="1">
         <a:scrgbClr r="0" g="0" b="0"/>
       </a:fillRef>
-      <a:effectRef idx="0">
+      <a:effectRef idx="1">
         <a:scrgbClr r="0" g="0" b="0"/>
       </a:effectRef>
       <a:fontRef idx="minor">
@@ -2394,7 +3399,7 @@
       <a:fillRef idx="1">
         <a:scrgbClr r="0" g="0" b="0"/>
       </a:fillRef>
-      <a:effectRef idx="0">
+      <a:effectRef idx="1">
         <a:scrgbClr r="0" g="0" b="0"/>
       </a:effectRef>
       <a:fontRef idx="minor">
@@ -2416,7 +3421,7 @@
       <a:fillRef idx="1">
         <a:scrgbClr r="0" g="0" b="0"/>
       </a:fillRef>
-      <a:effectRef idx="0">
+      <a:effectRef idx="1">
         <a:scrgbClr r="0" g="0" b="0"/>
       </a:effectRef>
       <a:fontRef idx="minor">
@@ -2458,7 +3463,7 @@
       <a:fillRef idx="1">
         <a:scrgbClr r="0" g="0" b="0"/>
       </a:fillRef>
-      <a:effectRef idx="0">
+      <a:effectRef idx="1">
         <a:scrgbClr r="0" g="0" b="0"/>
       </a:effectRef>
       <a:fontRef idx="minor"/>
@@ -2472,13 +3477,13 @@
     <dgm:sp3d/>
     <dgm:txPr/>
     <dgm:style>
-      <a:lnRef idx="2">
+      <a:lnRef idx="3">
         <a:scrgbClr r="0" g="0" b="0"/>
       </a:lnRef>
       <a:fillRef idx="1">
         <a:scrgbClr r="0" g="0" b="0"/>
       </a:fillRef>
-      <a:effectRef idx="0">
+      <a:effectRef idx="1">
         <a:scrgbClr r="0" g="0" b="0"/>
       </a:effectRef>
       <a:fontRef idx="minor">
@@ -2494,13 +3499,13 @@
     <dgm:sp3d/>
     <dgm:txPr/>
     <dgm:style>
-      <a:lnRef idx="2">
+      <a:lnRef idx="3">
         <a:scrgbClr r="0" g="0" b="0"/>
       </a:lnRef>
       <a:fillRef idx="1">
         <a:scrgbClr r="0" g="0" b="0"/>
       </a:fillRef>
-      <a:effectRef idx="0">
+      <a:effectRef idx="1">
         <a:scrgbClr r="0" g="0" b="0"/>
       </a:effectRef>
       <a:fontRef idx="minor">
@@ -2516,13 +3521,13 @@
     <dgm:sp3d/>
     <dgm:txPr/>
     <dgm:style>
-      <a:lnRef idx="2">
+      <a:lnRef idx="3">
         <a:scrgbClr r="0" g="0" b="0"/>
       </a:lnRef>
       <a:fillRef idx="1">
         <a:scrgbClr r="0" g="0" b="0"/>
       </a:fillRef>
-      <a:effectRef idx="0">
+      <a:effectRef idx="1">
         <a:scrgbClr r="0" g="0" b="0"/>
       </a:effectRef>
       <a:fontRef idx="minor">
@@ -2538,13 +3543,13 @@
     <dgm:sp3d/>
     <dgm:txPr/>
     <dgm:style>
-      <a:lnRef idx="2">
+      <a:lnRef idx="3">
         <a:scrgbClr r="0" g="0" b="0"/>
       </a:lnRef>
       <a:fillRef idx="1">
         <a:scrgbClr r="0" g="0" b="0"/>
       </a:fillRef>
-      <a:effectRef idx="0">
+      <a:effectRef idx="1">
         <a:scrgbClr r="0" g="0" b="0"/>
       </a:effectRef>
       <a:fontRef idx="minor">
@@ -2560,13 +3565,13 @@
     <dgm:sp3d/>
     <dgm:txPr/>
     <dgm:style>
-      <a:lnRef idx="2">
+      <a:lnRef idx="3">
         <a:scrgbClr r="0" g="0" b="0"/>
       </a:lnRef>
       <a:fillRef idx="1">
         <a:scrgbClr r="0" g="0" b="0"/>
       </a:fillRef>
-      <a:effectRef idx="0">
+      <a:effectRef idx="1">
         <a:scrgbClr r="0" g="0" b="0"/>
       </a:effectRef>
       <a:fontRef idx="minor">
@@ -2582,13 +3587,13 @@
     <dgm:sp3d/>
     <dgm:txPr/>
     <dgm:style>
-      <a:lnRef idx="2">
+      <a:lnRef idx="3">
         <a:scrgbClr r="0" g="0" b="0"/>
       </a:lnRef>
       <a:fillRef idx="1">
         <a:scrgbClr r="0" g="0" b="0"/>
       </a:fillRef>
-      <a:effectRef idx="0">
+      <a:effectRef idx="1">
         <a:scrgbClr r="0" g="0" b="0"/>
       </a:effectRef>
       <a:fontRef idx="minor">
@@ -2604,13 +3609,13 @@
     <dgm:sp3d/>
     <dgm:txPr/>
     <dgm:style>
-      <a:lnRef idx="2">
+      <a:lnRef idx="3">
         <a:scrgbClr r="0" g="0" b="0"/>
       </a:lnRef>
       <a:fillRef idx="1">
         <a:scrgbClr r="0" g="0" b="0"/>
       </a:fillRef>
-      <a:effectRef idx="0">
+      <a:effectRef idx="1">
         <a:scrgbClr r="0" g="0" b="0"/>
       </a:effectRef>
       <a:fontRef idx="minor">
@@ -2626,13 +3631,13 @@
     <dgm:sp3d/>
     <dgm:txPr/>
     <dgm:style>
-      <a:lnRef idx="2">
+      <a:lnRef idx="3">
         <a:scrgbClr r="0" g="0" b="0"/>
       </a:lnRef>
       <a:fillRef idx="1">
         <a:scrgbClr r="0" g="0" b="0"/>
       </a:fillRef>
-      <a:effectRef idx="0">
+      <a:effectRef idx="1">
         <a:scrgbClr r="0" g="0" b="0"/>
       </a:effectRef>
       <a:fontRef idx="minor">
@@ -2648,13 +3653,13 @@
     <dgm:sp3d/>
     <dgm:txPr/>
     <dgm:style>
-      <a:lnRef idx="2">
+      <a:lnRef idx="3">
         <a:scrgbClr r="0" g="0" b="0"/>
       </a:lnRef>
       <a:fillRef idx="1">
         <a:scrgbClr r="0" g="0" b="0"/>
       </a:fillRef>
-      <a:effectRef idx="0">
+      <a:effectRef idx="1">
         <a:scrgbClr r="0" g="0" b="0"/>
       </a:effectRef>
       <a:fontRef idx="minor">
@@ -3110,13 +4115,13 @@
     <dgm:sp3d/>
     <dgm:txPr/>
     <dgm:style>
-      <a:lnRef idx="2">
+      <a:lnRef idx="3">
         <a:scrgbClr r="0" g="0" b="0"/>
       </a:lnRef>
       <a:fillRef idx="1">
         <a:scrgbClr r="0" g="0" b="0"/>
       </a:fillRef>
-      <a:effectRef idx="0">
+      <a:effectRef idx="1">
         <a:scrgbClr r="0" g="0" b="0"/>
       </a:effectRef>
       <a:fontRef idx="minor"/>
@@ -3239,7 +4244,7 @@
           <a:p>
             <a:fld id="{A4FF6716-91C8-43B5-8A44-D65BE93BEAF4}" type="datetimeFigureOut">
               <a:rPr lang="de-DE" smtClean="0"/>
-              <a:t>20.07.2020</a:t>
+              <a:t>24.07.2020</a:t>
             </a:fld>
             <a:endParaRPr lang="de-DE"/>
           </a:p>
@@ -3417,7 +4422,7 @@
           <a:p>
             <a:fld id="{78F9EC6D-9C59-4223-964A-334E089F8126}" type="datetimeFigureOut">
               <a:rPr lang="de-DE" noProof="0" smtClean="0"/>
-              <a:t>20.07.2020</a:t>
+              <a:t>24.07.2020</a:t>
             </a:fld>
             <a:endParaRPr lang="de-DE" noProof="0"/>
           </a:p>
@@ -3834,7 +4839,7 @@
           <a:p>
             <a:fld id="{76EB2DAB-85D8-4EA8-8EA4-376013B7B13D}" type="slidenum">
               <a:rPr lang="de-DE" noProof="0" smtClean="0"/>
-              <a:t>5</a:t>
+              <a:t>7</a:t>
             </a:fld>
             <a:endParaRPr lang="de-DE" noProof="0"/>
           </a:p>
@@ -6460,7 +7465,7 @@
           <p:nvPr>
             <p:extLst>
               <p:ext uri="{D42A27DB-BD31-4B8C-83A1-F6EECF244321}">
-                <p14:modId xmlns:p14="http://schemas.microsoft.com/office/powerpoint/2010/main" val="3647132788"/>
+                <p14:modId xmlns:p14="http://schemas.microsoft.com/office/powerpoint/2010/main" val="657216814"/>
               </p:ext>
             </p:extLst>
           </p:nvPr>
@@ -7975,6 +8980,724 @@
 <file path=ppt/slides/slide5.xml><?xml version="1.0" encoding="utf-8"?>
 <p:sld xmlns:a="http://schemas.openxmlformats.org/drawingml/2006/main" xmlns:r="http://schemas.openxmlformats.org/officeDocument/2006/relationships" xmlns:p="http://schemas.openxmlformats.org/presentationml/2006/main">
   <p:cSld>
+    <p:spTree>
+      <p:nvGrpSpPr>
+        <p:cNvPr id="1" name=""/>
+        <p:cNvGrpSpPr/>
+        <p:nvPr/>
+      </p:nvGrpSpPr>
+      <p:grpSpPr>
+        <a:xfrm>
+          <a:off x="0" y="0"/>
+          <a:ext cx="0" cy="0"/>
+          <a:chOff x="0" y="0"/>
+          <a:chExt cx="0" cy="0"/>
+        </a:xfrm>
+      </p:grpSpPr>
+      <p:pic>
+        <p:nvPicPr>
+          <p:cNvPr id="2" name="Grafik 1">
+            <a:extLst>
+              <a:ext uri="{FF2B5EF4-FFF2-40B4-BE49-F238E27FC236}">
+                <a16:creationId xmlns:a16="http://schemas.microsoft.com/office/drawing/2014/main" id="{2CE530AF-FCCE-4686-A708-2ADFDF161DC4}"/>
+              </a:ext>
+            </a:extLst>
+          </p:cNvPr>
+          <p:cNvPicPr>
+            <a:picLocks noChangeAspect="1"/>
+          </p:cNvPicPr>
+          <p:nvPr/>
+        </p:nvPicPr>
+        <p:blipFill>
+          <a:blip r:embed="rId2"/>
+          <a:stretch>
+            <a:fillRect/>
+          </a:stretch>
+        </p:blipFill>
+        <p:spPr>
+          <a:xfrm>
+            <a:off x="500944" y="2367471"/>
+            <a:ext cx="5115023" cy="3131803"/>
+          </a:xfrm>
+          <a:prstGeom prst="rect">
+            <a:avLst/>
+          </a:prstGeom>
+          <a:ln>
+            <a:noFill/>
+          </a:ln>
+          <a:effectLst>
+            <a:outerShdw blurRad="292100" dist="139700" dir="2700000" algn="tl" rotWithShape="0">
+              <a:srgbClr val="333333">
+                <a:alpha val="65000"/>
+              </a:srgbClr>
+            </a:outerShdw>
+          </a:effectLst>
+        </p:spPr>
+      </p:pic>
+      <p:pic>
+        <p:nvPicPr>
+          <p:cNvPr id="3" name="Grafik 2">
+            <a:extLst>
+              <a:ext uri="{FF2B5EF4-FFF2-40B4-BE49-F238E27FC236}">
+                <a16:creationId xmlns:a16="http://schemas.microsoft.com/office/drawing/2014/main" id="{B3829C97-94BB-47FC-B3C5-100AC1E75E1C}"/>
+              </a:ext>
+            </a:extLst>
+          </p:cNvPr>
+          <p:cNvPicPr>
+            <a:picLocks noChangeAspect="1"/>
+          </p:cNvPicPr>
+          <p:nvPr/>
+        </p:nvPicPr>
+        <p:blipFill rotWithShape="1">
+          <a:blip r:embed="rId3"/>
+          <a:srcRect b="1683"/>
+          <a:stretch/>
+        </p:blipFill>
+        <p:spPr>
+          <a:xfrm>
+            <a:off x="6407084" y="2367470"/>
+            <a:ext cx="5405997" cy="3131803"/>
+          </a:xfrm>
+          <a:prstGeom prst="rect">
+            <a:avLst/>
+          </a:prstGeom>
+          <a:ln>
+            <a:noFill/>
+          </a:ln>
+          <a:effectLst>
+            <a:outerShdw blurRad="292100" dist="139700" dir="2700000" algn="tl" rotWithShape="0">
+              <a:srgbClr val="333333">
+                <a:alpha val="65000"/>
+              </a:srgbClr>
+            </a:outerShdw>
+          </a:effectLst>
+        </p:spPr>
+      </p:pic>
+      <p:sp>
+        <p:nvSpPr>
+          <p:cNvPr id="4" name="Titel 1">
+            <a:extLst>
+              <a:ext uri="{FF2B5EF4-FFF2-40B4-BE49-F238E27FC236}">
+                <a16:creationId xmlns:a16="http://schemas.microsoft.com/office/drawing/2014/main" id="{FD00B729-B560-4292-A39A-C326F08BADAF}"/>
+              </a:ext>
+            </a:extLst>
+          </p:cNvPr>
+          <p:cNvSpPr txBox="1">
+            <a:spLocks/>
+          </p:cNvSpPr>
+          <p:nvPr/>
+        </p:nvSpPr>
+        <p:spPr>
+          <a:xfrm>
+            <a:off x="1590732" y="106001"/>
+            <a:ext cx="4178300" cy="835025"/>
+          </a:xfrm>
+          <a:prstGeom prst="rect">
+            <a:avLst/>
+          </a:prstGeom>
+          <a:noFill/>
+        </p:spPr>
+        <p:txBody>
+          <a:bodyPr vert="horz" lIns="91440" tIns="45720" rIns="91440" bIns="45720" rtlCol="0" anchor="t">
+            <a:normAutofit/>
+          </a:bodyPr>
+          <a:lstStyle>
+            <a:lvl1pPr algn="l" defTabSz="457200" rtl="0" eaLnBrk="1" latinLnBrk="0" hangingPunct="1">
+              <a:spcBef>
+                <a:spcPct val="0"/>
+              </a:spcBef>
+              <a:buNone/>
+              <a:defRPr sz="3600" kern="1200">
+                <a:solidFill>
+                  <a:schemeClr val="accent1"/>
+                </a:solidFill>
+                <a:latin typeface="+mj-lt"/>
+                <a:ea typeface="+mj-ea"/>
+                <a:cs typeface="+mj-cs"/>
+              </a:defRPr>
+            </a:lvl1pPr>
+            <a:lvl2pPr eaLnBrk="1" hangingPunct="1">
+              <a:defRPr>
+                <a:solidFill>
+                  <a:schemeClr val="tx2"/>
+                </a:solidFill>
+              </a:defRPr>
+            </a:lvl2pPr>
+            <a:lvl3pPr eaLnBrk="1" hangingPunct="1">
+              <a:defRPr>
+                <a:solidFill>
+                  <a:schemeClr val="tx2"/>
+                </a:solidFill>
+              </a:defRPr>
+            </a:lvl3pPr>
+            <a:lvl4pPr eaLnBrk="1" hangingPunct="1">
+              <a:defRPr>
+                <a:solidFill>
+                  <a:schemeClr val="tx2"/>
+                </a:solidFill>
+              </a:defRPr>
+            </a:lvl4pPr>
+            <a:lvl5pPr eaLnBrk="1" hangingPunct="1">
+              <a:defRPr>
+                <a:solidFill>
+                  <a:schemeClr val="tx2"/>
+                </a:solidFill>
+              </a:defRPr>
+            </a:lvl5pPr>
+            <a:lvl6pPr eaLnBrk="1" hangingPunct="1">
+              <a:defRPr>
+                <a:solidFill>
+                  <a:schemeClr val="tx2"/>
+                </a:solidFill>
+              </a:defRPr>
+            </a:lvl6pPr>
+            <a:lvl7pPr eaLnBrk="1" hangingPunct="1">
+              <a:defRPr>
+                <a:solidFill>
+                  <a:schemeClr val="tx2"/>
+                </a:solidFill>
+              </a:defRPr>
+            </a:lvl7pPr>
+            <a:lvl8pPr eaLnBrk="1" hangingPunct="1">
+              <a:defRPr>
+                <a:solidFill>
+                  <a:schemeClr val="tx2"/>
+                </a:solidFill>
+              </a:defRPr>
+            </a:lvl8pPr>
+            <a:lvl9pPr eaLnBrk="1" hangingPunct="1">
+              <a:defRPr>
+                <a:solidFill>
+                  <a:schemeClr val="tx2"/>
+                </a:solidFill>
+              </a:defRPr>
+            </a:lvl9pPr>
+          </a:lstStyle>
+          <a:p>
+            <a:r>
+              <a:rPr lang="de-DE" dirty="0">
+                <a:solidFill>
+                  <a:srgbClr val="EC6708"/>
+                </a:solidFill>
+              </a:rPr>
+              <a:t>Test der Webseite</a:t>
+            </a:r>
+          </a:p>
+        </p:txBody>
+      </p:sp>
+      <p:pic>
+        <p:nvPicPr>
+          <p:cNvPr id="8" name="Grafik 7" descr="Ein Bild, das Zeichnung enthält.&#10;&#10;Automatisch generierte Beschreibung">
+            <a:extLst>
+              <a:ext uri="{FF2B5EF4-FFF2-40B4-BE49-F238E27FC236}">
+                <a16:creationId xmlns:a16="http://schemas.microsoft.com/office/drawing/2014/main" id="{AFCFDF3C-1F45-4864-A157-38B3C5F7A462}"/>
+              </a:ext>
+            </a:extLst>
+          </p:cNvPr>
+          <p:cNvPicPr>
+            <a:picLocks noChangeAspect="1"/>
+          </p:cNvPicPr>
+          <p:nvPr/>
+        </p:nvPicPr>
+        <p:blipFill>
+          <a:blip r:embed="rId4"/>
+          <a:stretch>
+            <a:fillRect/>
+          </a:stretch>
+        </p:blipFill>
+        <p:spPr>
+          <a:xfrm>
+            <a:off x="4770590" y="1103375"/>
+            <a:ext cx="1996883" cy="736945"/>
+          </a:xfrm>
+          <a:prstGeom prst="rect">
+            <a:avLst/>
+          </a:prstGeom>
+          <a:ln>
+            <a:noFill/>
+          </a:ln>
+          <a:effectLst>
+            <a:outerShdw blurRad="292100" dist="139700" dir="2700000" algn="tl" rotWithShape="0">
+              <a:srgbClr val="333333">
+                <a:alpha val="65000"/>
+              </a:srgbClr>
+            </a:outerShdw>
+          </a:effectLst>
+        </p:spPr>
+      </p:pic>
+      <p:pic>
+        <p:nvPicPr>
+          <p:cNvPr id="5" name="Grafik 4">
+            <a:extLst>
+              <a:ext uri="{FF2B5EF4-FFF2-40B4-BE49-F238E27FC236}">
+                <a16:creationId xmlns:a16="http://schemas.microsoft.com/office/drawing/2014/main" id="{EDCA029F-64AC-45EB-91DD-ED9BFA6B0BE0}"/>
+              </a:ext>
+            </a:extLst>
+          </p:cNvPr>
+          <p:cNvPicPr>
+            <a:picLocks noChangeAspect="1"/>
+          </p:cNvPicPr>
+          <p:nvPr/>
+        </p:nvPicPr>
+        <p:blipFill rotWithShape="1">
+          <a:blip r:embed="rId5"/>
+          <a:srcRect b="47760"/>
+          <a:stretch/>
+        </p:blipFill>
+        <p:spPr>
+          <a:xfrm>
+            <a:off x="8592424" y="1840319"/>
+            <a:ext cx="1419423" cy="293613"/>
+          </a:xfrm>
+          <a:prstGeom prst="rect">
+            <a:avLst/>
+          </a:prstGeom>
+          <a:ln>
+            <a:noFill/>
+          </a:ln>
+          <a:effectLst>
+            <a:outerShdw blurRad="292100" dist="139700" dir="2700000" algn="tl" rotWithShape="0">
+              <a:srgbClr val="333333">
+                <a:alpha val="65000"/>
+              </a:srgbClr>
+            </a:outerShdw>
+          </a:effectLst>
+        </p:spPr>
+      </p:pic>
+      <p:pic>
+        <p:nvPicPr>
+          <p:cNvPr id="6" name="Grafik 5">
+            <a:extLst>
+              <a:ext uri="{FF2B5EF4-FFF2-40B4-BE49-F238E27FC236}">
+                <a16:creationId xmlns:a16="http://schemas.microsoft.com/office/drawing/2014/main" id="{48041136-A31B-4FAE-9F2C-7332D70306B1}"/>
+              </a:ext>
+            </a:extLst>
+          </p:cNvPr>
+          <p:cNvPicPr>
+            <a:picLocks noChangeAspect="1"/>
+          </p:cNvPicPr>
+          <p:nvPr/>
+        </p:nvPicPr>
+        <p:blipFill rotWithShape="1">
+          <a:blip r:embed="rId5"/>
+          <a:srcRect t="47761"/>
+          <a:stretch/>
+        </p:blipFill>
+        <p:spPr>
+          <a:xfrm>
+            <a:off x="2180155" y="1840320"/>
+            <a:ext cx="1419423" cy="293612"/>
+          </a:xfrm>
+          <a:prstGeom prst="rect">
+            <a:avLst/>
+          </a:prstGeom>
+          <a:ln>
+            <a:noFill/>
+          </a:ln>
+          <a:effectLst>
+            <a:outerShdw blurRad="292100" dist="139700" dir="2700000" algn="tl" rotWithShape="0">
+              <a:srgbClr val="333333">
+                <a:alpha val="65000"/>
+              </a:srgbClr>
+            </a:outerShdw>
+          </a:effectLst>
+        </p:spPr>
+      </p:pic>
+    </p:spTree>
+    <p:extLst>
+      <p:ext uri="{BB962C8B-B14F-4D97-AF65-F5344CB8AC3E}">
+        <p14:creationId xmlns:p14="http://schemas.microsoft.com/office/powerpoint/2010/main" val="550083334"/>
+      </p:ext>
+    </p:extLst>
+  </p:cSld>
+  <p:clrMapOvr>
+    <a:masterClrMapping/>
+  </p:clrMapOvr>
+</p:sld>
+</file>
+
+<file path=ppt/slides/slide6.xml><?xml version="1.0" encoding="utf-8"?>
+<p:sld xmlns:a="http://schemas.openxmlformats.org/drawingml/2006/main" xmlns:r="http://schemas.openxmlformats.org/officeDocument/2006/relationships" xmlns:p="http://schemas.openxmlformats.org/presentationml/2006/main">
+  <p:cSld>
+    <p:spTree>
+      <p:nvGrpSpPr>
+        <p:cNvPr id="1" name=""/>
+        <p:cNvGrpSpPr/>
+        <p:nvPr/>
+      </p:nvGrpSpPr>
+      <p:grpSpPr>
+        <a:xfrm>
+          <a:off x="0" y="0"/>
+          <a:ext cx="0" cy="0"/>
+          <a:chOff x="0" y="0"/>
+          <a:chExt cx="0" cy="0"/>
+        </a:xfrm>
+      </p:grpSpPr>
+      <p:pic>
+        <p:nvPicPr>
+          <p:cNvPr id="2" name="Grafik 1">
+            <a:extLst>
+              <a:ext uri="{FF2B5EF4-FFF2-40B4-BE49-F238E27FC236}">
+                <a16:creationId xmlns:a16="http://schemas.microsoft.com/office/drawing/2014/main" id="{95B4C2CE-488E-4560-A9EF-936D4F16C746}"/>
+              </a:ext>
+            </a:extLst>
+          </p:cNvPr>
+          <p:cNvPicPr>
+            <a:picLocks noChangeAspect="1"/>
+          </p:cNvPicPr>
+          <p:nvPr/>
+        </p:nvPicPr>
+        <p:blipFill rotWithShape="1">
+          <a:blip r:embed="rId2"/>
+          <a:srcRect b="4979"/>
+          <a:stretch/>
+        </p:blipFill>
+        <p:spPr>
+          <a:xfrm>
+            <a:off x="601330" y="2157233"/>
+            <a:ext cx="5167702" cy="1774218"/>
+          </a:xfrm>
+          <a:prstGeom prst="rect">
+            <a:avLst/>
+          </a:prstGeom>
+          <a:ln>
+            <a:noFill/>
+          </a:ln>
+          <a:effectLst>
+            <a:outerShdw blurRad="292100" dist="139700" dir="2700000" algn="tl" rotWithShape="0">
+              <a:srgbClr val="333333">
+                <a:alpha val="65000"/>
+              </a:srgbClr>
+            </a:outerShdw>
+          </a:effectLst>
+        </p:spPr>
+      </p:pic>
+      <p:pic>
+        <p:nvPicPr>
+          <p:cNvPr id="3" name="Grafik 2">
+            <a:extLst>
+              <a:ext uri="{FF2B5EF4-FFF2-40B4-BE49-F238E27FC236}">
+                <a16:creationId xmlns:a16="http://schemas.microsoft.com/office/drawing/2014/main" id="{4FA5816E-9989-4697-9230-1AEDFB619A47}"/>
+              </a:ext>
+            </a:extLst>
+          </p:cNvPr>
+          <p:cNvPicPr>
+            <a:picLocks noChangeAspect="1"/>
+          </p:cNvPicPr>
+          <p:nvPr/>
+        </p:nvPicPr>
+        <p:blipFill>
+          <a:blip r:embed="rId3"/>
+          <a:stretch>
+            <a:fillRect/>
+          </a:stretch>
+        </p:blipFill>
+        <p:spPr>
+          <a:xfrm>
+            <a:off x="953023" y="4537579"/>
+            <a:ext cx="4896533" cy="724001"/>
+          </a:xfrm>
+          <a:prstGeom prst="rect">
+            <a:avLst/>
+          </a:prstGeom>
+          <a:ln>
+            <a:noFill/>
+          </a:ln>
+          <a:effectLst>
+            <a:outerShdw blurRad="292100" dist="139700" dir="2700000" algn="tl" rotWithShape="0">
+              <a:srgbClr val="333333">
+                <a:alpha val="65000"/>
+              </a:srgbClr>
+            </a:outerShdw>
+          </a:effectLst>
+        </p:spPr>
+      </p:pic>
+      <p:pic>
+        <p:nvPicPr>
+          <p:cNvPr id="4" name="Grafik 3">
+            <a:extLst>
+              <a:ext uri="{FF2B5EF4-FFF2-40B4-BE49-F238E27FC236}">
+                <a16:creationId xmlns:a16="http://schemas.microsoft.com/office/drawing/2014/main" id="{D7936FE6-F4D6-4EFC-9E05-D4563B2BEF82}"/>
+              </a:ext>
+            </a:extLst>
+          </p:cNvPr>
+          <p:cNvPicPr>
+            <a:picLocks noChangeAspect="1"/>
+          </p:cNvPicPr>
+          <p:nvPr/>
+        </p:nvPicPr>
+        <p:blipFill>
+          <a:blip r:embed="rId4"/>
+          <a:stretch>
+            <a:fillRect/>
+          </a:stretch>
+        </p:blipFill>
+        <p:spPr>
+          <a:xfrm>
+            <a:off x="6422970" y="2157233"/>
+            <a:ext cx="4896533" cy="1774218"/>
+          </a:xfrm>
+          <a:prstGeom prst="rect">
+            <a:avLst/>
+          </a:prstGeom>
+          <a:ln>
+            <a:noFill/>
+          </a:ln>
+          <a:effectLst>
+            <a:outerShdw blurRad="292100" dist="139700" dir="2700000" algn="tl" rotWithShape="0">
+              <a:srgbClr val="333333">
+                <a:alpha val="65000"/>
+              </a:srgbClr>
+            </a:outerShdw>
+          </a:effectLst>
+        </p:spPr>
+      </p:pic>
+      <p:pic>
+        <p:nvPicPr>
+          <p:cNvPr id="5" name="Grafik 4">
+            <a:extLst>
+              <a:ext uri="{FF2B5EF4-FFF2-40B4-BE49-F238E27FC236}">
+                <a16:creationId xmlns:a16="http://schemas.microsoft.com/office/drawing/2014/main" id="{DB8A7E9E-CE01-4129-B537-81E42364E48C}"/>
+              </a:ext>
+            </a:extLst>
+          </p:cNvPr>
+          <p:cNvPicPr>
+            <a:picLocks noChangeAspect="1"/>
+          </p:cNvPicPr>
+          <p:nvPr/>
+        </p:nvPicPr>
+        <p:blipFill>
+          <a:blip r:embed="rId5"/>
+          <a:stretch>
+            <a:fillRect/>
+          </a:stretch>
+        </p:blipFill>
+        <p:spPr>
+          <a:xfrm>
+            <a:off x="6618259" y="4632891"/>
+            <a:ext cx="4505954" cy="504895"/>
+          </a:xfrm>
+          <a:prstGeom prst="rect">
+            <a:avLst/>
+          </a:prstGeom>
+          <a:ln>
+            <a:noFill/>
+          </a:ln>
+          <a:effectLst>
+            <a:outerShdw blurRad="292100" dist="139700" dir="2700000" algn="tl" rotWithShape="0">
+              <a:srgbClr val="333333">
+                <a:alpha val="65000"/>
+              </a:srgbClr>
+            </a:outerShdw>
+          </a:effectLst>
+        </p:spPr>
+      </p:pic>
+      <p:pic>
+        <p:nvPicPr>
+          <p:cNvPr id="6" name="Grafik 5">
+            <a:extLst>
+              <a:ext uri="{FF2B5EF4-FFF2-40B4-BE49-F238E27FC236}">
+                <a16:creationId xmlns:a16="http://schemas.microsoft.com/office/drawing/2014/main" id="{85D7C4A1-03EE-4CDB-92C1-8408923309F1}"/>
+              </a:ext>
+            </a:extLst>
+          </p:cNvPr>
+          <p:cNvPicPr>
+            <a:picLocks noChangeAspect="1"/>
+          </p:cNvPicPr>
+          <p:nvPr/>
+        </p:nvPicPr>
+        <p:blipFill rotWithShape="1">
+          <a:blip r:embed="rId6"/>
+          <a:srcRect t="14110" b="45051"/>
+          <a:stretch/>
+        </p:blipFill>
+        <p:spPr>
+          <a:xfrm>
+            <a:off x="2572498" y="1676844"/>
+            <a:ext cx="1657581" cy="245097"/>
+          </a:xfrm>
+          <a:prstGeom prst="rect">
+            <a:avLst/>
+          </a:prstGeom>
+          <a:ln>
+            <a:noFill/>
+          </a:ln>
+          <a:effectLst>
+            <a:outerShdw blurRad="292100" dist="139700" dir="2700000" algn="tl" rotWithShape="0">
+              <a:srgbClr val="333333">
+                <a:alpha val="65000"/>
+              </a:srgbClr>
+            </a:outerShdw>
+          </a:effectLst>
+        </p:spPr>
+      </p:pic>
+      <p:sp>
+        <p:nvSpPr>
+          <p:cNvPr id="8" name="Titel 1">
+            <a:extLst>
+              <a:ext uri="{FF2B5EF4-FFF2-40B4-BE49-F238E27FC236}">
+                <a16:creationId xmlns:a16="http://schemas.microsoft.com/office/drawing/2014/main" id="{3931DEA3-6A3E-4EA3-8630-1339E3D8AF1D}"/>
+              </a:ext>
+            </a:extLst>
+          </p:cNvPr>
+          <p:cNvSpPr txBox="1">
+            <a:spLocks/>
+          </p:cNvSpPr>
+          <p:nvPr/>
+        </p:nvSpPr>
+        <p:spPr>
+          <a:xfrm>
+            <a:off x="1590732" y="106001"/>
+            <a:ext cx="4178300" cy="835025"/>
+          </a:xfrm>
+          <a:prstGeom prst="rect">
+            <a:avLst/>
+          </a:prstGeom>
+          <a:noFill/>
+        </p:spPr>
+        <p:txBody>
+          <a:bodyPr vert="horz" lIns="91440" tIns="45720" rIns="91440" bIns="45720" rtlCol="0" anchor="t">
+            <a:normAutofit/>
+          </a:bodyPr>
+          <a:lstStyle>
+            <a:lvl1pPr algn="l" defTabSz="457200" rtl="0" eaLnBrk="1" latinLnBrk="0" hangingPunct="1">
+              <a:spcBef>
+                <a:spcPct val="0"/>
+              </a:spcBef>
+              <a:buNone/>
+              <a:defRPr sz="3600" kern="1200">
+                <a:solidFill>
+                  <a:schemeClr val="accent1"/>
+                </a:solidFill>
+                <a:latin typeface="+mj-lt"/>
+                <a:ea typeface="+mj-ea"/>
+                <a:cs typeface="+mj-cs"/>
+              </a:defRPr>
+            </a:lvl1pPr>
+            <a:lvl2pPr eaLnBrk="1" hangingPunct="1">
+              <a:defRPr>
+                <a:solidFill>
+                  <a:schemeClr val="tx2"/>
+                </a:solidFill>
+              </a:defRPr>
+            </a:lvl2pPr>
+            <a:lvl3pPr eaLnBrk="1" hangingPunct="1">
+              <a:defRPr>
+                <a:solidFill>
+                  <a:schemeClr val="tx2"/>
+                </a:solidFill>
+              </a:defRPr>
+            </a:lvl3pPr>
+            <a:lvl4pPr eaLnBrk="1" hangingPunct="1">
+              <a:defRPr>
+                <a:solidFill>
+                  <a:schemeClr val="tx2"/>
+                </a:solidFill>
+              </a:defRPr>
+            </a:lvl4pPr>
+            <a:lvl5pPr eaLnBrk="1" hangingPunct="1">
+              <a:defRPr>
+                <a:solidFill>
+                  <a:schemeClr val="tx2"/>
+                </a:solidFill>
+              </a:defRPr>
+            </a:lvl5pPr>
+            <a:lvl6pPr eaLnBrk="1" hangingPunct="1">
+              <a:defRPr>
+                <a:solidFill>
+                  <a:schemeClr val="tx2"/>
+                </a:solidFill>
+              </a:defRPr>
+            </a:lvl6pPr>
+            <a:lvl7pPr eaLnBrk="1" hangingPunct="1">
+              <a:defRPr>
+                <a:solidFill>
+                  <a:schemeClr val="tx2"/>
+                </a:solidFill>
+              </a:defRPr>
+            </a:lvl7pPr>
+            <a:lvl8pPr eaLnBrk="1" hangingPunct="1">
+              <a:defRPr>
+                <a:solidFill>
+                  <a:schemeClr val="tx2"/>
+                </a:solidFill>
+              </a:defRPr>
+            </a:lvl8pPr>
+            <a:lvl9pPr eaLnBrk="1" hangingPunct="1">
+              <a:defRPr>
+                <a:solidFill>
+                  <a:schemeClr val="tx2"/>
+                </a:solidFill>
+              </a:defRPr>
+            </a:lvl9pPr>
+          </a:lstStyle>
+          <a:p>
+            <a:r>
+              <a:rPr lang="de-DE" dirty="0">
+                <a:solidFill>
+                  <a:srgbClr val="EC6708"/>
+                </a:solidFill>
+              </a:rPr>
+              <a:t>Test der Webseite</a:t>
+            </a:r>
+          </a:p>
+        </p:txBody>
+      </p:sp>
+      <p:pic>
+        <p:nvPicPr>
+          <p:cNvPr id="9" name="Grafik 8">
+            <a:extLst>
+              <a:ext uri="{FF2B5EF4-FFF2-40B4-BE49-F238E27FC236}">
+                <a16:creationId xmlns:a16="http://schemas.microsoft.com/office/drawing/2014/main" id="{FAB23912-D895-494A-8A84-4BC8BC7D2F4D}"/>
+              </a:ext>
+            </a:extLst>
+          </p:cNvPr>
+          <p:cNvPicPr>
+            <a:picLocks noChangeAspect="1"/>
+          </p:cNvPicPr>
+          <p:nvPr/>
+        </p:nvPicPr>
+        <p:blipFill rotWithShape="1">
+          <a:blip r:embed="rId7"/>
+          <a:srcRect t="17005"/>
+          <a:stretch/>
+        </p:blipFill>
+        <p:spPr>
+          <a:xfrm>
+            <a:off x="7961923" y="1676843"/>
+            <a:ext cx="1371791" cy="245097"/>
+          </a:xfrm>
+          <a:prstGeom prst="rect">
+            <a:avLst/>
+          </a:prstGeom>
+          <a:ln>
+            <a:noFill/>
+          </a:ln>
+          <a:effectLst>
+            <a:outerShdw blurRad="292100" dist="139700" dir="2700000" algn="tl" rotWithShape="0">
+              <a:srgbClr val="333333">
+                <a:alpha val="65000"/>
+              </a:srgbClr>
+            </a:outerShdw>
+          </a:effectLst>
+        </p:spPr>
+      </p:pic>
+    </p:spTree>
+    <p:extLst>
+      <p:ext uri="{BB962C8B-B14F-4D97-AF65-F5344CB8AC3E}">
+        <p14:creationId xmlns:p14="http://schemas.microsoft.com/office/powerpoint/2010/main" val="485698721"/>
+      </p:ext>
+    </p:extLst>
+  </p:cSld>
+  <p:clrMapOvr>
+    <a:masterClrMapping/>
+  </p:clrMapOvr>
+</p:sld>
+</file>
+
+<file path=ppt/slides/slide7.xml><?xml version="1.0" encoding="utf-8"?>
+<p:sld xmlns:a="http://schemas.openxmlformats.org/drawingml/2006/main" xmlns:r="http://schemas.openxmlformats.org/officeDocument/2006/relationships" xmlns:p="http://schemas.openxmlformats.org/presentationml/2006/main">
+  <p:cSld>
     <p:bg>
       <p:bgPr>
         <a:solidFill>

</xml_diff>

<commit_message>
updated Presentation with Dependabot
</commit_message>
<xml_diff>
--- a/share/presentations/Java 2/RentATool_17.07.2020.pptx
+++ b/share/presentations/Java 2/RentATool_17.07.2020.pptx
@@ -5,19 +5,20 @@
     <p:sldMasterId id="2147483978" r:id="rId4"/>
   </p:sldMasterIdLst>
   <p:notesMasterIdLst>
-    <p:notesMasterId r:id="rId12"/>
+    <p:notesMasterId r:id="rId13"/>
   </p:notesMasterIdLst>
   <p:handoutMasterIdLst>
-    <p:handoutMasterId r:id="rId13"/>
+    <p:handoutMasterId r:id="rId14"/>
   </p:handoutMasterIdLst>
   <p:sldIdLst>
     <p:sldId id="256" r:id="rId5"/>
     <p:sldId id="265" r:id="rId6"/>
     <p:sldId id="266" r:id="rId7"/>
     <p:sldId id="264" r:id="rId8"/>
-    <p:sldId id="267" r:id="rId9"/>
-    <p:sldId id="268" r:id="rId10"/>
-    <p:sldId id="261" r:id="rId11"/>
+    <p:sldId id="269" r:id="rId9"/>
+    <p:sldId id="267" r:id="rId10"/>
+    <p:sldId id="268" r:id="rId11"/>
+    <p:sldId id="261" r:id="rId12"/>
   </p:sldIdLst>
   <p:sldSz cx="12192000" cy="6858000"/>
   <p:notesSz cx="6858000" cy="9144000"/>
@@ -125,6 +126,7 @@
             <p14:sldId id="265"/>
             <p14:sldId id="266"/>
             <p14:sldId id="264"/>
+            <p14:sldId id="269"/>
             <p14:sldId id="267"/>
             <p14:sldId id="268"/>
             <p14:sldId id="261"/>
@@ -1223,7 +1225,7 @@
           </a:pPr>
           <a:r>
             <a:rPr lang="de-DE" sz="2400" noProof="0" dirty="0"/>
-            <a:t>Deploy</a:t>
+            <a:t>CI/CD</a:t>
           </a:r>
         </a:p>
       </dgm:t>
@@ -1754,7 +1756,7 @@
           </a:pPr>
           <a:r>
             <a:rPr lang="de-DE" sz="2400" kern="1200" noProof="0" dirty="0"/>
-            <a:t>Deploy</a:t>
+            <a:t>CI/CD</a:t>
           </a:r>
         </a:p>
       </dsp:txBody>
@@ -4244,7 +4246,7 @@
           <a:p>
             <a:fld id="{A4FF6716-91C8-43B5-8A44-D65BE93BEAF4}" type="datetimeFigureOut">
               <a:rPr lang="de-DE" smtClean="0"/>
-              <a:t>24.07.2020</a:t>
+              <a:t>27.07.2020</a:t>
             </a:fld>
             <a:endParaRPr lang="de-DE"/>
           </a:p>
@@ -4422,7 +4424,7 @@
           <a:p>
             <a:fld id="{78F9EC6D-9C59-4223-964A-334E089F8126}" type="datetimeFigureOut">
               <a:rPr lang="de-DE" noProof="0" smtClean="0"/>
-              <a:t>24.07.2020</a:t>
+              <a:t>27.07.2020</a:t>
             </a:fld>
             <a:endParaRPr lang="de-DE" noProof="0"/>
           </a:p>
@@ -4839,7 +4841,7 @@
           <a:p>
             <a:fld id="{76EB2DAB-85D8-4EA8-8EA4-376013B7B13D}" type="slidenum">
               <a:rPr lang="de-DE" noProof="0" smtClean="0"/>
-              <a:t>7</a:t>
+              <a:t>8</a:t>
             </a:fld>
             <a:endParaRPr lang="de-DE" noProof="0"/>
           </a:p>
@@ -7465,7 +7467,7 @@
           <p:nvPr>
             <p:extLst>
               <p:ext uri="{D42A27DB-BD31-4B8C-83A1-F6EECF244321}">
-                <p14:modId xmlns:p14="http://schemas.microsoft.com/office/powerpoint/2010/main" val="657216814"/>
+                <p14:modId xmlns:p14="http://schemas.microsoft.com/office/powerpoint/2010/main" val="1535056496"/>
               </p:ext>
             </p:extLst>
           </p:nvPr>
@@ -8790,7 +8792,7 @@
                   <a:srgbClr val="EC6708"/>
                 </a:solidFill>
               </a:rPr>
-              <a:t>Deploy</a:t>
+              <a:t>CI/CD</a:t>
             </a:r>
           </a:p>
         </p:txBody>
@@ -8978,6 +8980,223 @@
 </file>
 
 <file path=ppt/slides/slide5.xml><?xml version="1.0" encoding="utf-8"?>
+<p:sld xmlns:a="http://schemas.openxmlformats.org/drawingml/2006/main" xmlns:r="http://schemas.openxmlformats.org/officeDocument/2006/relationships" xmlns:p="http://schemas.openxmlformats.org/presentationml/2006/main">
+  <p:cSld>
+    <p:spTree>
+      <p:nvGrpSpPr>
+        <p:cNvPr id="1" name=""/>
+        <p:cNvGrpSpPr/>
+        <p:nvPr/>
+      </p:nvGrpSpPr>
+      <p:grpSpPr>
+        <a:xfrm>
+          <a:off x="0" y="0"/>
+          <a:ext cx="0" cy="0"/>
+          <a:chOff x="0" y="0"/>
+          <a:chExt cx="0" cy="0"/>
+        </a:xfrm>
+      </p:grpSpPr>
+      <p:sp>
+        <p:nvSpPr>
+          <p:cNvPr id="28" name="Titel 1">
+            <a:extLst>
+              <a:ext uri="{FF2B5EF4-FFF2-40B4-BE49-F238E27FC236}">
+                <a16:creationId xmlns:a16="http://schemas.microsoft.com/office/drawing/2014/main" id="{9562B06F-8A45-4C57-9612-F5A722865CB5}"/>
+              </a:ext>
+            </a:extLst>
+          </p:cNvPr>
+          <p:cNvSpPr txBox="1">
+            <a:spLocks/>
+          </p:cNvSpPr>
+          <p:nvPr/>
+        </p:nvSpPr>
+        <p:spPr>
+          <a:xfrm>
+            <a:off x="1590732" y="106001"/>
+            <a:ext cx="4178300" cy="835025"/>
+          </a:xfrm>
+          <a:prstGeom prst="rect">
+            <a:avLst/>
+          </a:prstGeom>
+          <a:noFill/>
+        </p:spPr>
+        <p:txBody>
+          <a:bodyPr vert="horz" lIns="91440" tIns="45720" rIns="91440" bIns="45720" rtlCol="0" anchor="t">
+            <a:normAutofit/>
+          </a:bodyPr>
+          <a:lstStyle>
+            <a:lvl1pPr algn="l" defTabSz="457200" rtl="0" eaLnBrk="1" latinLnBrk="0" hangingPunct="1">
+              <a:spcBef>
+                <a:spcPct val="0"/>
+              </a:spcBef>
+              <a:buNone/>
+              <a:defRPr sz="3600" kern="1200">
+                <a:solidFill>
+                  <a:schemeClr val="accent1"/>
+                </a:solidFill>
+                <a:latin typeface="+mj-lt"/>
+                <a:ea typeface="+mj-ea"/>
+                <a:cs typeface="+mj-cs"/>
+              </a:defRPr>
+            </a:lvl1pPr>
+            <a:lvl2pPr eaLnBrk="1" hangingPunct="1">
+              <a:defRPr>
+                <a:solidFill>
+                  <a:schemeClr val="tx2"/>
+                </a:solidFill>
+              </a:defRPr>
+            </a:lvl2pPr>
+            <a:lvl3pPr eaLnBrk="1" hangingPunct="1">
+              <a:defRPr>
+                <a:solidFill>
+                  <a:schemeClr val="tx2"/>
+                </a:solidFill>
+              </a:defRPr>
+            </a:lvl3pPr>
+            <a:lvl4pPr eaLnBrk="1" hangingPunct="1">
+              <a:defRPr>
+                <a:solidFill>
+                  <a:schemeClr val="tx2"/>
+                </a:solidFill>
+              </a:defRPr>
+            </a:lvl4pPr>
+            <a:lvl5pPr eaLnBrk="1" hangingPunct="1">
+              <a:defRPr>
+                <a:solidFill>
+                  <a:schemeClr val="tx2"/>
+                </a:solidFill>
+              </a:defRPr>
+            </a:lvl5pPr>
+            <a:lvl6pPr eaLnBrk="1" hangingPunct="1">
+              <a:defRPr>
+                <a:solidFill>
+                  <a:schemeClr val="tx2"/>
+                </a:solidFill>
+              </a:defRPr>
+            </a:lvl6pPr>
+            <a:lvl7pPr eaLnBrk="1" hangingPunct="1">
+              <a:defRPr>
+                <a:solidFill>
+                  <a:schemeClr val="tx2"/>
+                </a:solidFill>
+              </a:defRPr>
+            </a:lvl7pPr>
+            <a:lvl8pPr eaLnBrk="1" hangingPunct="1">
+              <a:defRPr>
+                <a:solidFill>
+                  <a:schemeClr val="tx2"/>
+                </a:solidFill>
+              </a:defRPr>
+            </a:lvl8pPr>
+            <a:lvl9pPr eaLnBrk="1" hangingPunct="1">
+              <a:defRPr>
+                <a:solidFill>
+                  <a:schemeClr val="tx2"/>
+                </a:solidFill>
+              </a:defRPr>
+            </a:lvl9pPr>
+          </a:lstStyle>
+          <a:p>
+            <a:r>
+              <a:rPr lang="de-DE" dirty="0">
+                <a:solidFill>
+                  <a:srgbClr val="EC6708"/>
+                </a:solidFill>
+              </a:rPr>
+              <a:t>CI/CD</a:t>
+            </a:r>
+          </a:p>
+        </p:txBody>
+      </p:sp>
+      <p:pic>
+        <p:nvPicPr>
+          <p:cNvPr id="30" name="Grafik 29">
+            <a:extLst>
+              <a:ext uri="{FF2B5EF4-FFF2-40B4-BE49-F238E27FC236}">
+                <a16:creationId xmlns:a16="http://schemas.microsoft.com/office/drawing/2014/main" id="{61E270E6-97BF-46CE-A549-A84BFAE081A4}"/>
+              </a:ext>
+            </a:extLst>
+          </p:cNvPr>
+          <p:cNvPicPr>
+            <a:picLocks noChangeAspect="1"/>
+          </p:cNvPicPr>
+          <p:nvPr/>
+        </p:nvPicPr>
+        <p:blipFill>
+          <a:blip r:embed="rId2">
+            <a:extLst>
+              <a:ext uri="{96DAC541-7B7A-43D3-8B79-37D633B846F1}">
+                <asvg:svgBlip xmlns:asvg="http://schemas.microsoft.com/office/drawing/2016/SVG/main" r:embed="rId3"/>
+              </a:ext>
+            </a:extLst>
+          </a:blip>
+          <a:stretch>
+            <a:fillRect/>
+          </a:stretch>
+        </p:blipFill>
+        <p:spPr>
+          <a:xfrm>
+            <a:off x="4168832" y="1308672"/>
+            <a:ext cx="3200400" cy="914400"/>
+          </a:xfrm>
+          <a:prstGeom prst="rect">
+            <a:avLst/>
+          </a:prstGeom>
+        </p:spPr>
+      </p:pic>
+      <p:pic>
+        <p:nvPicPr>
+          <p:cNvPr id="2" name="Grafik 1">
+            <a:extLst>
+              <a:ext uri="{FF2B5EF4-FFF2-40B4-BE49-F238E27FC236}">
+                <a16:creationId xmlns:a16="http://schemas.microsoft.com/office/drawing/2014/main" id="{F6FBCB8E-C3BA-4065-97C1-0B764850F6A7}"/>
+              </a:ext>
+            </a:extLst>
+          </p:cNvPr>
+          <p:cNvPicPr>
+            <a:picLocks noChangeAspect="1"/>
+          </p:cNvPicPr>
+          <p:nvPr/>
+        </p:nvPicPr>
+        <p:blipFill rotWithShape="1">
+          <a:blip r:embed="rId4"/>
+          <a:srcRect t="22829"/>
+          <a:stretch/>
+        </p:blipFill>
+        <p:spPr>
+          <a:xfrm>
+            <a:off x="2356915" y="2893731"/>
+            <a:ext cx="7478169" cy="1962880"/>
+          </a:xfrm>
+          <a:prstGeom prst="rect">
+            <a:avLst/>
+          </a:prstGeom>
+          <a:ln>
+            <a:noFill/>
+          </a:ln>
+          <a:effectLst>
+            <a:outerShdw blurRad="292100" dist="139700" dir="2700000" algn="tl" rotWithShape="0">
+              <a:srgbClr val="333333">
+                <a:alpha val="65000"/>
+              </a:srgbClr>
+            </a:outerShdw>
+          </a:effectLst>
+        </p:spPr>
+      </p:pic>
+    </p:spTree>
+    <p:extLst>
+      <p:ext uri="{BB962C8B-B14F-4D97-AF65-F5344CB8AC3E}">
+        <p14:creationId xmlns:p14="http://schemas.microsoft.com/office/powerpoint/2010/main" val="2282525590"/>
+      </p:ext>
+    </p:extLst>
+  </p:cSld>
+  <p:clrMapOvr>
+    <a:masterClrMapping/>
+  </p:clrMapOvr>
+</p:sld>
+</file>
+
+<file path=ppt/slides/slide6.xml><?xml version="1.0" encoding="utf-8"?>
 <p:sld xmlns:a="http://schemas.openxmlformats.org/drawingml/2006/main" xmlns:r="http://schemas.openxmlformats.org/officeDocument/2006/relationships" xmlns:p="http://schemas.openxmlformats.org/presentationml/2006/main">
   <p:cSld>
     <p:spTree>
@@ -9316,7 +9535,7 @@
 </p:sld>
 </file>
 
-<file path=ppt/slides/slide6.xml><?xml version="1.0" encoding="utf-8"?>
+<file path=ppt/slides/slide7.xml><?xml version="1.0" encoding="utf-8"?>
 <p:sld xmlns:a="http://schemas.openxmlformats.org/drawingml/2006/main" xmlns:r="http://schemas.openxmlformats.org/officeDocument/2006/relationships" xmlns:p="http://schemas.openxmlformats.org/presentationml/2006/main">
   <p:cSld>
     <p:spTree>
@@ -9695,7 +9914,7 @@
 </p:sld>
 </file>
 
-<file path=ppt/slides/slide7.xml><?xml version="1.0" encoding="utf-8"?>
+<file path=ppt/slides/slide8.xml><?xml version="1.0" encoding="utf-8"?>
 <p:sld xmlns:a="http://schemas.openxmlformats.org/drawingml/2006/main" xmlns:r="http://schemas.openxmlformats.org/officeDocument/2006/relationships" xmlns:p="http://schemas.openxmlformats.org/presentationml/2006/main">
   <p:cSld>
     <p:bg>
@@ -10694,12 +10913,11 @@
 </file>
 
 <file path=customXml/item1.xml><?xml version="1.0" encoding="utf-8"?>
-<?mso-contentType ?>
-<FormTemplates xmlns="http://schemas.microsoft.com/sharepoint/v3/contenttype/forms">
-  <Display>DocumentLibraryForm</Display>
-  <Edit>DocumentLibraryForm</Edit>
-  <New>DocumentLibraryForm</New>
-</FormTemplates>
+<p:properties xmlns:p="http://schemas.microsoft.com/office/2006/metadata/properties" xmlns:xsi="http://www.w3.org/2001/XMLSchema-instance" xmlns:pc="http://schemas.microsoft.com/office/infopath/2007/PartnerControls">
+  <documentManagement>
+    <MediaServiceKeyPoints xmlns="71af3243-3dd4-4a8d-8c0d-dd76da1f02a5" xsi:nil="true"/>
+  </documentManagement>
+</p:properties>
 </file>
 
 <file path=customXml/item2.xml><?xml version="1.0" encoding="utf-8"?>
@@ -10914,17 +11132,27 @@
 </file>
 
 <file path=customXml/item3.xml><?xml version="1.0" encoding="utf-8"?>
-<p:properties xmlns:p="http://schemas.microsoft.com/office/2006/metadata/properties" xmlns:xsi="http://www.w3.org/2001/XMLSchema-instance" xmlns:pc="http://schemas.microsoft.com/office/infopath/2007/PartnerControls">
-  <documentManagement>
-    <MediaServiceKeyPoints xmlns="71af3243-3dd4-4a8d-8c0d-dd76da1f02a5" xsi:nil="true"/>
-  </documentManagement>
-</p:properties>
+<?mso-contentType ?>
+<FormTemplates xmlns="http://schemas.microsoft.com/sharepoint/v3/contenttype/forms">
+  <Display>DocumentLibraryForm</Display>
+  <Edit>DocumentLibraryForm</Edit>
+  <New>DocumentLibraryForm</New>
+</FormTemplates>
 </file>
 
 <file path=customXml/itemProps1.xml><?xml version="1.0" encoding="utf-8"?>
-<ds:datastoreItem xmlns:ds="http://schemas.openxmlformats.org/officeDocument/2006/customXml" ds:itemID="{DFB9BFA2-1FA5-44A1-B975-10D6BF58ECD0}">
+<ds:datastoreItem xmlns:ds="http://schemas.openxmlformats.org/officeDocument/2006/customXml" ds:itemID="{30541854-87B3-4953-A183-EF3BD285377B}">
   <ds:schemaRefs>
-    <ds:schemaRef ds:uri="http://schemas.microsoft.com/sharepoint/v3/contenttype/forms"/>
+    <ds:schemaRef ds:uri="http://schemas.openxmlformats.org/package/2006/metadata/core-properties"/>
+    <ds:schemaRef ds:uri="http://www.w3.org/XML/1998/namespace"/>
+    <ds:schemaRef ds:uri="http://purl.org/dc/terms/"/>
+    <ds:schemaRef ds:uri="71af3243-3dd4-4a8d-8c0d-dd76da1f02a5"/>
+    <ds:schemaRef ds:uri="16c05727-aa75-4e4a-9b5f-8a80a1165891"/>
+    <ds:schemaRef ds:uri="http://purl.org/dc/dcmitype/"/>
+    <ds:schemaRef ds:uri="http://schemas.microsoft.com/office/2006/documentManagement/types"/>
+    <ds:schemaRef ds:uri="http://schemas.microsoft.com/office/infopath/2007/PartnerControls"/>
+    <ds:schemaRef ds:uri="http://schemas.microsoft.com/office/2006/metadata/properties"/>
+    <ds:schemaRef ds:uri="http://purl.org/dc/elements/1.1/"/>
   </ds:schemaRefs>
 </ds:datastoreItem>
 </file>
@@ -10949,18 +11177,9 @@
 </file>
 
 <file path=customXml/itemProps3.xml><?xml version="1.0" encoding="utf-8"?>
-<ds:datastoreItem xmlns:ds="http://schemas.openxmlformats.org/officeDocument/2006/customXml" ds:itemID="{30541854-87B3-4953-A183-EF3BD285377B}">
+<ds:datastoreItem xmlns:ds="http://schemas.openxmlformats.org/officeDocument/2006/customXml" ds:itemID="{DFB9BFA2-1FA5-44A1-B975-10D6BF58ECD0}">
   <ds:schemaRefs>
-    <ds:schemaRef ds:uri="http://schemas.openxmlformats.org/package/2006/metadata/core-properties"/>
-    <ds:schemaRef ds:uri="http://www.w3.org/XML/1998/namespace"/>
-    <ds:schemaRef ds:uri="http://purl.org/dc/terms/"/>
-    <ds:schemaRef ds:uri="71af3243-3dd4-4a8d-8c0d-dd76da1f02a5"/>
-    <ds:schemaRef ds:uri="16c05727-aa75-4e4a-9b5f-8a80a1165891"/>
-    <ds:schemaRef ds:uri="http://purl.org/dc/dcmitype/"/>
-    <ds:schemaRef ds:uri="http://schemas.microsoft.com/office/2006/documentManagement/types"/>
-    <ds:schemaRef ds:uri="http://schemas.microsoft.com/office/infopath/2007/PartnerControls"/>
-    <ds:schemaRef ds:uri="http://schemas.microsoft.com/office/2006/metadata/properties"/>
-    <ds:schemaRef ds:uri="http://purl.org/dc/elements/1.1/"/>
+    <ds:schemaRef ds:uri="http://schemas.microsoft.com/sharepoint/v3/contenttype/forms"/>
   </ds:schemaRefs>
 </ds:datastoreItem>
 </file>
</xml_diff>